<commit_message>
FHIR-28299, FHIR-28373, FHIR-29560, FHIR-29561, and remove note to balloter regarding GIC only
</commit_message>
<xml_diff>
--- a/input/images/source/Gaps in Care Graphics.pptx
+++ b/input/images/source/Gaps in Care Graphics.pptx
@@ -8,6 +8,7 @@
     <p:sldId id="257" r:id="rId2"/>
     <p:sldId id="258" r:id="rId3"/>
     <p:sldId id="259" r:id="rId4"/>
+    <p:sldId id="264" r:id="rId5"/>
   </p:sldIdLst>
   <p:sldSz cx="12192000" cy="6858000"/>
   <p:notesSz cx="6858000" cy="9144000"/>
@@ -261,7 +262,7 @@
           <a:p>
             <a:fld id="{CCEBD49B-BC6D-4065-97F6-E22D565E4F2F}" type="datetimeFigureOut">
               <a:rPr lang="en-US" smtClean="0"/>
-              <a:t>12/15/2020</a:t>
+              <a:t>3/7/2021</a:t>
             </a:fld>
             <a:endParaRPr lang="en-US"/>
           </a:p>
@@ -459,7 +460,7 @@
           <a:p>
             <a:fld id="{CCEBD49B-BC6D-4065-97F6-E22D565E4F2F}" type="datetimeFigureOut">
               <a:rPr lang="en-US" smtClean="0"/>
-              <a:t>12/15/2020</a:t>
+              <a:t>3/7/2021</a:t>
             </a:fld>
             <a:endParaRPr lang="en-US"/>
           </a:p>
@@ -667,7 +668,7 @@
           <a:p>
             <a:fld id="{CCEBD49B-BC6D-4065-97F6-E22D565E4F2F}" type="datetimeFigureOut">
               <a:rPr lang="en-US" smtClean="0"/>
-              <a:t>12/15/2020</a:t>
+              <a:t>3/7/2021</a:t>
             </a:fld>
             <a:endParaRPr lang="en-US"/>
           </a:p>
@@ -865,7 +866,7 @@
           <a:p>
             <a:fld id="{CCEBD49B-BC6D-4065-97F6-E22D565E4F2F}" type="datetimeFigureOut">
               <a:rPr lang="en-US" smtClean="0"/>
-              <a:t>12/15/2020</a:t>
+              <a:t>3/7/2021</a:t>
             </a:fld>
             <a:endParaRPr lang="en-US"/>
           </a:p>
@@ -1140,7 +1141,7 @@
           <a:p>
             <a:fld id="{CCEBD49B-BC6D-4065-97F6-E22D565E4F2F}" type="datetimeFigureOut">
               <a:rPr lang="en-US" smtClean="0"/>
-              <a:t>12/15/2020</a:t>
+              <a:t>3/7/2021</a:t>
             </a:fld>
             <a:endParaRPr lang="en-US"/>
           </a:p>
@@ -1405,7 +1406,7 @@
           <a:p>
             <a:fld id="{CCEBD49B-BC6D-4065-97F6-E22D565E4F2F}" type="datetimeFigureOut">
               <a:rPr lang="en-US" smtClean="0"/>
-              <a:t>12/15/2020</a:t>
+              <a:t>3/7/2021</a:t>
             </a:fld>
             <a:endParaRPr lang="en-US"/>
           </a:p>
@@ -1817,7 +1818,7 @@
           <a:p>
             <a:fld id="{CCEBD49B-BC6D-4065-97F6-E22D565E4F2F}" type="datetimeFigureOut">
               <a:rPr lang="en-US" smtClean="0"/>
-              <a:t>12/15/2020</a:t>
+              <a:t>3/7/2021</a:t>
             </a:fld>
             <a:endParaRPr lang="en-US"/>
           </a:p>
@@ -1958,7 +1959,7 @@
           <a:p>
             <a:fld id="{CCEBD49B-BC6D-4065-97F6-E22D565E4F2F}" type="datetimeFigureOut">
               <a:rPr lang="en-US" smtClean="0"/>
-              <a:t>12/15/2020</a:t>
+              <a:t>3/7/2021</a:t>
             </a:fld>
             <a:endParaRPr lang="en-US"/>
           </a:p>
@@ -2071,7 +2072,7 @@
           <a:p>
             <a:fld id="{CCEBD49B-BC6D-4065-97F6-E22D565E4F2F}" type="datetimeFigureOut">
               <a:rPr lang="en-US" smtClean="0"/>
-              <a:t>12/15/2020</a:t>
+              <a:t>3/7/2021</a:t>
             </a:fld>
             <a:endParaRPr lang="en-US"/>
           </a:p>
@@ -2382,7 +2383,7 @@
           <a:p>
             <a:fld id="{CCEBD49B-BC6D-4065-97F6-E22D565E4F2F}" type="datetimeFigureOut">
               <a:rPr lang="en-US" smtClean="0"/>
-              <a:t>12/15/2020</a:t>
+              <a:t>3/7/2021</a:t>
             </a:fld>
             <a:endParaRPr lang="en-US"/>
           </a:p>
@@ -2670,7 +2671,7 @@
           <a:p>
             <a:fld id="{CCEBD49B-BC6D-4065-97F6-E22D565E4F2F}" type="datetimeFigureOut">
               <a:rPr lang="en-US" smtClean="0"/>
-              <a:t>12/15/2020</a:t>
+              <a:t>3/7/2021</a:t>
             </a:fld>
             <a:endParaRPr lang="en-US"/>
           </a:p>
@@ -2911,7 +2912,7 @@
           <a:p>
             <a:fld id="{CCEBD49B-BC6D-4065-97F6-E22D565E4F2F}" type="datetimeFigureOut">
               <a:rPr lang="en-US" smtClean="0"/>
-              <a:t>12/15/2020</a:t>
+              <a:t>3/7/2021</a:t>
             </a:fld>
             <a:endParaRPr lang="en-US"/>
           </a:p>
@@ -4555,10 +4556,1944 @@
           </a:p>
         </p:txBody>
       </p:sp>
+      <p:sp>
+        <p:nvSpPr>
+          <p:cNvPr id="2" name="Rectangle 1">
+            <a:extLst>
+              <a:ext uri="{FF2B5EF4-FFF2-40B4-BE49-F238E27FC236}">
+                <a16:creationId xmlns:a16="http://schemas.microsoft.com/office/drawing/2014/main" id="{376914B4-30E5-4C02-82CB-19562C923CBC}"/>
+              </a:ext>
+            </a:extLst>
+          </p:cNvPr>
+          <p:cNvSpPr/>
+          <p:nvPr/>
+        </p:nvSpPr>
+        <p:spPr>
+          <a:xfrm>
+            <a:off x="5432425" y="3244850"/>
+            <a:ext cx="1327150" cy="368300"/>
+          </a:xfrm>
+          <a:prstGeom prst="rect">
+            <a:avLst/>
+          </a:prstGeom>
+        </p:spPr>
+        <p:txBody>
+          <a:bodyPr wrap="none">
+            <a:spAutoFit/>
+          </a:bodyPr>
+          <a:lstStyle/>
+          <a:p>
+            <a:r>
+              <a:rPr lang="en-US" dirty="0">
+                <a:solidFill>
+                  <a:srgbClr val="000000"/>
+                </a:solidFill>
+                <a:latin typeface="Calibri" panose="020F0502020204030204" pitchFamily="34" charset="0"/>
+              </a:rPr>
+              <a:t>FHIR-28299</a:t>
+            </a:r>
+            <a:r>
+              <a:rPr lang="en-US" dirty="0"/>
+              <a:t> </a:t>
+            </a:r>
+          </a:p>
+        </p:txBody>
+      </p:sp>
+      <p:sp>
+        <p:nvSpPr>
+          <p:cNvPr id="4" name="Rectangle 3">
+            <a:extLst>
+              <a:ext uri="{FF2B5EF4-FFF2-40B4-BE49-F238E27FC236}">
+                <a16:creationId xmlns:a16="http://schemas.microsoft.com/office/drawing/2014/main" id="{9F0485C2-256E-4327-ADE8-1542C56E30CE}"/>
+              </a:ext>
+            </a:extLst>
+          </p:cNvPr>
+          <p:cNvSpPr/>
+          <p:nvPr/>
+        </p:nvSpPr>
+        <p:spPr>
+          <a:xfrm>
+            <a:off x="5432425" y="3244850"/>
+            <a:ext cx="1327150" cy="368300"/>
+          </a:xfrm>
+          <a:prstGeom prst="rect">
+            <a:avLst/>
+          </a:prstGeom>
+        </p:spPr>
+        <p:txBody>
+          <a:bodyPr wrap="none">
+            <a:spAutoFit/>
+          </a:bodyPr>
+          <a:lstStyle/>
+          <a:p>
+            <a:r>
+              <a:rPr lang="en-US" dirty="0">
+                <a:solidFill>
+                  <a:srgbClr val="000000"/>
+                </a:solidFill>
+                <a:latin typeface="Calibri" panose="020F0502020204030204" pitchFamily="34" charset="0"/>
+              </a:rPr>
+              <a:t>FHIR-28299</a:t>
+            </a:r>
+            <a:r>
+              <a:rPr lang="en-US" dirty="0"/>
+              <a:t> </a:t>
+            </a:r>
+          </a:p>
+        </p:txBody>
+      </p:sp>
     </p:spTree>
     <p:extLst>
       <p:ext uri="{BB962C8B-B14F-4D97-AF65-F5344CB8AC3E}">
         <p14:creationId xmlns:p14="http://schemas.microsoft.com/office/powerpoint/2010/main" val="2695717071"/>
+      </p:ext>
+    </p:extLst>
+  </p:cSld>
+  <p:clrMapOvr>
+    <a:masterClrMapping/>
+  </p:clrMapOvr>
+</p:sld>
+</file>
+
+<file path=ppt/slides/slide4.xml><?xml version="1.0" encoding="utf-8"?>
+<p:sld xmlns:a="http://schemas.openxmlformats.org/drawingml/2006/main" xmlns:r="http://schemas.openxmlformats.org/officeDocument/2006/relationships" xmlns:p="http://schemas.openxmlformats.org/presentationml/2006/main">
+  <p:cSld>
+    <p:spTree>
+      <p:nvGrpSpPr>
+        <p:cNvPr id="1" name=""/>
+        <p:cNvGrpSpPr/>
+        <p:nvPr/>
+      </p:nvGrpSpPr>
+      <p:grpSpPr>
+        <a:xfrm>
+          <a:off x="0" y="0"/>
+          <a:ext cx="0" cy="0"/>
+          <a:chOff x="0" y="0"/>
+          <a:chExt cx="0" cy="0"/>
+        </a:xfrm>
+      </p:grpSpPr>
+      <p:sp>
+        <p:nvSpPr>
+          <p:cNvPr id="173" name="TextBox 172">
+            <a:extLst>
+              <a:ext uri="{FF2B5EF4-FFF2-40B4-BE49-F238E27FC236}">
+                <a16:creationId xmlns:a16="http://schemas.microsoft.com/office/drawing/2014/main" id="{B9C1C471-DB5F-48E8-887C-88A5C9B7C936}"/>
+              </a:ext>
+            </a:extLst>
+          </p:cNvPr>
+          <p:cNvSpPr txBox="1"/>
+          <p:nvPr/>
+        </p:nvSpPr>
+        <p:spPr>
+          <a:xfrm>
+            <a:off x="8573464" y="5479177"/>
+            <a:ext cx="1200459" cy="230832"/>
+          </a:xfrm>
+          <a:prstGeom prst="rect">
+            <a:avLst/>
+          </a:prstGeom>
+          <a:solidFill>
+            <a:schemeClr val="bg1"/>
+          </a:solidFill>
+        </p:spPr>
+        <p:txBody>
+          <a:bodyPr wrap="square" rtlCol="0">
+            <a:spAutoFit/>
+          </a:bodyPr>
+          <a:lstStyle/>
+          <a:p>
+            <a:r>
+              <a:rPr lang="en-US" sz="900" b="1" dirty="0" err="1"/>
+              <a:t>evaluatedResources</a:t>
+            </a:r>
+            <a:endParaRPr lang="en-US" sz="900" b="1" dirty="0"/>
+          </a:p>
+        </p:txBody>
+      </p:sp>
+      <p:sp>
+        <p:nvSpPr>
+          <p:cNvPr id="177" name="TextBox 176">
+            <a:extLst>
+              <a:ext uri="{FF2B5EF4-FFF2-40B4-BE49-F238E27FC236}">
+                <a16:creationId xmlns:a16="http://schemas.microsoft.com/office/drawing/2014/main" id="{ECBEBC19-2399-4EB5-8810-02FF1ACE01D9}"/>
+              </a:ext>
+            </a:extLst>
+          </p:cNvPr>
+          <p:cNvSpPr txBox="1"/>
+          <p:nvPr/>
+        </p:nvSpPr>
+        <p:spPr>
+          <a:xfrm>
+            <a:off x="5241293" y="3696262"/>
+            <a:ext cx="573375" cy="369332"/>
+          </a:xfrm>
+          <a:prstGeom prst="rect">
+            <a:avLst/>
+          </a:prstGeom>
+          <a:solidFill>
+            <a:schemeClr val="bg1"/>
+          </a:solidFill>
+        </p:spPr>
+        <p:txBody>
+          <a:bodyPr wrap="square" rtlCol="0">
+            <a:spAutoFit/>
+          </a:bodyPr>
+          <a:lstStyle/>
+          <a:p>
+            <a:r>
+              <a:rPr lang="en-US" sz="900" b="1" u="sng" dirty="0" err="1"/>
+              <a:t>section.focus</a:t>
+            </a:r>
+            <a:endParaRPr lang="en-US" sz="900" b="1" u="sng" dirty="0"/>
+          </a:p>
+        </p:txBody>
+      </p:sp>
+      <p:sp>
+        <p:nvSpPr>
+          <p:cNvPr id="2" name="Title 1">
+            <a:extLst>
+              <a:ext uri="{FF2B5EF4-FFF2-40B4-BE49-F238E27FC236}">
+                <a16:creationId xmlns:a16="http://schemas.microsoft.com/office/drawing/2014/main" id="{66FC9293-5253-4045-B6FF-0BF8D01B1EC4}"/>
+              </a:ext>
+            </a:extLst>
+          </p:cNvPr>
+          <p:cNvSpPr>
+            <a:spLocks noGrp="1"/>
+          </p:cNvSpPr>
+          <p:nvPr>
+            <p:ph type="title"/>
+          </p:nvPr>
+        </p:nvSpPr>
+        <p:spPr/>
+        <p:txBody>
+          <a:bodyPr/>
+          <a:lstStyle/>
+          <a:p>
+            <a:r>
+              <a:rPr lang="en-US" dirty="0"/>
+              <a:t>Gaps in Care Resources</a:t>
+            </a:r>
+          </a:p>
+        </p:txBody>
+      </p:sp>
+      <p:sp>
+        <p:nvSpPr>
+          <p:cNvPr id="3" name="Content Placeholder 2">
+            <a:extLst>
+              <a:ext uri="{FF2B5EF4-FFF2-40B4-BE49-F238E27FC236}">
+                <a16:creationId xmlns:a16="http://schemas.microsoft.com/office/drawing/2014/main" id="{059F4AA5-BD88-4606-ACB3-39118129AFB3}"/>
+              </a:ext>
+            </a:extLst>
+          </p:cNvPr>
+          <p:cNvSpPr>
+            <a:spLocks noGrp="1"/>
+          </p:cNvSpPr>
+          <p:nvPr>
+            <p:ph idx="1"/>
+          </p:nvPr>
+        </p:nvSpPr>
+        <p:spPr>
+          <a:xfrm>
+            <a:off x="168676" y="1258338"/>
+            <a:ext cx="11185124" cy="5142461"/>
+          </a:xfrm>
+        </p:spPr>
+        <p:txBody>
+          <a:bodyPr/>
+          <a:lstStyle/>
+          <a:p>
+            <a:pPr marL="0" indent="0">
+              <a:buNone/>
+            </a:pPr>
+            <a:r>
+              <a:rPr lang="en-US" dirty="0"/>
+              <a:t>  </a:t>
+            </a:r>
+          </a:p>
+        </p:txBody>
+      </p:sp>
+      <p:sp>
+        <p:nvSpPr>
+          <p:cNvPr id="4" name="Flowchart: Process 3">
+            <a:extLst>
+              <a:ext uri="{FF2B5EF4-FFF2-40B4-BE49-F238E27FC236}">
+                <a16:creationId xmlns:a16="http://schemas.microsoft.com/office/drawing/2014/main" id="{3DEA0A30-6A6C-4FA4-B9FC-7A051391A0D6}"/>
+              </a:ext>
+            </a:extLst>
+          </p:cNvPr>
+          <p:cNvSpPr/>
+          <p:nvPr/>
+        </p:nvSpPr>
+        <p:spPr>
+          <a:xfrm>
+            <a:off x="3252043" y="3520952"/>
+            <a:ext cx="1864311" cy="776860"/>
+          </a:xfrm>
+          <a:prstGeom prst="flowChartProcess">
+            <a:avLst/>
+          </a:prstGeom>
+          <a:ln>
+            <a:solidFill>
+              <a:schemeClr val="tx1"/>
+            </a:solidFill>
+          </a:ln>
+        </p:spPr>
+        <p:style>
+          <a:lnRef idx="2">
+            <a:schemeClr val="accent1">
+              <a:shade val="50000"/>
+            </a:schemeClr>
+          </a:lnRef>
+          <a:fillRef idx="1">
+            <a:schemeClr val="accent1"/>
+          </a:fillRef>
+          <a:effectRef idx="0">
+            <a:schemeClr val="accent1"/>
+          </a:effectRef>
+          <a:fontRef idx="minor">
+            <a:schemeClr val="lt1"/>
+          </a:fontRef>
+        </p:style>
+        <p:txBody>
+          <a:bodyPr rtlCol="0" anchor="ctr"/>
+          <a:lstStyle/>
+          <a:p>
+            <a:pPr algn="ctr"/>
+            <a:r>
+              <a:rPr lang="en-US" sz="1600" dirty="0"/>
+              <a:t>GIC Composition</a:t>
+            </a:r>
+          </a:p>
+        </p:txBody>
+      </p:sp>
+      <p:sp>
+        <p:nvSpPr>
+          <p:cNvPr id="5" name="Flowchart: Process 4">
+            <a:extLst>
+              <a:ext uri="{FF2B5EF4-FFF2-40B4-BE49-F238E27FC236}">
+                <a16:creationId xmlns:a16="http://schemas.microsoft.com/office/drawing/2014/main" id="{B7A7E221-C938-4426-AA48-B09EFF0C8A7E}"/>
+              </a:ext>
+            </a:extLst>
+          </p:cNvPr>
+          <p:cNvSpPr/>
+          <p:nvPr/>
+        </p:nvSpPr>
+        <p:spPr>
+          <a:xfrm>
+            <a:off x="3248552" y="1646804"/>
+            <a:ext cx="1864311" cy="795922"/>
+          </a:xfrm>
+          <a:prstGeom prst="flowChartProcess">
+            <a:avLst/>
+          </a:prstGeom>
+          <a:ln>
+            <a:solidFill>
+              <a:schemeClr val="tx1"/>
+            </a:solidFill>
+          </a:ln>
+        </p:spPr>
+        <p:style>
+          <a:lnRef idx="2">
+            <a:schemeClr val="accent1">
+              <a:shade val="50000"/>
+            </a:schemeClr>
+          </a:lnRef>
+          <a:fillRef idx="1">
+            <a:schemeClr val="accent1"/>
+          </a:fillRef>
+          <a:effectRef idx="0">
+            <a:schemeClr val="accent1"/>
+          </a:effectRef>
+          <a:fontRef idx="minor">
+            <a:schemeClr val="lt1"/>
+          </a:fontRef>
+        </p:style>
+        <p:txBody>
+          <a:bodyPr rtlCol="0" anchor="ctr"/>
+          <a:lstStyle/>
+          <a:p>
+            <a:pPr algn="ctr"/>
+            <a:r>
+              <a:rPr lang="en-US" sz="1600" dirty="0"/>
+              <a:t>GIC Bundle</a:t>
+            </a:r>
+          </a:p>
+        </p:txBody>
+      </p:sp>
+      <p:sp>
+        <p:nvSpPr>
+          <p:cNvPr id="7" name="Flowchart: Process 6">
+            <a:extLst>
+              <a:ext uri="{FF2B5EF4-FFF2-40B4-BE49-F238E27FC236}">
+                <a16:creationId xmlns:a16="http://schemas.microsoft.com/office/drawing/2014/main" id="{C91FCB4F-F2B6-436E-9248-D1FB7A9503A1}"/>
+              </a:ext>
+            </a:extLst>
+          </p:cNvPr>
+          <p:cNvSpPr/>
+          <p:nvPr/>
+        </p:nvSpPr>
+        <p:spPr>
+          <a:xfrm>
+            <a:off x="6512983" y="5316815"/>
+            <a:ext cx="1864311" cy="776860"/>
+          </a:xfrm>
+          <a:prstGeom prst="flowChartProcess">
+            <a:avLst/>
+          </a:prstGeom>
+          <a:ln>
+            <a:solidFill>
+              <a:schemeClr val="tx1"/>
+            </a:solidFill>
+          </a:ln>
+        </p:spPr>
+        <p:style>
+          <a:lnRef idx="2">
+            <a:schemeClr val="accent1">
+              <a:shade val="50000"/>
+            </a:schemeClr>
+          </a:lnRef>
+          <a:fillRef idx="1">
+            <a:schemeClr val="accent1"/>
+          </a:fillRef>
+          <a:effectRef idx="0">
+            <a:schemeClr val="accent1"/>
+          </a:effectRef>
+          <a:fontRef idx="minor">
+            <a:schemeClr val="lt1"/>
+          </a:fontRef>
+        </p:style>
+        <p:txBody>
+          <a:bodyPr rtlCol="0" anchor="ctr"/>
+          <a:lstStyle/>
+          <a:p>
+            <a:pPr algn="ctr"/>
+            <a:r>
+              <a:rPr lang="en-US" sz="1600" dirty="0"/>
+              <a:t>GIC Measure Report  </a:t>
+            </a:r>
+            <a:r>
+              <a:rPr lang="en-US" sz="1000" dirty="0"/>
+              <a:t>Colorectal Cancer Screening</a:t>
+            </a:r>
+          </a:p>
+          <a:p>
+            <a:pPr algn="ctr"/>
+            <a:r>
+              <a:rPr lang="en-US" sz="1000" dirty="0"/>
+              <a:t>Closed Gap</a:t>
+            </a:r>
+          </a:p>
+        </p:txBody>
+      </p:sp>
+      <p:sp>
+        <p:nvSpPr>
+          <p:cNvPr id="12" name="Flowchart: Process 11">
+            <a:extLst>
+              <a:ext uri="{FF2B5EF4-FFF2-40B4-BE49-F238E27FC236}">
+                <a16:creationId xmlns:a16="http://schemas.microsoft.com/office/drawing/2014/main" id="{C7500F27-C043-4884-B858-531EC9938AD3}"/>
+              </a:ext>
+            </a:extLst>
+          </p:cNvPr>
+          <p:cNvSpPr/>
+          <p:nvPr/>
+        </p:nvSpPr>
+        <p:spPr>
+          <a:xfrm>
+            <a:off x="6512985" y="1664318"/>
+            <a:ext cx="1864311" cy="776860"/>
+          </a:xfrm>
+          <a:prstGeom prst="flowChartProcess">
+            <a:avLst/>
+          </a:prstGeom>
+          <a:ln>
+            <a:solidFill>
+              <a:schemeClr val="tx1"/>
+            </a:solidFill>
+          </a:ln>
+        </p:spPr>
+        <p:style>
+          <a:lnRef idx="2">
+            <a:schemeClr val="accent1">
+              <a:shade val="50000"/>
+            </a:schemeClr>
+          </a:lnRef>
+          <a:fillRef idx="1">
+            <a:schemeClr val="accent1"/>
+          </a:fillRef>
+          <a:effectRef idx="0">
+            <a:schemeClr val="accent1"/>
+          </a:effectRef>
+          <a:fontRef idx="minor">
+            <a:schemeClr val="lt1"/>
+          </a:fontRef>
+        </p:style>
+        <p:txBody>
+          <a:bodyPr rtlCol="0" anchor="ctr"/>
+          <a:lstStyle/>
+          <a:p>
+            <a:pPr algn="ctr"/>
+            <a:r>
+              <a:rPr lang="en-US" sz="1600" dirty="0"/>
+              <a:t>GIC Measure Report  </a:t>
+            </a:r>
+            <a:r>
+              <a:rPr lang="en-US" sz="1000" dirty="0"/>
+              <a:t>Pneumococcal Flu Vaccine</a:t>
+            </a:r>
+          </a:p>
+          <a:p>
+            <a:pPr algn="ctr"/>
+            <a:r>
+              <a:rPr lang="en-US" sz="1000" dirty="0"/>
+              <a:t>Open Gap</a:t>
+            </a:r>
+            <a:endParaRPr lang="en-US" sz="1600" dirty="0"/>
+          </a:p>
+        </p:txBody>
+      </p:sp>
+      <p:sp>
+        <p:nvSpPr>
+          <p:cNvPr id="13" name="Flowchart: Process 12">
+            <a:extLst>
+              <a:ext uri="{FF2B5EF4-FFF2-40B4-BE49-F238E27FC236}">
+                <a16:creationId xmlns:a16="http://schemas.microsoft.com/office/drawing/2014/main" id="{7C494011-9B4B-4108-B2F1-32F5A7D22803}"/>
+              </a:ext>
+            </a:extLst>
+          </p:cNvPr>
+          <p:cNvSpPr/>
+          <p:nvPr/>
+        </p:nvSpPr>
+        <p:spPr>
+          <a:xfrm>
+            <a:off x="596938" y="3518748"/>
+            <a:ext cx="1864311" cy="795922"/>
+          </a:xfrm>
+          <a:prstGeom prst="flowChartProcess">
+            <a:avLst/>
+          </a:prstGeom>
+          <a:ln>
+            <a:solidFill>
+              <a:schemeClr val="tx1"/>
+            </a:solidFill>
+          </a:ln>
+        </p:spPr>
+        <p:style>
+          <a:lnRef idx="2">
+            <a:schemeClr val="accent1">
+              <a:shade val="50000"/>
+            </a:schemeClr>
+          </a:lnRef>
+          <a:fillRef idx="1">
+            <a:schemeClr val="accent1"/>
+          </a:fillRef>
+          <a:effectRef idx="0">
+            <a:schemeClr val="accent1"/>
+          </a:effectRef>
+          <a:fontRef idx="minor">
+            <a:schemeClr val="lt1"/>
+          </a:fontRef>
+        </p:style>
+        <p:txBody>
+          <a:bodyPr rtlCol="0" anchor="ctr"/>
+          <a:lstStyle/>
+          <a:p>
+            <a:pPr algn="ctr"/>
+            <a:r>
+              <a:rPr lang="en-US" sz="1600" dirty="0"/>
+              <a:t>QI Core Patient*</a:t>
+            </a:r>
+          </a:p>
+          <a:p>
+            <a:pPr algn="ctr"/>
+            <a:r>
+              <a:rPr lang="en-US" sz="900" dirty="0"/>
+              <a:t>Age 63</a:t>
+            </a:r>
+          </a:p>
+        </p:txBody>
+      </p:sp>
+      <p:sp>
+        <p:nvSpPr>
+          <p:cNvPr id="14" name="Flowchart: Process 13">
+            <a:extLst>
+              <a:ext uri="{FF2B5EF4-FFF2-40B4-BE49-F238E27FC236}">
+                <a16:creationId xmlns:a16="http://schemas.microsoft.com/office/drawing/2014/main" id="{A19CA935-C43E-4C7B-959F-7553D355F5AF}"/>
+              </a:ext>
+            </a:extLst>
+          </p:cNvPr>
+          <p:cNvSpPr/>
+          <p:nvPr/>
+        </p:nvSpPr>
+        <p:spPr>
+          <a:xfrm>
+            <a:off x="9589718" y="4652717"/>
+            <a:ext cx="1864311" cy="810333"/>
+          </a:xfrm>
+          <a:prstGeom prst="flowChartProcess">
+            <a:avLst/>
+          </a:prstGeom>
+          <a:ln>
+            <a:solidFill>
+              <a:schemeClr val="tx1"/>
+            </a:solidFill>
+          </a:ln>
+        </p:spPr>
+        <p:style>
+          <a:lnRef idx="2">
+            <a:schemeClr val="accent1">
+              <a:shade val="50000"/>
+            </a:schemeClr>
+          </a:lnRef>
+          <a:fillRef idx="1">
+            <a:schemeClr val="accent1"/>
+          </a:fillRef>
+          <a:effectRef idx="0">
+            <a:schemeClr val="accent1"/>
+          </a:effectRef>
+          <a:fontRef idx="minor">
+            <a:schemeClr val="lt1"/>
+          </a:fontRef>
+        </p:style>
+        <p:txBody>
+          <a:bodyPr rtlCol="0" anchor="ctr"/>
+          <a:lstStyle/>
+          <a:p>
+            <a:pPr algn="ctr"/>
+            <a:r>
+              <a:rPr lang="en-US" sz="1600" dirty="0"/>
+              <a:t>QI Core Procedure</a:t>
+            </a:r>
+          </a:p>
+          <a:p>
+            <a:pPr algn="ctr"/>
+            <a:r>
+              <a:rPr lang="en-US" sz="1000" dirty="0"/>
+              <a:t>Colonoscopy</a:t>
+            </a:r>
+          </a:p>
+          <a:p>
+            <a:pPr algn="ctr"/>
+            <a:r>
+              <a:rPr lang="en-US" sz="1000" dirty="0"/>
+              <a:t>9/10/2018</a:t>
+            </a:r>
+          </a:p>
+          <a:p>
+            <a:pPr algn="ctr"/>
+            <a:r>
+              <a:rPr lang="en-US" sz="1000" dirty="0"/>
+              <a:t>Numerator</a:t>
+            </a:r>
+          </a:p>
+        </p:txBody>
+      </p:sp>
+      <p:sp>
+        <p:nvSpPr>
+          <p:cNvPr id="15" name="Flowchart: Process 14">
+            <a:extLst>
+              <a:ext uri="{FF2B5EF4-FFF2-40B4-BE49-F238E27FC236}">
+                <a16:creationId xmlns:a16="http://schemas.microsoft.com/office/drawing/2014/main" id="{AAB520D8-1327-4035-B17F-8E435832F332}"/>
+              </a:ext>
+            </a:extLst>
+          </p:cNvPr>
+          <p:cNvSpPr/>
+          <p:nvPr/>
+        </p:nvSpPr>
+        <p:spPr>
+          <a:xfrm>
+            <a:off x="9608891" y="5650790"/>
+            <a:ext cx="1864310" cy="779355"/>
+          </a:xfrm>
+          <a:prstGeom prst="flowChartProcess">
+            <a:avLst/>
+          </a:prstGeom>
+          <a:ln>
+            <a:solidFill>
+              <a:schemeClr val="tx1"/>
+            </a:solidFill>
+          </a:ln>
+        </p:spPr>
+        <p:style>
+          <a:lnRef idx="2">
+            <a:schemeClr val="accent1">
+              <a:shade val="50000"/>
+            </a:schemeClr>
+          </a:lnRef>
+          <a:fillRef idx="1">
+            <a:schemeClr val="accent1"/>
+          </a:fillRef>
+          <a:effectRef idx="0">
+            <a:schemeClr val="accent1"/>
+          </a:effectRef>
+          <a:fontRef idx="minor">
+            <a:schemeClr val="lt1"/>
+          </a:fontRef>
+        </p:style>
+        <p:txBody>
+          <a:bodyPr rtlCol="0" anchor="ctr"/>
+          <a:lstStyle/>
+          <a:p>
+            <a:pPr algn="ctr"/>
+            <a:r>
+              <a:rPr lang="en-US" sz="1600" dirty="0"/>
+              <a:t>QI Lab Observation</a:t>
+            </a:r>
+          </a:p>
+          <a:p>
+            <a:pPr algn="ctr"/>
+            <a:r>
+              <a:rPr lang="en-US" sz="1000" dirty="0"/>
+              <a:t>FOBT</a:t>
+            </a:r>
+          </a:p>
+          <a:p>
+            <a:pPr algn="ctr"/>
+            <a:r>
+              <a:rPr lang="en-US" sz="1000" dirty="0"/>
+              <a:t>10/1/2019</a:t>
+            </a:r>
+          </a:p>
+          <a:p>
+            <a:pPr algn="ctr"/>
+            <a:r>
+              <a:rPr lang="en-US" sz="1000" dirty="0"/>
+              <a:t>Numerator</a:t>
+            </a:r>
+          </a:p>
+        </p:txBody>
+      </p:sp>
+      <p:sp>
+        <p:nvSpPr>
+          <p:cNvPr id="16" name="Flowchart: Process 15">
+            <a:extLst>
+              <a:ext uri="{FF2B5EF4-FFF2-40B4-BE49-F238E27FC236}">
+                <a16:creationId xmlns:a16="http://schemas.microsoft.com/office/drawing/2014/main" id="{820EB801-38A6-47AA-A42B-B341458DA83D}"/>
+              </a:ext>
+            </a:extLst>
+          </p:cNvPr>
+          <p:cNvSpPr/>
+          <p:nvPr/>
+        </p:nvSpPr>
+        <p:spPr>
+          <a:xfrm>
+            <a:off x="3242456" y="5282939"/>
+            <a:ext cx="1864311" cy="747552"/>
+          </a:xfrm>
+          <a:prstGeom prst="flowChartProcess">
+            <a:avLst/>
+          </a:prstGeom>
+          <a:ln>
+            <a:solidFill>
+              <a:schemeClr val="tx1"/>
+            </a:solidFill>
+          </a:ln>
+        </p:spPr>
+        <p:style>
+          <a:lnRef idx="2">
+            <a:schemeClr val="accent1">
+              <a:shade val="50000"/>
+            </a:schemeClr>
+          </a:lnRef>
+          <a:fillRef idx="1">
+            <a:schemeClr val="accent1"/>
+          </a:fillRef>
+          <a:effectRef idx="0">
+            <a:schemeClr val="accent1"/>
+          </a:effectRef>
+          <a:fontRef idx="minor">
+            <a:schemeClr val="lt1"/>
+          </a:fontRef>
+        </p:style>
+        <p:txBody>
+          <a:bodyPr rtlCol="0" anchor="ctr"/>
+          <a:lstStyle/>
+          <a:p>
+            <a:pPr algn="ctr"/>
+            <a:r>
+              <a:rPr lang="en-US" sz="1600" dirty="0"/>
+              <a:t>QI Core Organization</a:t>
+            </a:r>
+          </a:p>
+          <a:p>
+            <a:pPr algn="ctr"/>
+            <a:r>
+              <a:rPr lang="en-US" sz="1000" dirty="0"/>
+              <a:t>(example Payer)</a:t>
+            </a:r>
+          </a:p>
+        </p:txBody>
+      </p:sp>
+      <p:sp>
+        <p:nvSpPr>
+          <p:cNvPr id="19" name="Flowchart: Process 18">
+            <a:extLst>
+              <a:ext uri="{FF2B5EF4-FFF2-40B4-BE49-F238E27FC236}">
+                <a16:creationId xmlns:a16="http://schemas.microsoft.com/office/drawing/2014/main" id="{F4DCC147-F1CD-4EAF-9C73-16087FFCF623}"/>
+              </a:ext>
+            </a:extLst>
+          </p:cNvPr>
+          <p:cNvSpPr/>
+          <p:nvPr/>
+        </p:nvSpPr>
+        <p:spPr>
+          <a:xfrm>
+            <a:off x="6473895" y="3491770"/>
+            <a:ext cx="1864311" cy="747552"/>
+          </a:xfrm>
+          <a:prstGeom prst="flowChartProcess">
+            <a:avLst/>
+          </a:prstGeom>
+          <a:ln>
+            <a:solidFill>
+              <a:schemeClr val="tx1"/>
+            </a:solidFill>
+          </a:ln>
+        </p:spPr>
+        <p:style>
+          <a:lnRef idx="2">
+            <a:schemeClr val="accent1">
+              <a:shade val="50000"/>
+            </a:schemeClr>
+          </a:lnRef>
+          <a:fillRef idx="1">
+            <a:schemeClr val="accent1"/>
+          </a:fillRef>
+          <a:effectRef idx="0">
+            <a:schemeClr val="accent1"/>
+          </a:effectRef>
+          <a:fontRef idx="minor">
+            <a:schemeClr val="lt1"/>
+          </a:fontRef>
+        </p:style>
+        <p:txBody>
+          <a:bodyPr rtlCol="0" anchor="ctr"/>
+          <a:lstStyle/>
+          <a:p>
+            <a:pPr algn="ctr"/>
+            <a:r>
+              <a:rPr lang="en-US" sz="1600" dirty="0"/>
+              <a:t>GIC Measure Report  </a:t>
+            </a:r>
+            <a:r>
+              <a:rPr lang="en-US" sz="1000" dirty="0"/>
+              <a:t>Breast Cancer Screening</a:t>
+            </a:r>
+          </a:p>
+          <a:p>
+            <a:pPr algn="ctr"/>
+            <a:r>
+              <a:rPr lang="en-US" sz="1000" dirty="0"/>
+              <a:t>Closed Gap</a:t>
+            </a:r>
+            <a:endParaRPr lang="en-US" sz="1600" dirty="0"/>
+          </a:p>
+        </p:txBody>
+      </p:sp>
+      <p:sp>
+        <p:nvSpPr>
+          <p:cNvPr id="20" name="Oval 19">
+            <a:extLst>
+              <a:ext uri="{FF2B5EF4-FFF2-40B4-BE49-F238E27FC236}">
+                <a16:creationId xmlns:a16="http://schemas.microsoft.com/office/drawing/2014/main" id="{861DB9DC-D22B-48E0-8C9B-C862EBB7828B}"/>
+              </a:ext>
+            </a:extLst>
+          </p:cNvPr>
+          <p:cNvSpPr/>
+          <p:nvPr/>
+        </p:nvSpPr>
+        <p:spPr>
+          <a:xfrm>
+            <a:off x="9368465" y="1533622"/>
+            <a:ext cx="1956427" cy="962358"/>
+          </a:xfrm>
+          <a:prstGeom prst="ellipse">
+            <a:avLst/>
+          </a:prstGeom>
+          <a:solidFill>
+            <a:schemeClr val="accent1">
+              <a:lumMod val="20000"/>
+              <a:lumOff val="80000"/>
+            </a:schemeClr>
+          </a:solidFill>
+        </p:spPr>
+        <p:style>
+          <a:lnRef idx="2">
+            <a:schemeClr val="accent1">
+              <a:shade val="50000"/>
+            </a:schemeClr>
+          </a:lnRef>
+          <a:fillRef idx="1">
+            <a:schemeClr val="accent1"/>
+          </a:fillRef>
+          <a:effectRef idx="0">
+            <a:schemeClr val="accent1"/>
+          </a:effectRef>
+          <a:fontRef idx="minor">
+            <a:schemeClr val="lt1"/>
+          </a:fontRef>
+        </p:style>
+        <p:txBody>
+          <a:bodyPr rtlCol="0" anchor="ctr"/>
+          <a:lstStyle/>
+          <a:p>
+            <a:pPr algn="ctr"/>
+            <a:r>
+              <a:rPr lang="en-US" sz="900" dirty="0">
+                <a:solidFill>
+                  <a:schemeClr val="tx1"/>
+                </a:solidFill>
+              </a:rPr>
+              <a:t>Note no data in Server’s system for this patient and measure so no resources returned</a:t>
+            </a:r>
+          </a:p>
+        </p:txBody>
+      </p:sp>
+      <p:cxnSp>
+        <p:nvCxnSpPr>
+          <p:cNvPr id="22" name="Straight Arrow Connector 21">
+            <a:extLst>
+              <a:ext uri="{FF2B5EF4-FFF2-40B4-BE49-F238E27FC236}">
+                <a16:creationId xmlns:a16="http://schemas.microsoft.com/office/drawing/2014/main" id="{4B41447D-68B5-4C39-B3CC-B31F7134DC48}"/>
+              </a:ext>
+            </a:extLst>
+          </p:cNvPr>
+          <p:cNvCxnSpPr>
+            <a:cxnSpLocks/>
+            <a:stCxn id="5" idx="2"/>
+            <a:endCxn id="4" idx="0"/>
+          </p:cNvCxnSpPr>
+          <p:nvPr/>
+        </p:nvCxnSpPr>
+        <p:spPr>
+          <a:xfrm>
+            <a:off x="4180708" y="2442726"/>
+            <a:ext cx="3491" cy="1078226"/>
+          </a:xfrm>
+          <a:prstGeom prst="straightConnector1">
+            <a:avLst/>
+          </a:prstGeom>
+          <a:ln>
+            <a:tailEnd type="triangle"/>
+          </a:ln>
+        </p:spPr>
+        <p:style>
+          <a:lnRef idx="1">
+            <a:schemeClr val="accent1"/>
+          </a:lnRef>
+          <a:fillRef idx="0">
+            <a:schemeClr val="accent1"/>
+          </a:fillRef>
+          <a:effectRef idx="0">
+            <a:schemeClr val="accent1"/>
+          </a:effectRef>
+          <a:fontRef idx="minor">
+            <a:schemeClr val="tx1"/>
+          </a:fontRef>
+        </p:style>
+      </p:cxnSp>
+      <p:cxnSp>
+        <p:nvCxnSpPr>
+          <p:cNvPr id="24" name="Straight Arrow Connector 23">
+            <a:extLst>
+              <a:ext uri="{FF2B5EF4-FFF2-40B4-BE49-F238E27FC236}">
+                <a16:creationId xmlns:a16="http://schemas.microsoft.com/office/drawing/2014/main" id="{8464D613-60CE-4D58-A3FC-5904161E60D2}"/>
+              </a:ext>
+            </a:extLst>
+          </p:cNvPr>
+          <p:cNvCxnSpPr>
+            <a:cxnSpLocks/>
+            <a:stCxn id="4" idx="3"/>
+            <a:endCxn id="7" idx="1"/>
+          </p:cNvCxnSpPr>
+          <p:nvPr/>
+        </p:nvCxnSpPr>
+        <p:spPr>
+          <a:xfrm>
+            <a:off x="5116354" y="3909382"/>
+            <a:ext cx="1396629" cy="1795863"/>
+          </a:xfrm>
+          <a:prstGeom prst="straightConnector1">
+            <a:avLst/>
+          </a:prstGeom>
+          <a:ln>
+            <a:tailEnd type="triangle"/>
+          </a:ln>
+        </p:spPr>
+        <p:style>
+          <a:lnRef idx="1">
+            <a:schemeClr val="accent1"/>
+          </a:lnRef>
+          <a:fillRef idx="0">
+            <a:schemeClr val="accent1"/>
+          </a:fillRef>
+          <a:effectRef idx="0">
+            <a:schemeClr val="accent1"/>
+          </a:effectRef>
+          <a:fontRef idx="minor">
+            <a:schemeClr val="tx1"/>
+          </a:fontRef>
+        </p:style>
+      </p:cxnSp>
+      <p:sp>
+        <p:nvSpPr>
+          <p:cNvPr id="28" name="Flowchart: Process 27">
+            <a:extLst>
+              <a:ext uri="{FF2B5EF4-FFF2-40B4-BE49-F238E27FC236}">
+                <a16:creationId xmlns:a16="http://schemas.microsoft.com/office/drawing/2014/main" id="{2555D1CD-2F4B-4CC0-B94D-2ED0919C3F39}"/>
+              </a:ext>
+            </a:extLst>
+          </p:cNvPr>
+          <p:cNvSpPr/>
+          <p:nvPr/>
+        </p:nvSpPr>
+        <p:spPr>
+          <a:xfrm>
+            <a:off x="9585318" y="3458081"/>
+            <a:ext cx="1864311" cy="776860"/>
+          </a:xfrm>
+          <a:prstGeom prst="flowChartProcess">
+            <a:avLst/>
+          </a:prstGeom>
+          <a:ln>
+            <a:solidFill>
+              <a:schemeClr val="tx1"/>
+            </a:solidFill>
+          </a:ln>
+        </p:spPr>
+        <p:style>
+          <a:lnRef idx="2">
+            <a:schemeClr val="accent1">
+              <a:shade val="50000"/>
+            </a:schemeClr>
+          </a:lnRef>
+          <a:fillRef idx="1">
+            <a:schemeClr val="accent1"/>
+          </a:fillRef>
+          <a:effectRef idx="0">
+            <a:schemeClr val="accent1"/>
+          </a:effectRef>
+          <a:fontRef idx="minor">
+            <a:schemeClr val="lt1"/>
+          </a:fontRef>
+        </p:style>
+        <p:txBody>
+          <a:bodyPr rtlCol="0" anchor="ctr"/>
+          <a:lstStyle/>
+          <a:p>
+            <a:pPr algn="ctr"/>
+            <a:r>
+              <a:rPr lang="en-US" sz="1600" dirty="0"/>
+              <a:t>QI Core Procedure</a:t>
+            </a:r>
+          </a:p>
+          <a:p>
+            <a:pPr algn="ctr"/>
+            <a:r>
+              <a:rPr lang="en-US" sz="1000" dirty="0"/>
+              <a:t>Bilateral Mastectomy</a:t>
+            </a:r>
+          </a:p>
+          <a:p>
+            <a:pPr algn="ctr"/>
+            <a:r>
+              <a:rPr lang="en-US" sz="1000" dirty="0"/>
+              <a:t>8/2/2010</a:t>
+            </a:r>
+          </a:p>
+          <a:p>
+            <a:pPr algn="ctr"/>
+            <a:r>
+              <a:rPr lang="en-US" sz="1000" dirty="0"/>
+              <a:t>Denominator Exclusion</a:t>
+            </a:r>
+            <a:endParaRPr lang="en-US" sz="1600" dirty="0"/>
+          </a:p>
+        </p:txBody>
+      </p:sp>
+      <p:cxnSp>
+        <p:nvCxnSpPr>
+          <p:cNvPr id="32" name="Straight Arrow Connector 31">
+            <a:extLst>
+              <a:ext uri="{FF2B5EF4-FFF2-40B4-BE49-F238E27FC236}">
+                <a16:creationId xmlns:a16="http://schemas.microsoft.com/office/drawing/2014/main" id="{CDEBDC5A-F99E-4A15-AA65-F4C1D38FD6EE}"/>
+              </a:ext>
+            </a:extLst>
+          </p:cNvPr>
+          <p:cNvCxnSpPr>
+            <a:cxnSpLocks/>
+            <a:stCxn id="4" idx="3"/>
+            <a:endCxn id="12" idx="1"/>
+          </p:cNvCxnSpPr>
+          <p:nvPr/>
+        </p:nvCxnSpPr>
+        <p:spPr>
+          <a:xfrm flipV="1">
+            <a:off x="5116354" y="2052748"/>
+            <a:ext cx="1396631" cy="1856634"/>
+          </a:xfrm>
+          <a:prstGeom prst="straightConnector1">
+            <a:avLst/>
+          </a:prstGeom>
+          <a:ln>
+            <a:tailEnd type="triangle"/>
+          </a:ln>
+        </p:spPr>
+        <p:style>
+          <a:lnRef idx="1">
+            <a:schemeClr val="accent1"/>
+          </a:lnRef>
+          <a:fillRef idx="0">
+            <a:schemeClr val="accent1"/>
+          </a:fillRef>
+          <a:effectRef idx="0">
+            <a:schemeClr val="accent1"/>
+          </a:effectRef>
+          <a:fontRef idx="minor">
+            <a:schemeClr val="tx1"/>
+          </a:fontRef>
+        </p:style>
+      </p:cxnSp>
+      <p:cxnSp>
+        <p:nvCxnSpPr>
+          <p:cNvPr id="35" name="Straight Arrow Connector 34">
+            <a:extLst>
+              <a:ext uri="{FF2B5EF4-FFF2-40B4-BE49-F238E27FC236}">
+                <a16:creationId xmlns:a16="http://schemas.microsoft.com/office/drawing/2014/main" id="{AAA7B3DF-9DB0-4B96-BD97-21C858567EE1}"/>
+              </a:ext>
+            </a:extLst>
+          </p:cNvPr>
+          <p:cNvCxnSpPr>
+            <a:cxnSpLocks/>
+            <a:stCxn id="4" idx="3"/>
+            <a:endCxn id="19" idx="1"/>
+          </p:cNvCxnSpPr>
+          <p:nvPr/>
+        </p:nvCxnSpPr>
+        <p:spPr>
+          <a:xfrm flipV="1">
+            <a:off x="5116354" y="3865546"/>
+            <a:ext cx="1357541" cy="43836"/>
+          </a:xfrm>
+          <a:prstGeom prst="straightConnector1">
+            <a:avLst/>
+          </a:prstGeom>
+          <a:ln>
+            <a:tailEnd type="triangle"/>
+          </a:ln>
+        </p:spPr>
+        <p:style>
+          <a:lnRef idx="1">
+            <a:schemeClr val="accent1"/>
+          </a:lnRef>
+          <a:fillRef idx="0">
+            <a:schemeClr val="accent1"/>
+          </a:fillRef>
+          <a:effectRef idx="0">
+            <a:schemeClr val="accent1"/>
+          </a:effectRef>
+          <a:fontRef idx="minor">
+            <a:schemeClr val="tx1"/>
+          </a:fontRef>
+        </p:style>
+      </p:cxnSp>
+      <p:cxnSp>
+        <p:nvCxnSpPr>
+          <p:cNvPr id="41" name="Straight Arrow Connector 40">
+            <a:extLst>
+              <a:ext uri="{FF2B5EF4-FFF2-40B4-BE49-F238E27FC236}">
+                <a16:creationId xmlns:a16="http://schemas.microsoft.com/office/drawing/2014/main" id="{5113B543-3208-4E95-AA9D-0EBC71D1833F}"/>
+              </a:ext>
+            </a:extLst>
+          </p:cNvPr>
+          <p:cNvCxnSpPr>
+            <a:cxnSpLocks/>
+            <a:stCxn id="7" idx="3"/>
+            <a:endCxn id="14" idx="1"/>
+          </p:cNvCxnSpPr>
+          <p:nvPr/>
+        </p:nvCxnSpPr>
+        <p:spPr>
+          <a:xfrm flipV="1">
+            <a:off x="8377294" y="5057884"/>
+            <a:ext cx="1212424" cy="647361"/>
+          </a:xfrm>
+          <a:prstGeom prst="straightConnector1">
+            <a:avLst/>
+          </a:prstGeom>
+          <a:ln>
+            <a:tailEnd type="triangle"/>
+          </a:ln>
+        </p:spPr>
+        <p:style>
+          <a:lnRef idx="1">
+            <a:schemeClr val="accent1"/>
+          </a:lnRef>
+          <a:fillRef idx="0">
+            <a:schemeClr val="accent1"/>
+          </a:fillRef>
+          <a:effectRef idx="0">
+            <a:schemeClr val="accent1"/>
+          </a:effectRef>
+          <a:fontRef idx="minor">
+            <a:schemeClr val="tx1"/>
+          </a:fontRef>
+        </p:style>
+      </p:cxnSp>
+      <p:cxnSp>
+        <p:nvCxnSpPr>
+          <p:cNvPr id="44" name="Straight Arrow Connector 43">
+            <a:extLst>
+              <a:ext uri="{FF2B5EF4-FFF2-40B4-BE49-F238E27FC236}">
+                <a16:creationId xmlns:a16="http://schemas.microsoft.com/office/drawing/2014/main" id="{5CF496CA-7DA1-4920-B8A9-499D311987BA}"/>
+              </a:ext>
+            </a:extLst>
+          </p:cNvPr>
+          <p:cNvCxnSpPr>
+            <a:cxnSpLocks/>
+            <a:stCxn id="7" idx="3"/>
+            <a:endCxn id="15" idx="1"/>
+          </p:cNvCxnSpPr>
+          <p:nvPr/>
+        </p:nvCxnSpPr>
+        <p:spPr>
+          <a:xfrm>
+            <a:off x="8377294" y="5705245"/>
+            <a:ext cx="1231597" cy="335223"/>
+          </a:xfrm>
+          <a:prstGeom prst="straightConnector1">
+            <a:avLst/>
+          </a:prstGeom>
+          <a:ln>
+            <a:tailEnd type="triangle"/>
+          </a:ln>
+        </p:spPr>
+        <p:style>
+          <a:lnRef idx="1">
+            <a:schemeClr val="accent1"/>
+          </a:lnRef>
+          <a:fillRef idx="0">
+            <a:schemeClr val="accent1"/>
+          </a:fillRef>
+          <a:effectRef idx="0">
+            <a:schemeClr val="accent1"/>
+          </a:effectRef>
+          <a:fontRef idx="minor">
+            <a:schemeClr val="tx1"/>
+          </a:fontRef>
+        </p:style>
+      </p:cxnSp>
+      <p:cxnSp>
+        <p:nvCxnSpPr>
+          <p:cNvPr id="47" name="Straight Arrow Connector 46">
+            <a:extLst>
+              <a:ext uri="{FF2B5EF4-FFF2-40B4-BE49-F238E27FC236}">
+                <a16:creationId xmlns:a16="http://schemas.microsoft.com/office/drawing/2014/main" id="{0F9137BA-4C1E-470D-9CE5-C3A73B892B8B}"/>
+              </a:ext>
+            </a:extLst>
+          </p:cNvPr>
+          <p:cNvCxnSpPr>
+            <a:cxnSpLocks/>
+            <a:stCxn id="19" idx="3"/>
+            <a:endCxn id="28" idx="1"/>
+          </p:cNvCxnSpPr>
+          <p:nvPr/>
+        </p:nvCxnSpPr>
+        <p:spPr>
+          <a:xfrm flipV="1">
+            <a:off x="8338206" y="3846511"/>
+            <a:ext cx="1247112" cy="19035"/>
+          </a:xfrm>
+          <a:prstGeom prst="straightConnector1">
+            <a:avLst/>
+          </a:prstGeom>
+          <a:ln>
+            <a:tailEnd type="triangle"/>
+          </a:ln>
+        </p:spPr>
+        <p:style>
+          <a:lnRef idx="1">
+            <a:schemeClr val="accent1"/>
+          </a:lnRef>
+          <a:fillRef idx="0">
+            <a:schemeClr val="accent1"/>
+          </a:fillRef>
+          <a:effectRef idx="0">
+            <a:schemeClr val="accent1"/>
+          </a:effectRef>
+          <a:fontRef idx="minor">
+            <a:schemeClr val="tx1"/>
+          </a:fontRef>
+        </p:style>
+      </p:cxnSp>
+      <p:sp>
+        <p:nvSpPr>
+          <p:cNvPr id="90" name="Flowchart: Process 89">
+            <a:extLst>
+              <a:ext uri="{FF2B5EF4-FFF2-40B4-BE49-F238E27FC236}">
+                <a16:creationId xmlns:a16="http://schemas.microsoft.com/office/drawing/2014/main" id="{7A044D70-BFF3-405C-AFEC-F728F8A25F68}"/>
+              </a:ext>
+            </a:extLst>
+          </p:cNvPr>
+          <p:cNvSpPr/>
+          <p:nvPr/>
+        </p:nvSpPr>
+        <p:spPr>
+          <a:xfrm>
+            <a:off x="593447" y="1901502"/>
+            <a:ext cx="1864311" cy="776860"/>
+          </a:xfrm>
+          <a:prstGeom prst="flowChartProcess">
+            <a:avLst/>
+          </a:prstGeom>
+          <a:ln>
+            <a:solidFill>
+              <a:schemeClr val="tx1"/>
+            </a:solidFill>
+          </a:ln>
+        </p:spPr>
+        <p:style>
+          <a:lnRef idx="2">
+            <a:schemeClr val="accent1">
+              <a:shade val="50000"/>
+            </a:schemeClr>
+          </a:lnRef>
+          <a:fillRef idx="1">
+            <a:schemeClr val="accent1"/>
+          </a:fillRef>
+          <a:effectRef idx="0">
+            <a:schemeClr val="accent1"/>
+          </a:effectRef>
+          <a:fontRef idx="minor">
+            <a:schemeClr val="lt1"/>
+          </a:fontRef>
+        </p:style>
+        <p:txBody>
+          <a:bodyPr rtlCol="0" anchor="ctr"/>
+          <a:lstStyle/>
+          <a:p>
+            <a:pPr algn="ctr"/>
+            <a:r>
+              <a:rPr lang="en-US" sz="1600" dirty="0"/>
+              <a:t>GIC Detected Issue</a:t>
+            </a:r>
+          </a:p>
+        </p:txBody>
+      </p:sp>
+      <p:cxnSp>
+        <p:nvCxnSpPr>
+          <p:cNvPr id="141" name="Straight Arrow Connector 140">
+            <a:extLst>
+              <a:ext uri="{FF2B5EF4-FFF2-40B4-BE49-F238E27FC236}">
+                <a16:creationId xmlns:a16="http://schemas.microsoft.com/office/drawing/2014/main" id="{879550D5-89BE-4FBE-82D9-CB3521CF2D58}"/>
+              </a:ext>
+            </a:extLst>
+          </p:cNvPr>
+          <p:cNvCxnSpPr>
+            <a:cxnSpLocks/>
+            <a:stCxn id="4" idx="2"/>
+            <a:endCxn id="16" idx="0"/>
+          </p:cNvCxnSpPr>
+          <p:nvPr/>
+        </p:nvCxnSpPr>
+        <p:spPr>
+          <a:xfrm flipH="1">
+            <a:off x="4174612" y="4297812"/>
+            <a:ext cx="9587" cy="985127"/>
+          </a:xfrm>
+          <a:prstGeom prst="straightConnector1">
+            <a:avLst/>
+          </a:prstGeom>
+          <a:ln>
+            <a:tailEnd type="triangle"/>
+          </a:ln>
+        </p:spPr>
+        <p:style>
+          <a:lnRef idx="1">
+            <a:schemeClr val="accent1"/>
+          </a:lnRef>
+          <a:fillRef idx="0">
+            <a:schemeClr val="accent1"/>
+          </a:fillRef>
+          <a:effectRef idx="0">
+            <a:schemeClr val="accent1"/>
+          </a:effectRef>
+          <a:fontRef idx="minor">
+            <a:schemeClr val="tx1"/>
+          </a:fontRef>
+        </p:style>
+      </p:cxnSp>
+      <p:cxnSp>
+        <p:nvCxnSpPr>
+          <p:cNvPr id="144" name="Straight Arrow Connector 143">
+            <a:extLst>
+              <a:ext uri="{FF2B5EF4-FFF2-40B4-BE49-F238E27FC236}">
+                <a16:creationId xmlns:a16="http://schemas.microsoft.com/office/drawing/2014/main" id="{CA185091-BF8F-45FC-9DB1-E755F7475568}"/>
+              </a:ext>
+            </a:extLst>
+          </p:cNvPr>
+          <p:cNvCxnSpPr>
+            <a:cxnSpLocks/>
+            <a:stCxn id="5" idx="3"/>
+            <a:endCxn id="12" idx="1"/>
+          </p:cNvCxnSpPr>
+          <p:nvPr/>
+        </p:nvCxnSpPr>
+        <p:spPr>
+          <a:xfrm>
+            <a:off x="5112863" y="2044765"/>
+            <a:ext cx="1400122" cy="7983"/>
+          </a:xfrm>
+          <a:prstGeom prst="straightConnector1">
+            <a:avLst/>
+          </a:prstGeom>
+          <a:ln>
+            <a:solidFill>
+              <a:schemeClr val="tx1"/>
+            </a:solidFill>
+            <a:tailEnd type="triangle"/>
+          </a:ln>
+        </p:spPr>
+        <p:style>
+          <a:lnRef idx="1">
+            <a:schemeClr val="accent1"/>
+          </a:lnRef>
+          <a:fillRef idx="0">
+            <a:schemeClr val="accent1"/>
+          </a:fillRef>
+          <a:effectRef idx="0">
+            <a:schemeClr val="accent1"/>
+          </a:effectRef>
+          <a:fontRef idx="minor">
+            <a:schemeClr val="tx1"/>
+          </a:fontRef>
+        </p:style>
+      </p:cxnSp>
+      <p:cxnSp>
+        <p:nvCxnSpPr>
+          <p:cNvPr id="147" name="Straight Arrow Connector 146">
+            <a:extLst>
+              <a:ext uri="{FF2B5EF4-FFF2-40B4-BE49-F238E27FC236}">
+                <a16:creationId xmlns:a16="http://schemas.microsoft.com/office/drawing/2014/main" id="{CAE3AF3E-4461-4BF9-AD1A-870ECDBF5C9D}"/>
+              </a:ext>
+            </a:extLst>
+          </p:cNvPr>
+          <p:cNvCxnSpPr>
+            <a:cxnSpLocks/>
+            <a:stCxn id="5" idx="3"/>
+            <a:endCxn id="7" idx="1"/>
+          </p:cNvCxnSpPr>
+          <p:nvPr/>
+        </p:nvCxnSpPr>
+        <p:spPr>
+          <a:xfrm>
+            <a:off x="5112863" y="2044765"/>
+            <a:ext cx="1400120" cy="3660480"/>
+          </a:xfrm>
+          <a:prstGeom prst="straightConnector1">
+            <a:avLst/>
+          </a:prstGeom>
+          <a:ln>
+            <a:solidFill>
+              <a:schemeClr val="tx1"/>
+            </a:solidFill>
+            <a:tailEnd type="triangle"/>
+          </a:ln>
+        </p:spPr>
+        <p:style>
+          <a:lnRef idx="1">
+            <a:schemeClr val="accent1"/>
+          </a:lnRef>
+          <a:fillRef idx="0">
+            <a:schemeClr val="accent1"/>
+          </a:fillRef>
+          <a:effectRef idx="0">
+            <a:schemeClr val="accent1"/>
+          </a:effectRef>
+          <a:fontRef idx="minor">
+            <a:schemeClr val="tx1"/>
+          </a:fontRef>
+        </p:style>
+      </p:cxnSp>
+      <p:cxnSp>
+        <p:nvCxnSpPr>
+          <p:cNvPr id="150" name="Straight Arrow Connector 149">
+            <a:extLst>
+              <a:ext uri="{FF2B5EF4-FFF2-40B4-BE49-F238E27FC236}">
+                <a16:creationId xmlns:a16="http://schemas.microsoft.com/office/drawing/2014/main" id="{B0A502EB-4FA3-419A-B0EE-C00113470861}"/>
+              </a:ext>
+            </a:extLst>
+          </p:cNvPr>
+          <p:cNvCxnSpPr>
+            <a:cxnSpLocks/>
+            <a:stCxn id="5" idx="3"/>
+            <a:endCxn id="19" idx="1"/>
+          </p:cNvCxnSpPr>
+          <p:nvPr/>
+        </p:nvCxnSpPr>
+        <p:spPr>
+          <a:xfrm>
+            <a:off x="5112863" y="2044765"/>
+            <a:ext cx="1361032" cy="1820781"/>
+          </a:xfrm>
+          <a:prstGeom prst="straightConnector1">
+            <a:avLst/>
+          </a:prstGeom>
+          <a:ln>
+            <a:solidFill>
+              <a:schemeClr val="tx1"/>
+            </a:solidFill>
+            <a:tailEnd type="triangle"/>
+          </a:ln>
+        </p:spPr>
+        <p:style>
+          <a:lnRef idx="1">
+            <a:schemeClr val="accent1"/>
+          </a:lnRef>
+          <a:fillRef idx="0">
+            <a:schemeClr val="accent1"/>
+          </a:fillRef>
+          <a:effectRef idx="0">
+            <a:schemeClr val="accent1"/>
+          </a:effectRef>
+          <a:fontRef idx="minor">
+            <a:schemeClr val="tx1"/>
+          </a:fontRef>
+        </p:style>
+      </p:cxnSp>
+      <p:cxnSp>
+        <p:nvCxnSpPr>
+          <p:cNvPr id="154" name="Straight Arrow Connector 153">
+            <a:extLst>
+              <a:ext uri="{FF2B5EF4-FFF2-40B4-BE49-F238E27FC236}">
+                <a16:creationId xmlns:a16="http://schemas.microsoft.com/office/drawing/2014/main" id="{ACE8CF9B-7ACD-48E8-BB5C-C165C6517CEC}"/>
+              </a:ext>
+            </a:extLst>
+          </p:cNvPr>
+          <p:cNvCxnSpPr>
+            <a:cxnSpLocks/>
+            <a:stCxn id="4" idx="1"/>
+            <a:endCxn id="13" idx="3"/>
+          </p:cNvCxnSpPr>
+          <p:nvPr/>
+        </p:nvCxnSpPr>
+        <p:spPr>
+          <a:xfrm flipH="1">
+            <a:off x="2461249" y="3909382"/>
+            <a:ext cx="790794" cy="7327"/>
+          </a:xfrm>
+          <a:prstGeom prst="straightConnector1">
+            <a:avLst/>
+          </a:prstGeom>
+          <a:ln>
+            <a:tailEnd type="triangle"/>
+          </a:ln>
+        </p:spPr>
+        <p:style>
+          <a:lnRef idx="1">
+            <a:schemeClr val="accent1"/>
+          </a:lnRef>
+          <a:fillRef idx="0">
+            <a:schemeClr val="accent1"/>
+          </a:fillRef>
+          <a:effectRef idx="0">
+            <a:schemeClr val="accent1"/>
+          </a:effectRef>
+          <a:fontRef idx="minor">
+            <a:schemeClr val="tx1"/>
+          </a:fontRef>
+        </p:style>
+      </p:cxnSp>
+      <p:cxnSp>
+        <p:nvCxnSpPr>
+          <p:cNvPr id="158" name="Straight Arrow Connector 157">
+            <a:extLst>
+              <a:ext uri="{FF2B5EF4-FFF2-40B4-BE49-F238E27FC236}">
+                <a16:creationId xmlns:a16="http://schemas.microsoft.com/office/drawing/2014/main" id="{8C8ABBC1-0904-4EA0-8C65-AA8BE906F756}"/>
+              </a:ext>
+            </a:extLst>
+          </p:cNvPr>
+          <p:cNvCxnSpPr>
+            <a:cxnSpLocks/>
+            <a:stCxn id="90" idx="2"/>
+            <a:endCxn id="13" idx="0"/>
+          </p:cNvCxnSpPr>
+          <p:nvPr/>
+        </p:nvCxnSpPr>
+        <p:spPr>
+          <a:xfrm>
+            <a:off x="1525603" y="2678362"/>
+            <a:ext cx="3491" cy="840386"/>
+          </a:xfrm>
+          <a:prstGeom prst="straightConnector1">
+            <a:avLst/>
+          </a:prstGeom>
+          <a:ln>
+            <a:tailEnd type="triangle"/>
+          </a:ln>
+        </p:spPr>
+        <p:style>
+          <a:lnRef idx="1">
+            <a:schemeClr val="accent1"/>
+          </a:lnRef>
+          <a:fillRef idx="0">
+            <a:schemeClr val="accent1"/>
+          </a:fillRef>
+          <a:effectRef idx="0">
+            <a:schemeClr val="accent1"/>
+          </a:effectRef>
+          <a:fontRef idx="minor">
+            <a:schemeClr val="tx1"/>
+          </a:fontRef>
+        </p:style>
+      </p:cxnSp>
+      <p:sp>
+        <p:nvSpPr>
+          <p:cNvPr id="161" name="TextBox 160">
+            <a:extLst>
+              <a:ext uri="{FF2B5EF4-FFF2-40B4-BE49-F238E27FC236}">
+                <a16:creationId xmlns:a16="http://schemas.microsoft.com/office/drawing/2014/main" id="{3EFFA89C-5A0F-43E9-8E5E-E7EFE761E46D}"/>
+              </a:ext>
+            </a:extLst>
+          </p:cNvPr>
+          <p:cNvSpPr txBox="1"/>
+          <p:nvPr/>
+        </p:nvSpPr>
+        <p:spPr>
+          <a:xfrm>
+            <a:off x="718799" y="5034569"/>
+            <a:ext cx="2075630" cy="646331"/>
+          </a:xfrm>
+          <a:prstGeom prst="rect">
+            <a:avLst/>
+          </a:prstGeom>
+          <a:noFill/>
+        </p:spPr>
+        <p:txBody>
+          <a:bodyPr wrap="square" rtlCol="0">
+            <a:spAutoFit/>
+          </a:bodyPr>
+          <a:lstStyle/>
+          <a:p>
+            <a:r>
+              <a:rPr lang="en-US" sz="900" b="1" dirty="0"/>
+              <a:t>*QI Core Patient is also pointed to by all GIC Measure Reports, QI Core Procedure, and QI Core  Lab Observations</a:t>
+            </a:r>
+          </a:p>
+        </p:txBody>
+      </p:sp>
+      <p:cxnSp>
+        <p:nvCxnSpPr>
+          <p:cNvPr id="162" name="Straight Arrow Connector 161">
+            <a:extLst>
+              <a:ext uri="{FF2B5EF4-FFF2-40B4-BE49-F238E27FC236}">
+                <a16:creationId xmlns:a16="http://schemas.microsoft.com/office/drawing/2014/main" id="{5290B5F1-CC69-4E1F-9527-F65449A6A6EC}"/>
+              </a:ext>
+            </a:extLst>
+          </p:cNvPr>
+          <p:cNvCxnSpPr>
+            <a:cxnSpLocks/>
+            <a:stCxn id="4" idx="0"/>
+            <a:endCxn id="90" idx="3"/>
+          </p:cNvCxnSpPr>
+          <p:nvPr/>
+        </p:nvCxnSpPr>
+        <p:spPr>
+          <a:xfrm flipH="1" flipV="1">
+            <a:off x="2457758" y="2289932"/>
+            <a:ext cx="1726441" cy="1231020"/>
+          </a:xfrm>
+          <a:prstGeom prst="straightConnector1">
+            <a:avLst/>
+          </a:prstGeom>
+          <a:ln>
+            <a:tailEnd type="triangle"/>
+          </a:ln>
+        </p:spPr>
+        <p:style>
+          <a:lnRef idx="1">
+            <a:schemeClr val="accent1"/>
+          </a:lnRef>
+          <a:fillRef idx="0">
+            <a:schemeClr val="accent1"/>
+          </a:fillRef>
+          <a:effectRef idx="0">
+            <a:schemeClr val="accent1"/>
+          </a:effectRef>
+          <a:fontRef idx="minor">
+            <a:schemeClr val="tx1"/>
+          </a:fontRef>
+        </p:style>
+      </p:cxnSp>
+      <p:sp>
+        <p:nvSpPr>
+          <p:cNvPr id="165" name="TextBox 164">
+            <a:extLst>
+              <a:ext uri="{FF2B5EF4-FFF2-40B4-BE49-F238E27FC236}">
+                <a16:creationId xmlns:a16="http://schemas.microsoft.com/office/drawing/2014/main" id="{8F126E68-CFBC-4650-89F4-8608C59D3052}"/>
+              </a:ext>
+            </a:extLst>
+          </p:cNvPr>
+          <p:cNvSpPr txBox="1"/>
+          <p:nvPr/>
+        </p:nvSpPr>
+        <p:spPr>
+          <a:xfrm>
+            <a:off x="2716620" y="2684407"/>
+            <a:ext cx="851536" cy="230832"/>
+          </a:xfrm>
+          <a:prstGeom prst="rect">
+            <a:avLst/>
+          </a:prstGeom>
+          <a:solidFill>
+            <a:schemeClr val="bg1"/>
+          </a:solidFill>
+        </p:spPr>
+        <p:txBody>
+          <a:bodyPr wrap="square" rtlCol="0">
+            <a:spAutoFit/>
+          </a:bodyPr>
+          <a:lstStyle/>
+          <a:p>
+            <a:r>
+              <a:rPr lang="en-US" sz="900" b="1" dirty="0" err="1"/>
+              <a:t>section.entry</a:t>
+            </a:r>
+            <a:endParaRPr lang="en-US" sz="900" b="1" dirty="0"/>
+          </a:p>
+        </p:txBody>
+      </p:sp>
+      <p:sp>
+        <p:nvSpPr>
+          <p:cNvPr id="174" name="TextBox 173">
+            <a:extLst>
+              <a:ext uri="{FF2B5EF4-FFF2-40B4-BE49-F238E27FC236}">
+                <a16:creationId xmlns:a16="http://schemas.microsoft.com/office/drawing/2014/main" id="{89984EC5-4D27-490C-94D4-8134C6A2E37D}"/>
+              </a:ext>
+            </a:extLst>
+          </p:cNvPr>
+          <p:cNvSpPr txBox="1"/>
+          <p:nvPr/>
+        </p:nvSpPr>
+        <p:spPr>
+          <a:xfrm>
+            <a:off x="1250351" y="2956726"/>
+            <a:ext cx="573375" cy="230832"/>
+          </a:xfrm>
+          <a:prstGeom prst="rect">
+            <a:avLst/>
+          </a:prstGeom>
+          <a:solidFill>
+            <a:schemeClr val="bg1"/>
+          </a:solidFill>
+        </p:spPr>
+        <p:txBody>
+          <a:bodyPr wrap="square" rtlCol="0">
+            <a:spAutoFit/>
+          </a:bodyPr>
+          <a:lstStyle/>
+          <a:p>
+            <a:r>
+              <a:rPr lang="en-US" sz="900" b="1" dirty="0"/>
+              <a:t>patient</a:t>
+            </a:r>
+          </a:p>
+        </p:txBody>
+      </p:sp>
+      <p:sp>
+        <p:nvSpPr>
+          <p:cNvPr id="175" name="TextBox 174">
+            <a:extLst>
+              <a:ext uri="{FF2B5EF4-FFF2-40B4-BE49-F238E27FC236}">
+                <a16:creationId xmlns:a16="http://schemas.microsoft.com/office/drawing/2014/main" id="{D0295861-70D2-48F2-A70D-BD6830F6561F}"/>
+              </a:ext>
+            </a:extLst>
+          </p:cNvPr>
+          <p:cNvSpPr txBox="1"/>
+          <p:nvPr/>
+        </p:nvSpPr>
+        <p:spPr>
+          <a:xfrm>
+            <a:off x="2602823" y="3782240"/>
+            <a:ext cx="573375" cy="230832"/>
+          </a:xfrm>
+          <a:prstGeom prst="rect">
+            <a:avLst/>
+          </a:prstGeom>
+          <a:solidFill>
+            <a:schemeClr val="bg1"/>
+          </a:solidFill>
+        </p:spPr>
+        <p:txBody>
+          <a:bodyPr wrap="square" rtlCol="0">
+            <a:spAutoFit/>
+          </a:bodyPr>
+          <a:lstStyle/>
+          <a:p>
+            <a:r>
+              <a:rPr lang="en-US" sz="900" b="1" dirty="0"/>
+              <a:t>subject</a:t>
+            </a:r>
+          </a:p>
+        </p:txBody>
+      </p:sp>
+      <p:sp>
+        <p:nvSpPr>
+          <p:cNvPr id="176" name="TextBox 175">
+            <a:extLst>
+              <a:ext uri="{FF2B5EF4-FFF2-40B4-BE49-F238E27FC236}">
+                <a16:creationId xmlns:a16="http://schemas.microsoft.com/office/drawing/2014/main" id="{F4254C16-5AD4-454F-B8DE-A78DB7317DD0}"/>
+              </a:ext>
+            </a:extLst>
+          </p:cNvPr>
+          <p:cNvSpPr txBox="1"/>
+          <p:nvPr/>
+        </p:nvSpPr>
+        <p:spPr>
+          <a:xfrm>
+            <a:off x="3850155" y="4568002"/>
+            <a:ext cx="798376" cy="230832"/>
+          </a:xfrm>
+          <a:prstGeom prst="rect">
+            <a:avLst/>
+          </a:prstGeom>
+          <a:solidFill>
+            <a:schemeClr val="bg1"/>
+          </a:solidFill>
+        </p:spPr>
+        <p:txBody>
+          <a:bodyPr wrap="square" rtlCol="0">
+            <a:spAutoFit/>
+          </a:bodyPr>
+          <a:lstStyle/>
+          <a:p>
+            <a:r>
+              <a:rPr lang="en-US" sz="900" b="1" dirty="0"/>
+              <a:t>custodian</a:t>
+            </a:r>
+          </a:p>
+        </p:txBody>
+      </p:sp>
+      <p:sp>
+        <p:nvSpPr>
+          <p:cNvPr id="178" name="TextBox 177">
+            <a:extLst>
+              <a:ext uri="{FF2B5EF4-FFF2-40B4-BE49-F238E27FC236}">
+                <a16:creationId xmlns:a16="http://schemas.microsoft.com/office/drawing/2014/main" id="{6DC5E373-7EFD-4CA0-9108-834DD55A204E}"/>
+              </a:ext>
+            </a:extLst>
+          </p:cNvPr>
+          <p:cNvSpPr txBox="1"/>
+          <p:nvPr/>
+        </p:nvSpPr>
+        <p:spPr>
+          <a:xfrm>
+            <a:off x="3912843" y="2797557"/>
+            <a:ext cx="573375" cy="230832"/>
+          </a:xfrm>
+          <a:prstGeom prst="rect">
+            <a:avLst/>
+          </a:prstGeom>
+          <a:solidFill>
+            <a:schemeClr val="bg1"/>
+          </a:solidFill>
+        </p:spPr>
+        <p:txBody>
+          <a:bodyPr wrap="square" rtlCol="0">
+            <a:spAutoFit/>
+          </a:bodyPr>
+          <a:lstStyle/>
+          <a:p>
+            <a:r>
+              <a:rPr lang="en-US" sz="900" b="1" dirty="0"/>
+              <a:t>entry</a:t>
+            </a:r>
+          </a:p>
+        </p:txBody>
+      </p:sp>
+      <p:sp>
+        <p:nvSpPr>
+          <p:cNvPr id="179" name="TextBox 178">
+            <a:extLst>
+              <a:ext uri="{FF2B5EF4-FFF2-40B4-BE49-F238E27FC236}">
+                <a16:creationId xmlns:a16="http://schemas.microsoft.com/office/drawing/2014/main" id="{845027ED-24A2-40DB-9553-7009A7A32891}"/>
+              </a:ext>
+            </a:extLst>
+          </p:cNvPr>
+          <p:cNvSpPr txBox="1"/>
+          <p:nvPr/>
+        </p:nvSpPr>
+        <p:spPr>
+          <a:xfrm>
+            <a:off x="5537634" y="1935547"/>
+            <a:ext cx="503893" cy="246221"/>
+          </a:xfrm>
+          <a:prstGeom prst="rect">
+            <a:avLst/>
+          </a:prstGeom>
+          <a:solidFill>
+            <a:schemeClr val="bg1"/>
+          </a:solidFill>
+        </p:spPr>
+        <p:txBody>
+          <a:bodyPr wrap="square" rtlCol="0">
+            <a:spAutoFit/>
+          </a:bodyPr>
+          <a:lstStyle/>
+          <a:p>
+            <a:r>
+              <a:rPr lang="en-US" sz="1000" b="1" dirty="0"/>
+              <a:t>entry</a:t>
+            </a:r>
+          </a:p>
+        </p:txBody>
+      </p:sp>
+      <p:sp>
+        <p:nvSpPr>
+          <p:cNvPr id="50" name="TextBox 49">
+            <a:extLst>
+              <a:ext uri="{FF2B5EF4-FFF2-40B4-BE49-F238E27FC236}">
+                <a16:creationId xmlns:a16="http://schemas.microsoft.com/office/drawing/2014/main" id="{8E9059DA-7DB3-4460-90B7-CE9A7DFACF8F}"/>
+              </a:ext>
+            </a:extLst>
+          </p:cNvPr>
+          <p:cNvSpPr txBox="1"/>
+          <p:nvPr/>
+        </p:nvSpPr>
+        <p:spPr>
+          <a:xfrm>
+            <a:off x="8583074" y="3712990"/>
+            <a:ext cx="703802" cy="369332"/>
+          </a:xfrm>
+          <a:prstGeom prst="rect">
+            <a:avLst/>
+          </a:prstGeom>
+          <a:solidFill>
+            <a:schemeClr val="bg1"/>
+          </a:solidFill>
+        </p:spPr>
+        <p:txBody>
+          <a:bodyPr wrap="square" rtlCol="0">
+            <a:spAutoFit/>
+          </a:bodyPr>
+          <a:lstStyle/>
+          <a:p>
+            <a:r>
+              <a:rPr lang="en-US" sz="900" b="1" dirty="0"/>
+              <a:t>Evaluated</a:t>
+            </a:r>
+          </a:p>
+          <a:p>
+            <a:r>
+              <a:rPr lang="en-US" sz="900" b="1" dirty="0"/>
+              <a:t>Resources</a:t>
+            </a:r>
+          </a:p>
+        </p:txBody>
+      </p:sp>
+    </p:spTree>
+    <p:extLst>
+      <p:ext uri="{BB962C8B-B14F-4D97-AF65-F5344CB8AC3E}">
+        <p14:creationId xmlns:p14="http://schemas.microsoft.com/office/powerpoint/2010/main" val="3917934670"/>
       </p:ext>
     </p:extLst>
   </p:cSld>

</xml_diff>

<commit_message>
Image cleanup for publication 2-16, 2-17, 2-14, 3-23, text on cap statement page
</commit_message>
<xml_diff>
--- a/input/images/source/Gaps in Care Graphics.pptx
+++ b/input/images/source/Gaps in Care Graphics.pptx
@@ -262,7 +262,7 @@
           <a:p>
             <a:fld id="{CCEBD49B-BC6D-4065-97F6-E22D565E4F2F}" type="datetimeFigureOut">
               <a:rPr lang="en-US" smtClean="0"/>
-              <a:t>3/7/2021</a:t>
+              <a:t>4/2/2021</a:t>
             </a:fld>
             <a:endParaRPr lang="en-US"/>
           </a:p>
@@ -460,7 +460,7 @@
           <a:p>
             <a:fld id="{CCEBD49B-BC6D-4065-97F6-E22D565E4F2F}" type="datetimeFigureOut">
               <a:rPr lang="en-US" smtClean="0"/>
-              <a:t>3/7/2021</a:t>
+              <a:t>4/2/2021</a:t>
             </a:fld>
             <a:endParaRPr lang="en-US"/>
           </a:p>
@@ -668,7 +668,7 @@
           <a:p>
             <a:fld id="{CCEBD49B-BC6D-4065-97F6-E22D565E4F2F}" type="datetimeFigureOut">
               <a:rPr lang="en-US" smtClean="0"/>
-              <a:t>3/7/2021</a:t>
+              <a:t>4/2/2021</a:t>
             </a:fld>
             <a:endParaRPr lang="en-US"/>
           </a:p>
@@ -866,7 +866,7 @@
           <a:p>
             <a:fld id="{CCEBD49B-BC6D-4065-97F6-E22D565E4F2F}" type="datetimeFigureOut">
               <a:rPr lang="en-US" smtClean="0"/>
-              <a:t>3/7/2021</a:t>
+              <a:t>4/2/2021</a:t>
             </a:fld>
             <a:endParaRPr lang="en-US"/>
           </a:p>
@@ -1141,7 +1141,7 @@
           <a:p>
             <a:fld id="{CCEBD49B-BC6D-4065-97F6-E22D565E4F2F}" type="datetimeFigureOut">
               <a:rPr lang="en-US" smtClean="0"/>
-              <a:t>3/7/2021</a:t>
+              <a:t>4/2/2021</a:t>
             </a:fld>
             <a:endParaRPr lang="en-US"/>
           </a:p>
@@ -1406,7 +1406,7 @@
           <a:p>
             <a:fld id="{CCEBD49B-BC6D-4065-97F6-E22D565E4F2F}" type="datetimeFigureOut">
               <a:rPr lang="en-US" smtClean="0"/>
-              <a:t>3/7/2021</a:t>
+              <a:t>4/2/2021</a:t>
             </a:fld>
             <a:endParaRPr lang="en-US"/>
           </a:p>
@@ -1818,7 +1818,7 @@
           <a:p>
             <a:fld id="{CCEBD49B-BC6D-4065-97F6-E22D565E4F2F}" type="datetimeFigureOut">
               <a:rPr lang="en-US" smtClean="0"/>
-              <a:t>3/7/2021</a:t>
+              <a:t>4/2/2021</a:t>
             </a:fld>
             <a:endParaRPr lang="en-US"/>
           </a:p>
@@ -1959,7 +1959,7 @@
           <a:p>
             <a:fld id="{CCEBD49B-BC6D-4065-97F6-E22D565E4F2F}" type="datetimeFigureOut">
               <a:rPr lang="en-US" smtClean="0"/>
-              <a:t>3/7/2021</a:t>
+              <a:t>4/2/2021</a:t>
             </a:fld>
             <a:endParaRPr lang="en-US"/>
           </a:p>
@@ -2072,7 +2072,7 @@
           <a:p>
             <a:fld id="{CCEBD49B-BC6D-4065-97F6-E22D565E4F2F}" type="datetimeFigureOut">
               <a:rPr lang="en-US" smtClean="0"/>
-              <a:t>3/7/2021</a:t>
+              <a:t>4/2/2021</a:t>
             </a:fld>
             <a:endParaRPr lang="en-US"/>
           </a:p>
@@ -2383,7 +2383,7 @@
           <a:p>
             <a:fld id="{CCEBD49B-BC6D-4065-97F6-E22D565E4F2F}" type="datetimeFigureOut">
               <a:rPr lang="en-US" smtClean="0"/>
-              <a:t>3/7/2021</a:t>
+              <a:t>4/2/2021</a:t>
             </a:fld>
             <a:endParaRPr lang="en-US"/>
           </a:p>
@@ -2671,7 +2671,7 @@
           <a:p>
             <a:fld id="{CCEBD49B-BC6D-4065-97F6-E22D565E4F2F}" type="datetimeFigureOut">
               <a:rPr lang="en-US" smtClean="0"/>
-              <a:t>3/7/2021</a:t>
+              <a:t>4/2/2021</a:t>
             </a:fld>
             <a:endParaRPr lang="en-US"/>
           </a:p>
@@ -2912,7 +2912,7 @@
           <a:p>
             <a:fld id="{CCEBD49B-BC6D-4065-97F6-E22D565E4F2F}" type="datetimeFigureOut">
               <a:rPr lang="en-US" smtClean="0"/>
-              <a:t>3/7/2021</a:t>
+              <a:t>4/2/2021</a:t>
             </a:fld>
             <a:endParaRPr lang="en-US"/>
           </a:p>
@@ -4672,6 +4672,49 @@
           <a:chExt cx="0" cy="0"/>
         </a:xfrm>
       </p:grpSpPr>
+      <p:cxnSp>
+        <p:nvCxnSpPr>
+          <p:cNvPr id="35" name="Straight Arrow Connector 34">
+            <a:extLst>
+              <a:ext uri="{FF2B5EF4-FFF2-40B4-BE49-F238E27FC236}">
+                <a16:creationId xmlns:a16="http://schemas.microsoft.com/office/drawing/2014/main" id="{AAA7B3DF-9DB0-4B96-BD97-21C858567EE1}"/>
+              </a:ext>
+            </a:extLst>
+          </p:cNvPr>
+          <p:cNvCxnSpPr>
+            <a:cxnSpLocks/>
+            <a:stCxn id="4" idx="3"/>
+            <a:endCxn id="19" idx="1"/>
+          </p:cNvCxnSpPr>
+          <p:nvPr/>
+        </p:nvCxnSpPr>
+        <p:spPr>
+          <a:xfrm flipV="1">
+            <a:off x="5116354" y="3865546"/>
+            <a:ext cx="1357541" cy="43836"/>
+          </a:xfrm>
+          <a:prstGeom prst="straightConnector1">
+            <a:avLst/>
+          </a:prstGeom>
+          <a:ln>
+            <a:tailEnd type="triangle"/>
+          </a:ln>
+        </p:spPr>
+        <p:style>
+          <a:lnRef idx="1">
+            <a:schemeClr val="accent1"/>
+          </a:lnRef>
+          <a:fillRef idx="0">
+            <a:schemeClr val="accent1"/>
+          </a:fillRef>
+          <a:effectRef idx="0">
+            <a:schemeClr val="accent1"/>
+          </a:effectRef>
+          <a:fontRef idx="minor">
+            <a:schemeClr val="tx1"/>
+          </a:fontRef>
+        </p:style>
+      </p:cxnSp>
       <p:sp>
         <p:nvSpPr>
           <p:cNvPr id="173" name="TextBox 172">
@@ -4703,10 +4746,9 @@
           <a:lstStyle/>
           <a:p>
             <a:r>
-              <a:rPr lang="en-US" sz="900" b="1" dirty="0" err="1"/>
-              <a:t>evaluatedResources</a:t>
-            </a:r>
-            <a:endParaRPr lang="en-US" sz="900" b="1" dirty="0"/>
+              <a:rPr lang="en-US" sz="900" b="1" dirty="0"/>
+              <a:t>evaluateResources</a:t>
+            </a:r>
           </a:p>
         </p:txBody>
       </p:sp>
@@ -4741,10 +4783,9 @@
           <a:lstStyle/>
           <a:p>
             <a:r>
-              <a:rPr lang="en-US" sz="900" b="1" u="sng" dirty="0" err="1"/>
+              <a:rPr lang="en-US" sz="900" b="1" dirty="0"/>
               <a:t>section.focus</a:t>
             </a:r>
-            <a:endParaRPr lang="en-US" sz="900" b="1" u="sng" dirty="0"/>
           </a:p>
         </p:txBody>
       </p:sp>
@@ -4807,7 +4848,7 @@
             </a:pPr>
             <a:r>
               <a:rPr lang="en-US" dirty="0"/>
-              <a:t>  </a:t>
+              <a:t> </a:t>
             </a:r>
           </a:p>
         </p:txBody>
@@ -5655,49 +5696,6 @@
       </p:cxnSp>
       <p:cxnSp>
         <p:nvCxnSpPr>
-          <p:cNvPr id="35" name="Straight Arrow Connector 34">
-            <a:extLst>
-              <a:ext uri="{FF2B5EF4-FFF2-40B4-BE49-F238E27FC236}">
-                <a16:creationId xmlns:a16="http://schemas.microsoft.com/office/drawing/2014/main" id="{AAA7B3DF-9DB0-4B96-BD97-21C858567EE1}"/>
-              </a:ext>
-            </a:extLst>
-          </p:cNvPr>
-          <p:cNvCxnSpPr>
-            <a:cxnSpLocks/>
-            <a:stCxn id="4" idx="3"/>
-            <a:endCxn id="19" idx="1"/>
-          </p:cNvCxnSpPr>
-          <p:nvPr/>
-        </p:nvCxnSpPr>
-        <p:spPr>
-          <a:xfrm flipV="1">
-            <a:off x="5116354" y="3865546"/>
-            <a:ext cx="1357541" cy="43836"/>
-          </a:xfrm>
-          <a:prstGeom prst="straightConnector1">
-            <a:avLst/>
-          </a:prstGeom>
-          <a:ln>
-            <a:tailEnd type="triangle"/>
-          </a:ln>
-        </p:spPr>
-        <p:style>
-          <a:lnRef idx="1">
-            <a:schemeClr val="accent1"/>
-          </a:lnRef>
-          <a:fillRef idx="0">
-            <a:schemeClr val="accent1"/>
-          </a:fillRef>
-          <a:effectRef idx="0">
-            <a:schemeClr val="accent1"/>
-          </a:effectRef>
-          <a:fontRef idx="minor">
-            <a:schemeClr val="tx1"/>
-          </a:fontRef>
-        </p:style>
-      </p:cxnSp>
-      <p:cxnSp>
-        <p:nvCxnSpPr>
           <p:cNvPr id="41" name="Straight Arrow Connector 40">
             <a:extLst>
               <a:ext uri="{FF2B5EF4-FFF2-40B4-BE49-F238E27FC236}">
@@ -6255,10 +6253,9 @@
           <a:lstStyle/>
           <a:p>
             <a:r>
-              <a:rPr lang="en-US" sz="900" b="1" dirty="0" err="1"/>
+              <a:rPr lang="en-US" sz="900" b="1" dirty="0"/>
               <a:t>section.entry</a:t>
             </a:r>
-            <a:endParaRPr lang="en-US" sz="900" b="1" dirty="0"/>
           </a:p>
         </p:txBody>
       </p:sp>
@@ -6461,8 +6458,8 @@
         </p:nvSpPr>
         <p:spPr>
           <a:xfrm>
-            <a:off x="8583074" y="3712990"/>
-            <a:ext cx="703802" cy="369332"/>
+            <a:off x="8392975" y="3714152"/>
+            <a:ext cx="1092114" cy="230832"/>
           </a:xfrm>
           <a:prstGeom prst="rect">
             <a:avLst/>
@@ -6479,13 +6476,7 @@
           <a:p>
             <a:r>
               <a:rPr lang="en-US" sz="900" b="1" dirty="0"/>
-              <a:t>Evaluated</a:t>
-            </a:r>
-          </a:p>
-          <a:p>
-            <a:r>
-              <a:rPr lang="en-US" sz="900" b="1" dirty="0"/>
-              <a:t>Resources</a:t>
+              <a:t>evaluateResources</a:t>
             </a:r>
           </a:p>
         </p:txBody>

</xml_diff>

<commit_message>
Updated Figure 1-1 and 2-12 to use the new ecosystem diagram Updated Figure 2-15 for better resolution and changed its image file name. Also removed ballot note beneath it. Moved deprecated images to archive.
</commit_message>
<xml_diff>
--- a/input/images/source/Gaps in Care Graphics.pptx
+++ b/input/images/source/Gaps in Care Graphics.pptx
@@ -9,6 +9,7 @@
     <p:sldId id="258" r:id="rId3"/>
     <p:sldId id="259" r:id="rId4"/>
     <p:sldId id="264" r:id="rId5"/>
+    <p:sldId id="256" r:id="rId6"/>
   </p:sldIdLst>
   <p:sldSz cx="12192000" cy="6858000"/>
   <p:notesSz cx="6858000" cy="9144000"/>
@@ -262,7 +263,7 @@
           <a:p>
             <a:fld id="{CCEBD49B-BC6D-4065-97F6-E22D565E4F2F}" type="datetimeFigureOut">
               <a:rPr lang="en-US" smtClean="0"/>
-              <a:t>4/2/2021</a:t>
+              <a:t>4/4/2021</a:t>
             </a:fld>
             <a:endParaRPr lang="en-US"/>
           </a:p>
@@ -460,7 +461,7 @@
           <a:p>
             <a:fld id="{CCEBD49B-BC6D-4065-97F6-E22D565E4F2F}" type="datetimeFigureOut">
               <a:rPr lang="en-US" smtClean="0"/>
-              <a:t>4/2/2021</a:t>
+              <a:t>4/4/2021</a:t>
             </a:fld>
             <a:endParaRPr lang="en-US"/>
           </a:p>
@@ -668,7 +669,7 @@
           <a:p>
             <a:fld id="{CCEBD49B-BC6D-4065-97F6-E22D565E4F2F}" type="datetimeFigureOut">
               <a:rPr lang="en-US" smtClean="0"/>
-              <a:t>4/2/2021</a:t>
+              <a:t>4/4/2021</a:t>
             </a:fld>
             <a:endParaRPr lang="en-US"/>
           </a:p>
@@ -866,7 +867,7 @@
           <a:p>
             <a:fld id="{CCEBD49B-BC6D-4065-97F6-E22D565E4F2F}" type="datetimeFigureOut">
               <a:rPr lang="en-US" smtClean="0"/>
-              <a:t>4/2/2021</a:t>
+              <a:t>4/4/2021</a:t>
             </a:fld>
             <a:endParaRPr lang="en-US"/>
           </a:p>
@@ -1141,7 +1142,7 @@
           <a:p>
             <a:fld id="{CCEBD49B-BC6D-4065-97F6-E22D565E4F2F}" type="datetimeFigureOut">
               <a:rPr lang="en-US" smtClean="0"/>
-              <a:t>4/2/2021</a:t>
+              <a:t>4/4/2021</a:t>
             </a:fld>
             <a:endParaRPr lang="en-US"/>
           </a:p>
@@ -1406,7 +1407,7 @@
           <a:p>
             <a:fld id="{CCEBD49B-BC6D-4065-97F6-E22D565E4F2F}" type="datetimeFigureOut">
               <a:rPr lang="en-US" smtClean="0"/>
-              <a:t>4/2/2021</a:t>
+              <a:t>4/4/2021</a:t>
             </a:fld>
             <a:endParaRPr lang="en-US"/>
           </a:p>
@@ -1818,7 +1819,7 @@
           <a:p>
             <a:fld id="{CCEBD49B-BC6D-4065-97F6-E22D565E4F2F}" type="datetimeFigureOut">
               <a:rPr lang="en-US" smtClean="0"/>
-              <a:t>4/2/2021</a:t>
+              <a:t>4/4/2021</a:t>
             </a:fld>
             <a:endParaRPr lang="en-US"/>
           </a:p>
@@ -1959,7 +1960,7 @@
           <a:p>
             <a:fld id="{CCEBD49B-BC6D-4065-97F6-E22D565E4F2F}" type="datetimeFigureOut">
               <a:rPr lang="en-US" smtClean="0"/>
-              <a:t>4/2/2021</a:t>
+              <a:t>4/4/2021</a:t>
             </a:fld>
             <a:endParaRPr lang="en-US"/>
           </a:p>
@@ -2072,7 +2073,7 @@
           <a:p>
             <a:fld id="{CCEBD49B-BC6D-4065-97F6-E22D565E4F2F}" type="datetimeFigureOut">
               <a:rPr lang="en-US" smtClean="0"/>
-              <a:t>4/2/2021</a:t>
+              <a:t>4/4/2021</a:t>
             </a:fld>
             <a:endParaRPr lang="en-US"/>
           </a:p>
@@ -2383,7 +2384,7 @@
           <a:p>
             <a:fld id="{CCEBD49B-BC6D-4065-97F6-E22D565E4F2F}" type="datetimeFigureOut">
               <a:rPr lang="en-US" smtClean="0"/>
-              <a:t>4/2/2021</a:t>
+              <a:t>4/4/2021</a:t>
             </a:fld>
             <a:endParaRPr lang="en-US"/>
           </a:p>
@@ -2671,7 +2672,7 @@
           <a:p>
             <a:fld id="{CCEBD49B-BC6D-4065-97F6-E22D565E4F2F}" type="datetimeFigureOut">
               <a:rPr lang="en-US" smtClean="0"/>
-              <a:t>4/2/2021</a:t>
+              <a:t>4/4/2021</a:t>
             </a:fld>
             <a:endParaRPr lang="en-US"/>
           </a:p>
@@ -2912,7 +2913,7 @@
           <a:p>
             <a:fld id="{CCEBD49B-BC6D-4065-97F6-E22D565E4F2F}" type="datetimeFigureOut">
               <a:rPr lang="en-US" smtClean="0"/>
-              <a:t>4/2/2021</a:t>
+              <a:t>4/4/2021</a:t>
             </a:fld>
             <a:endParaRPr lang="en-US"/>
           </a:p>
@@ -6494,6 +6495,124 @@
 </p:sld>
 </file>
 
+<file path=ppt/slides/slide5.xml><?xml version="1.0" encoding="utf-8"?>
+<p:sld xmlns:a="http://schemas.openxmlformats.org/drawingml/2006/main" xmlns:r="http://schemas.openxmlformats.org/officeDocument/2006/relationships" xmlns:p="http://schemas.openxmlformats.org/presentationml/2006/main">
+  <p:cSld>
+    <p:spTree>
+      <p:nvGrpSpPr>
+        <p:cNvPr id="1" name=""/>
+        <p:cNvGrpSpPr/>
+        <p:nvPr/>
+      </p:nvGrpSpPr>
+      <p:grpSpPr>
+        <a:xfrm>
+          <a:off x="0" y="0"/>
+          <a:ext cx="0" cy="0"/>
+          <a:chOff x="0" y="0"/>
+          <a:chExt cx="0" cy="0"/>
+        </a:xfrm>
+      </p:grpSpPr>
+      <p:pic>
+        <p:nvPicPr>
+          <p:cNvPr id="5" name="Picture 4">
+            <a:extLst>
+              <a:ext uri="{FF2B5EF4-FFF2-40B4-BE49-F238E27FC236}">
+                <a16:creationId xmlns:a16="http://schemas.microsoft.com/office/drawing/2014/main" id="{45EA2043-1279-476E-9F6F-1307AFED5C8A}"/>
+              </a:ext>
+            </a:extLst>
+          </p:cNvPr>
+          <p:cNvPicPr>
+            <a:picLocks noChangeAspect="1"/>
+          </p:cNvPicPr>
+          <p:nvPr/>
+        </p:nvPicPr>
+        <p:blipFill>
+          <a:blip r:embed="rId2">
+            <a:extLst>
+              <a:ext uri="{28A0092B-C50C-407E-A947-70E740481C1C}">
+                <a14:useLocalDpi xmlns:a14="http://schemas.microsoft.com/office/drawing/2010/main" val="0"/>
+              </a:ext>
+            </a:extLst>
+          </a:blip>
+          <a:stretch>
+            <a:fillRect/>
+          </a:stretch>
+        </p:blipFill>
+        <p:spPr>
+          <a:xfrm>
+            <a:off x="1900762" y="1062324"/>
+            <a:ext cx="8390476" cy="4580952"/>
+          </a:xfrm>
+          <a:prstGeom prst="rect">
+            <a:avLst/>
+          </a:prstGeom>
+        </p:spPr>
+      </p:pic>
+      <p:sp>
+        <p:nvSpPr>
+          <p:cNvPr id="6" name="Oval 5">
+            <a:extLst>
+              <a:ext uri="{FF2B5EF4-FFF2-40B4-BE49-F238E27FC236}">
+                <a16:creationId xmlns:a16="http://schemas.microsoft.com/office/drawing/2014/main" id="{E2F7ACD9-291B-4C9D-A9C3-7A57A0BD6D58}"/>
+              </a:ext>
+            </a:extLst>
+          </p:cNvPr>
+          <p:cNvSpPr/>
+          <p:nvPr/>
+        </p:nvSpPr>
+        <p:spPr>
+          <a:xfrm>
+            <a:off x="5007429" y="3189514"/>
+            <a:ext cx="5486400" cy="2529962"/>
+          </a:xfrm>
+          <a:prstGeom prst="ellipse">
+            <a:avLst/>
+          </a:prstGeom>
+          <a:noFill/>
+          <a:ln w="28575">
+            <a:solidFill>
+              <a:srgbClr val="FF0000"/>
+            </a:solidFill>
+          </a:ln>
+        </p:spPr>
+        <p:style>
+          <a:lnRef idx="2">
+            <a:schemeClr val="accent1">
+              <a:shade val="50000"/>
+            </a:schemeClr>
+          </a:lnRef>
+          <a:fillRef idx="1">
+            <a:schemeClr val="accent1"/>
+          </a:fillRef>
+          <a:effectRef idx="0">
+            <a:schemeClr val="accent1"/>
+          </a:effectRef>
+          <a:fontRef idx="minor">
+            <a:schemeClr val="lt1"/>
+          </a:fontRef>
+        </p:style>
+        <p:txBody>
+          <a:bodyPr rtlCol="0" anchor="ctr"/>
+          <a:lstStyle/>
+          <a:p>
+            <a:pPr algn="ctr"/>
+            <a:endParaRPr lang="en-US" dirty="0"/>
+          </a:p>
+        </p:txBody>
+      </p:sp>
+    </p:spTree>
+    <p:extLst>
+      <p:ext uri="{BB962C8B-B14F-4D97-AF65-F5344CB8AC3E}">
+        <p14:creationId xmlns:p14="http://schemas.microsoft.com/office/powerpoint/2010/main" val="1584297159"/>
+      </p:ext>
+    </p:extLst>
+  </p:cSld>
+  <p:clrMapOvr>
+    <a:masterClrMapping/>
+  </p:clrMapOvr>
+</p:sld>
+</file>
+
 <file path=ppt/theme/theme1.xml><?xml version="1.0" encoding="utf-8"?>
 <a:theme xmlns:a="http://schemas.openxmlformats.org/drawingml/2006/main" name="Office Theme">
   <a:themeElements>

</xml_diff>

<commit_message>
updated figure 2-13, also renamed the image to gic-reporting-flow.png in gaps-in-care-reporting.md. Removed NewDiagramsForIntro.pptx from source (images are in Gaps in Care Graphics.pptx) removed Timeline - Retrospective and Prospective.vsdx (moved the image to Prospective and Retrospective Use Case.vsdx)
</commit_message>
<xml_diff>
--- a/input/images/source/Gaps in Care Graphics.pptx
+++ b/input/images/source/Gaps in Care Graphics.pptx
@@ -10,6 +10,7 @@
     <p:sldId id="259" r:id="rId4"/>
     <p:sldId id="264" r:id="rId5"/>
     <p:sldId id="256" r:id="rId6"/>
+    <p:sldId id="265" r:id="rId7"/>
   </p:sldIdLst>
   <p:sldSz cx="12192000" cy="6858000"/>
   <p:notesSz cx="6858000" cy="9144000"/>
@@ -263,7 +264,7 @@
           <a:p>
             <a:fld id="{CCEBD49B-BC6D-4065-97F6-E22D565E4F2F}" type="datetimeFigureOut">
               <a:rPr lang="en-US" smtClean="0"/>
-              <a:t>4/4/2021</a:t>
+              <a:t>4/9/2021</a:t>
             </a:fld>
             <a:endParaRPr lang="en-US"/>
           </a:p>
@@ -461,7 +462,7 @@
           <a:p>
             <a:fld id="{CCEBD49B-BC6D-4065-97F6-E22D565E4F2F}" type="datetimeFigureOut">
               <a:rPr lang="en-US" smtClean="0"/>
-              <a:t>4/4/2021</a:t>
+              <a:t>4/9/2021</a:t>
             </a:fld>
             <a:endParaRPr lang="en-US"/>
           </a:p>
@@ -669,7 +670,7 @@
           <a:p>
             <a:fld id="{CCEBD49B-BC6D-4065-97F6-E22D565E4F2F}" type="datetimeFigureOut">
               <a:rPr lang="en-US" smtClean="0"/>
-              <a:t>4/4/2021</a:t>
+              <a:t>4/9/2021</a:t>
             </a:fld>
             <a:endParaRPr lang="en-US"/>
           </a:p>
@@ -867,7 +868,7 @@
           <a:p>
             <a:fld id="{CCEBD49B-BC6D-4065-97F6-E22D565E4F2F}" type="datetimeFigureOut">
               <a:rPr lang="en-US" smtClean="0"/>
-              <a:t>4/4/2021</a:t>
+              <a:t>4/9/2021</a:t>
             </a:fld>
             <a:endParaRPr lang="en-US"/>
           </a:p>
@@ -1142,7 +1143,7 @@
           <a:p>
             <a:fld id="{CCEBD49B-BC6D-4065-97F6-E22D565E4F2F}" type="datetimeFigureOut">
               <a:rPr lang="en-US" smtClean="0"/>
-              <a:t>4/4/2021</a:t>
+              <a:t>4/9/2021</a:t>
             </a:fld>
             <a:endParaRPr lang="en-US"/>
           </a:p>
@@ -1407,7 +1408,7 @@
           <a:p>
             <a:fld id="{CCEBD49B-BC6D-4065-97F6-E22D565E4F2F}" type="datetimeFigureOut">
               <a:rPr lang="en-US" smtClean="0"/>
-              <a:t>4/4/2021</a:t>
+              <a:t>4/9/2021</a:t>
             </a:fld>
             <a:endParaRPr lang="en-US"/>
           </a:p>
@@ -1819,7 +1820,7 @@
           <a:p>
             <a:fld id="{CCEBD49B-BC6D-4065-97F6-E22D565E4F2F}" type="datetimeFigureOut">
               <a:rPr lang="en-US" smtClean="0"/>
-              <a:t>4/4/2021</a:t>
+              <a:t>4/9/2021</a:t>
             </a:fld>
             <a:endParaRPr lang="en-US"/>
           </a:p>
@@ -1960,7 +1961,7 @@
           <a:p>
             <a:fld id="{CCEBD49B-BC6D-4065-97F6-E22D565E4F2F}" type="datetimeFigureOut">
               <a:rPr lang="en-US" smtClean="0"/>
-              <a:t>4/4/2021</a:t>
+              <a:t>4/9/2021</a:t>
             </a:fld>
             <a:endParaRPr lang="en-US"/>
           </a:p>
@@ -2073,7 +2074,7 @@
           <a:p>
             <a:fld id="{CCEBD49B-BC6D-4065-97F6-E22D565E4F2F}" type="datetimeFigureOut">
               <a:rPr lang="en-US" smtClean="0"/>
-              <a:t>4/4/2021</a:t>
+              <a:t>4/9/2021</a:t>
             </a:fld>
             <a:endParaRPr lang="en-US"/>
           </a:p>
@@ -2384,7 +2385,7 @@
           <a:p>
             <a:fld id="{CCEBD49B-BC6D-4065-97F6-E22D565E4F2F}" type="datetimeFigureOut">
               <a:rPr lang="en-US" smtClean="0"/>
-              <a:t>4/4/2021</a:t>
+              <a:t>4/9/2021</a:t>
             </a:fld>
             <a:endParaRPr lang="en-US"/>
           </a:p>
@@ -2672,7 +2673,7 @@
           <a:p>
             <a:fld id="{CCEBD49B-BC6D-4065-97F6-E22D565E4F2F}" type="datetimeFigureOut">
               <a:rPr lang="en-US" smtClean="0"/>
-              <a:t>4/4/2021</a:t>
+              <a:t>4/9/2021</a:t>
             </a:fld>
             <a:endParaRPr lang="en-US"/>
           </a:p>
@@ -2913,7 +2914,7 @@
           <a:p>
             <a:fld id="{CCEBD49B-BC6D-4065-97F6-E22D565E4F2F}" type="datetimeFigureOut">
               <a:rPr lang="en-US" smtClean="0"/>
-              <a:t>4/4/2021</a:t>
+              <a:t>4/9/2021</a:t>
             </a:fld>
             <a:endParaRPr lang="en-US"/>
           </a:p>
@@ -4348,7 +4349,7 @@
               <a:tabLst/>
               <a:defRPr/>
             </a:pPr>
-            <a:endParaRPr kumimoji="0" lang="en-US" sz="1800" b="0" i="0" u="none" strike="noStrike" kern="1200" cap="none" spc="0" normalizeH="0" baseline="0" noProof="0">
+            <a:endParaRPr kumimoji="0" lang="en-US" sz="1800" b="0" i="0" u="none" strike="noStrike" kern="1200" cap="none" spc="0" normalizeH="0" baseline="0" noProof="0" dirty="0">
               <a:ln>
                 <a:noFill/>
               </a:ln>
@@ -4425,41 +4426,7 @@
                 <a:ea typeface="+mn-ea"/>
                 <a:cs typeface="+mn-cs"/>
               </a:rPr>
-              <a:t>Based on the Measure criteria, the Measurement Analytics system, </a:t>
-            </a:r>
-            <a:r>
-              <a:rPr kumimoji="0" lang="en-US" sz="1400" b="1" i="0" u="none" strike="noStrike" kern="1200" cap="none" spc="0" normalizeH="0" baseline="0" noProof="0" dirty="0" err="1">
-                <a:ln>
-                  <a:noFill/>
-                </a:ln>
-                <a:solidFill>
-                  <a:srgbClr val="000000"/>
-                </a:solidFill>
-                <a:effectLst/>
-                <a:uLnTx/>
-                <a:uFillTx/>
-                <a:latin typeface="Calibri" panose="020F0502020204030204"/>
-                <a:ea typeface="+mn-ea"/>
-                <a:cs typeface="+mn-cs"/>
-              </a:rPr>
-              <a:t>genereeates</a:t>
-            </a:r>
-            <a:r>
-              <a:rPr kumimoji="0" lang="en-US" sz="1400" b="1" i="0" u="none" strike="noStrike" kern="1200" cap="none" spc="0" normalizeH="0" baseline="0" noProof="0" dirty="0">
-                <a:ln>
-                  <a:noFill/>
-                </a:ln>
-                <a:solidFill>
-                  <a:srgbClr val="000000"/>
-                </a:solidFill>
-                <a:effectLst/>
-                <a:uLnTx/>
-                <a:uFillTx/>
-                <a:latin typeface="Calibri" panose="020F0502020204030204"/>
-                <a:ea typeface="+mn-ea"/>
-                <a:cs typeface="+mn-cs"/>
-              </a:rPr>
-              <a:t> a report showing open or closed gaps of Patient(s) for that measure</a:t>
+              <a:t>Based on the Measure criteria, the Measurement Analytics system, generates a report showing open or closed gaps of Patient(s) for that measure</a:t>
             </a:r>
             <a:endParaRPr kumimoji="0" lang="en-US" sz="1400" b="1" i="0" u="none" strike="noStrike" kern="1200" cap="none" spc="0" normalizeH="0" baseline="0" noProof="0" dirty="0">
               <a:ln>
@@ -4554,92 +4521,6 @@
               <a:ea typeface="+mn-ea"/>
               <a:cs typeface="+mn-cs"/>
             </a:endParaRPr>
-          </a:p>
-        </p:txBody>
-      </p:sp>
-      <p:sp>
-        <p:nvSpPr>
-          <p:cNvPr id="2" name="Rectangle 1">
-            <a:extLst>
-              <a:ext uri="{FF2B5EF4-FFF2-40B4-BE49-F238E27FC236}">
-                <a16:creationId xmlns:a16="http://schemas.microsoft.com/office/drawing/2014/main" id="{376914B4-30E5-4C02-82CB-19562C923CBC}"/>
-              </a:ext>
-            </a:extLst>
-          </p:cNvPr>
-          <p:cNvSpPr/>
-          <p:nvPr/>
-        </p:nvSpPr>
-        <p:spPr>
-          <a:xfrm>
-            <a:off x="5432425" y="3244850"/>
-            <a:ext cx="1327150" cy="368300"/>
-          </a:xfrm>
-          <a:prstGeom prst="rect">
-            <a:avLst/>
-          </a:prstGeom>
-        </p:spPr>
-        <p:txBody>
-          <a:bodyPr wrap="none">
-            <a:spAutoFit/>
-          </a:bodyPr>
-          <a:lstStyle/>
-          <a:p>
-            <a:r>
-              <a:rPr lang="en-US" dirty="0">
-                <a:solidFill>
-                  <a:srgbClr val="000000"/>
-                </a:solidFill>
-                <a:latin typeface="Calibri" panose="020F0502020204030204" pitchFamily="34" charset="0"/>
-              </a:rPr>
-              <a:t>FHIR-28299</a:t>
-            </a:r>
-            <a:r>
-              <a:rPr lang="en-US" dirty="0"/>
-              <a:t> </a:t>
-            </a:r>
-          </a:p>
-        </p:txBody>
-      </p:sp>
-      <p:sp>
-        <p:nvSpPr>
-          <p:cNvPr id="4" name="Rectangle 3">
-            <a:extLst>
-              <a:ext uri="{FF2B5EF4-FFF2-40B4-BE49-F238E27FC236}">
-                <a16:creationId xmlns:a16="http://schemas.microsoft.com/office/drawing/2014/main" id="{9F0485C2-256E-4327-ADE8-1542C56E30CE}"/>
-              </a:ext>
-            </a:extLst>
-          </p:cNvPr>
-          <p:cNvSpPr/>
-          <p:nvPr/>
-        </p:nvSpPr>
-        <p:spPr>
-          <a:xfrm>
-            <a:off x="5432425" y="3244850"/>
-            <a:ext cx="1327150" cy="368300"/>
-          </a:xfrm>
-          <a:prstGeom prst="rect">
-            <a:avLst/>
-          </a:prstGeom>
-        </p:spPr>
-        <p:txBody>
-          <a:bodyPr wrap="none">
-            <a:spAutoFit/>
-          </a:bodyPr>
-          <a:lstStyle/>
-          <a:p>
-            <a:r>
-              <a:rPr lang="en-US" dirty="0">
-                <a:solidFill>
-                  <a:srgbClr val="000000"/>
-                </a:solidFill>
-                <a:latin typeface="Calibri" panose="020F0502020204030204" pitchFamily="34" charset="0"/>
-              </a:rPr>
-              <a:t>FHIR-28299</a:t>
-            </a:r>
-            <a:r>
-              <a:rPr lang="en-US" dirty="0"/>
-              <a:t> </a:t>
-            </a:r>
           </a:p>
         </p:txBody>
       </p:sp>
@@ -6604,6 +6485,727 @@
     <p:extLst>
       <p:ext uri="{BB962C8B-B14F-4D97-AF65-F5344CB8AC3E}">
         <p14:creationId xmlns:p14="http://schemas.microsoft.com/office/powerpoint/2010/main" val="1584297159"/>
+      </p:ext>
+    </p:extLst>
+  </p:cSld>
+  <p:clrMapOvr>
+    <a:masterClrMapping/>
+  </p:clrMapOvr>
+</p:sld>
+</file>
+
+<file path=ppt/slides/slide6.xml><?xml version="1.0" encoding="utf-8"?>
+<p:sld xmlns:a="http://schemas.openxmlformats.org/drawingml/2006/main" xmlns:r="http://schemas.openxmlformats.org/officeDocument/2006/relationships" xmlns:p="http://schemas.openxmlformats.org/presentationml/2006/main">
+  <p:cSld>
+    <p:spTree>
+      <p:nvGrpSpPr>
+        <p:cNvPr id="1" name=""/>
+        <p:cNvGrpSpPr/>
+        <p:nvPr/>
+      </p:nvGrpSpPr>
+      <p:grpSpPr>
+        <a:xfrm>
+          <a:off x="0" y="0"/>
+          <a:ext cx="0" cy="0"/>
+          <a:chOff x="0" y="0"/>
+          <a:chExt cx="0" cy="0"/>
+        </a:xfrm>
+      </p:grpSpPr>
+      <p:sp>
+        <p:nvSpPr>
+          <p:cNvPr id="10" name="TextBox 9">
+            <a:extLst>
+              <a:ext uri="{FF2B5EF4-FFF2-40B4-BE49-F238E27FC236}">
+                <a16:creationId xmlns:a16="http://schemas.microsoft.com/office/drawing/2014/main" id="{7B0364A5-2F61-491E-85C5-A45107F42F18}"/>
+              </a:ext>
+            </a:extLst>
+          </p:cNvPr>
+          <p:cNvSpPr txBox="1"/>
+          <p:nvPr/>
+        </p:nvSpPr>
+        <p:spPr>
+          <a:xfrm>
+            <a:off x="2452805" y="4179338"/>
+            <a:ext cx="1962880" cy="338554"/>
+          </a:xfrm>
+          <a:prstGeom prst="rect">
+            <a:avLst/>
+          </a:prstGeom>
+          <a:noFill/>
+        </p:spPr>
+        <p:txBody>
+          <a:bodyPr wrap="square" rtlCol="0">
+            <a:spAutoFit/>
+          </a:bodyPr>
+          <a:lstStyle/>
+          <a:p>
+            <a:pPr marL="0" marR="0" lvl="0" indent="0" algn="l" defTabSz="914400" rtl="0" eaLnBrk="1" fontAlgn="auto" latinLnBrk="0" hangingPunct="1">
+              <a:lnSpc>
+                <a:spcPct val="100000"/>
+              </a:lnSpc>
+              <a:spcBef>
+                <a:spcPts val="0"/>
+              </a:spcBef>
+              <a:spcAft>
+                <a:spcPts val="0"/>
+              </a:spcAft>
+              <a:buClrTx/>
+              <a:buSzTx/>
+              <a:buFontTx/>
+              <a:buNone/>
+              <a:tabLst/>
+              <a:defRPr/>
+            </a:pPr>
+            <a:r>
+              <a:rPr kumimoji="0" lang="en-US" sz="1600" b="1" i="0" u="none" strike="noStrike" kern="1200" cap="none" spc="0" normalizeH="0" baseline="0" noProof="0" dirty="0">
+                <a:ln>
+                  <a:noFill/>
+                </a:ln>
+                <a:solidFill>
+                  <a:srgbClr val="FFC000"/>
+                </a:solidFill>
+                <a:effectLst/>
+                <a:uLnTx/>
+                <a:uFillTx/>
+                <a:latin typeface="Calibri" panose="020F0502020204030204"/>
+                <a:ea typeface="+mn-ea"/>
+                <a:cs typeface="+mn-cs"/>
+              </a:rPr>
+              <a:t>Provider Workflow</a:t>
+            </a:r>
+          </a:p>
+        </p:txBody>
+      </p:sp>
+      <p:sp>
+        <p:nvSpPr>
+          <p:cNvPr id="12" name="TextBox 11">
+            <a:extLst>
+              <a:ext uri="{FF2B5EF4-FFF2-40B4-BE49-F238E27FC236}">
+                <a16:creationId xmlns:a16="http://schemas.microsoft.com/office/drawing/2014/main" id="{2721BEA0-6F5D-41B6-A27E-8F3C8D414EAA}"/>
+              </a:ext>
+            </a:extLst>
+          </p:cNvPr>
+          <p:cNvSpPr txBox="1"/>
+          <p:nvPr/>
+        </p:nvSpPr>
+        <p:spPr>
+          <a:xfrm>
+            <a:off x="7289744" y="3649849"/>
+            <a:ext cx="2605238" cy="830997"/>
+          </a:xfrm>
+          <a:prstGeom prst="rect">
+            <a:avLst/>
+          </a:prstGeom>
+          <a:noFill/>
+        </p:spPr>
+        <p:txBody>
+          <a:bodyPr wrap="square" rtlCol="0">
+            <a:spAutoFit/>
+          </a:bodyPr>
+          <a:lstStyle/>
+          <a:p>
+            <a:pPr marL="0" marR="0" lvl="0" indent="0" algn="l" defTabSz="914400" rtl="0" eaLnBrk="1" fontAlgn="auto" latinLnBrk="0" hangingPunct="1">
+              <a:lnSpc>
+                <a:spcPct val="100000"/>
+              </a:lnSpc>
+              <a:spcBef>
+                <a:spcPts val="0"/>
+              </a:spcBef>
+              <a:spcAft>
+                <a:spcPts val="0"/>
+              </a:spcAft>
+              <a:buClrTx/>
+              <a:buSzTx/>
+              <a:buFontTx/>
+              <a:buNone/>
+              <a:tabLst/>
+              <a:defRPr/>
+            </a:pPr>
+            <a:r>
+              <a:rPr kumimoji="0" lang="en-US" sz="1600" b="1" i="0" u="none" strike="noStrike" kern="1200" cap="none" spc="0" normalizeH="0" baseline="0" noProof="0" dirty="0">
+                <a:ln>
+                  <a:noFill/>
+                </a:ln>
+                <a:solidFill>
+                  <a:srgbClr val="FFC000"/>
+                </a:solidFill>
+                <a:effectLst/>
+                <a:uLnTx/>
+                <a:uFillTx/>
+                <a:latin typeface="Calibri" panose="020F0502020204030204"/>
+                <a:ea typeface="+mn-ea"/>
+                <a:cs typeface="+mn-cs"/>
+              </a:rPr>
+              <a:t>Payer, Reporting Vendor, or internal analytics (etc.)  Workflow</a:t>
+            </a:r>
+          </a:p>
+        </p:txBody>
+      </p:sp>
+      <p:sp>
+        <p:nvSpPr>
+          <p:cNvPr id="15" name="Arrow: U-Turn 14">
+            <a:extLst>
+              <a:ext uri="{FF2B5EF4-FFF2-40B4-BE49-F238E27FC236}">
+                <a16:creationId xmlns:a16="http://schemas.microsoft.com/office/drawing/2014/main" id="{FCB7ECAA-0639-4672-BDA9-A170E44587B7}"/>
+              </a:ext>
+            </a:extLst>
+          </p:cNvPr>
+          <p:cNvSpPr/>
+          <p:nvPr/>
+        </p:nvSpPr>
+        <p:spPr>
+          <a:xfrm rot="10800000">
+            <a:off x="3173308" y="4470684"/>
+            <a:ext cx="5503178" cy="1229114"/>
+          </a:xfrm>
+          <a:prstGeom prst="uturnArrow">
+            <a:avLst/>
+          </a:prstGeom>
+        </p:spPr>
+        <p:style>
+          <a:lnRef idx="2">
+            <a:schemeClr val="accent1">
+              <a:shade val="50000"/>
+            </a:schemeClr>
+          </a:lnRef>
+          <a:fillRef idx="1">
+            <a:schemeClr val="accent1"/>
+          </a:fillRef>
+          <a:effectRef idx="0">
+            <a:schemeClr val="accent1"/>
+          </a:effectRef>
+          <a:fontRef idx="minor">
+            <a:schemeClr val="lt1"/>
+          </a:fontRef>
+        </p:style>
+        <p:txBody>
+          <a:bodyPr rtlCol="0" anchor="ctr"/>
+          <a:lstStyle/>
+          <a:p>
+            <a:pPr marL="0" marR="0" lvl="0" indent="0" algn="ctr" defTabSz="914400" rtl="0" eaLnBrk="1" fontAlgn="auto" latinLnBrk="0" hangingPunct="1">
+              <a:lnSpc>
+                <a:spcPct val="100000"/>
+              </a:lnSpc>
+              <a:spcBef>
+                <a:spcPts val="0"/>
+              </a:spcBef>
+              <a:spcAft>
+                <a:spcPts val="0"/>
+              </a:spcAft>
+              <a:buClrTx/>
+              <a:buSzTx/>
+              <a:buFontTx/>
+              <a:buNone/>
+              <a:tabLst/>
+              <a:defRPr/>
+            </a:pPr>
+            <a:endParaRPr kumimoji="0" lang="en-US" sz="1800" b="0" i="0" u="none" strike="noStrike" kern="1200" cap="none" spc="0" normalizeH="0" baseline="0" noProof="0" dirty="0">
+              <a:ln>
+                <a:noFill/>
+              </a:ln>
+              <a:solidFill>
+                <a:prstClr val="black"/>
+              </a:solidFill>
+              <a:effectLst/>
+              <a:uLnTx/>
+              <a:uFillTx/>
+              <a:latin typeface="Calibri" panose="020F0502020204030204"/>
+              <a:ea typeface="+mn-ea"/>
+              <a:cs typeface="+mn-cs"/>
+            </a:endParaRPr>
+          </a:p>
+        </p:txBody>
+      </p:sp>
+      <p:sp>
+        <p:nvSpPr>
+          <p:cNvPr id="17" name="Arrow: U-Turn 16">
+            <a:extLst>
+              <a:ext uri="{FF2B5EF4-FFF2-40B4-BE49-F238E27FC236}">
+                <a16:creationId xmlns:a16="http://schemas.microsoft.com/office/drawing/2014/main" id="{C030E331-0328-48B5-A310-F7957778A8AB}"/>
+              </a:ext>
+            </a:extLst>
+          </p:cNvPr>
+          <p:cNvSpPr/>
+          <p:nvPr/>
+        </p:nvSpPr>
+        <p:spPr>
+          <a:xfrm>
+            <a:off x="3173308" y="1053870"/>
+            <a:ext cx="5503178" cy="1229114"/>
+          </a:xfrm>
+          <a:prstGeom prst="uturnArrow">
+            <a:avLst/>
+          </a:prstGeom>
+        </p:spPr>
+        <p:style>
+          <a:lnRef idx="2">
+            <a:schemeClr val="accent1">
+              <a:shade val="50000"/>
+            </a:schemeClr>
+          </a:lnRef>
+          <a:fillRef idx="1">
+            <a:schemeClr val="accent1"/>
+          </a:fillRef>
+          <a:effectRef idx="0">
+            <a:schemeClr val="accent1"/>
+          </a:effectRef>
+          <a:fontRef idx="minor">
+            <a:schemeClr val="lt1"/>
+          </a:fontRef>
+        </p:style>
+        <p:txBody>
+          <a:bodyPr rtlCol="0" anchor="ctr"/>
+          <a:lstStyle/>
+          <a:p>
+            <a:pPr marL="0" marR="0" lvl="0" indent="0" algn="ctr" defTabSz="914400" rtl="0" eaLnBrk="1" fontAlgn="auto" latinLnBrk="0" hangingPunct="1">
+              <a:lnSpc>
+                <a:spcPct val="100000"/>
+              </a:lnSpc>
+              <a:spcBef>
+                <a:spcPts val="0"/>
+              </a:spcBef>
+              <a:spcAft>
+                <a:spcPts val="0"/>
+              </a:spcAft>
+              <a:buClrTx/>
+              <a:buSzTx/>
+              <a:buFontTx/>
+              <a:buNone/>
+              <a:tabLst/>
+              <a:defRPr/>
+            </a:pPr>
+            <a:endParaRPr kumimoji="0" lang="en-US" sz="1800" b="0" i="0" u="none" strike="noStrike" kern="1200" cap="none" spc="0" normalizeH="0" baseline="0" noProof="0" dirty="0">
+              <a:ln>
+                <a:noFill/>
+              </a:ln>
+              <a:solidFill>
+                <a:prstClr val="black"/>
+              </a:solidFill>
+              <a:effectLst/>
+              <a:uLnTx/>
+              <a:uFillTx/>
+              <a:latin typeface="Calibri" panose="020F0502020204030204"/>
+              <a:ea typeface="+mn-ea"/>
+              <a:cs typeface="+mn-cs"/>
+            </a:endParaRPr>
+          </a:p>
+        </p:txBody>
+      </p:sp>
+      <p:sp>
+        <p:nvSpPr>
+          <p:cNvPr id="19" name="TextBox 18">
+            <a:extLst>
+              <a:ext uri="{FF2B5EF4-FFF2-40B4-BE49-F238E27FC236}">
+                <a16:creationId xmlns:a16="http://schemas.microsoft.com/office/drawing/2014/main" id="{34BFFB6B-5BCD-4085-A7BC-0DE37F1FBD19}"/>
+              </a:ext>
+            </a:extLst>
+          </p:cNvPr>
+          <p:cNvSpPr txBox="1"/>
+          <p:nvPr/>
+        </p:nvSpPr>
+        <p:spPr>
+          <a:xfrm>
+            <a:off x="4070144" y="4622581"/>
+            <a:ext cx="3941597" cy="738664"/>
+          </a:xfrm>
+          <a:prstGeom prst="rect">
+            <a:avLst/>
+          </a:prstGeom>
+          <a:noFill/>
+        </p:spPr>
+        <p:txBody>
+          <a:bodyPr wrap="square" rtlCol="0">
+            <a:spAutoFit/>
+          </a:bodyPr>
+          <a:lstStyle/>
+          <a:p>
+            <a:pPr marL="0" marR="0" lvl="0" indent="0" algn="ctr" defTabSz="914400" rtl="0" eaLnBrk="1" fontAlgn="auto" latinLnBrk="0" hangingPunct="1">
+              <a:lnSpc>
+                <a:spcPct val="100000"/>
+              </a:lnSpc>
+              <a:spcBef>
+                <a:spcPts val="0"/>
+              </a:spcBef>
+              <a:spcAft>
+                <a:spcPts val="0"/>
+              </a:spcAft>
+              <a:buClrTx/>
+              <a:buSzTx/>
+              <a:buFontTx/>
+              <a:buNone/>
+              <a:tabLst/>
+              <a:defRPr/>
+            </a:pPr>
+            <a:r>
+              <a:rPr kumimoji="0" lang="en-US" sz="1400" b="1" i="0" u="none" strike="noStrike" kern="1200" cap="none" spc="0" normalizeH="0" baseline="0" noProof="0" dirty="0">
+                <a:ln>
+                  <a:noFill/>
+                </a:ln>
+                <a:solidFill>
+                  <a:srgbClr val="000000"/>
+                </a:solidFill>
+                <a:effectLst/>
+                <a:uLnTx/>
+                <a:uFillTx/>
+                <a:latin typeface="Calibri" panose="020F0502020204030204"/>
+                <a:ea typeface="+mn-ea"/>
+                <a:cs typeface="+mn-cs"/>
+              </a:rPr>
+              <a:t>Based on the Measure criteria, the Measurement Analytics system, generates a report showing open or closed gaps of Patient(s) for that measure</a:t>
+            </a:r>
+            <a:endParaRPr kumimoji="0" lang="en-US" sz="1400" b="1" i="0" u="none" strike="noStrike" kern="1200" cap="none" spc="0" normalizeH="0" baseline="0" noProof="0" dirty="0">
+              <a:ln>
+                <a:noFill/>
+              </a:ln>
+              <a:solidFill>
+                <a:prstClr val="black"/>
+              </a:solidFill>
+              <a:effectLst/>
+              <a:uLnTx/>
+              <a:uFillTx/>
+              <a:latin typeface="Calibri" panose="020F0502020204030204"/>
+              <a:ea typeface="+mn-ea"/>
+              <a:cs typeface="+mn-cs"/>
+            </a:endParaRPr>
+          </a:p>
+        </p:txBody>
+      </p:sp>
+      <p:sp>
+        <p:nvSpPr>
+          <p:cNvPr id="21" name="TextBox 20">
+            <a:extLst>
+              <a:ext uri="{FF2B5EF4-FFF2-40B4-BE49-F238E27FC236}">
+                <a16:creationId xmlns:a16="http://schemas.microsoft.com/office/drawing/2014/main" id="{5B7B7C70-EE1D-4FF4-999F-B17F95108ED0}"/>
+              </a:ext>
+            </a:extLst>
+          </p:cNvPr>
+          <p:cNvSpPr txBox="1"/>
+          <p:nvPr/>
+        </p:nvSpPr>
+        <p:spPr>
+          <a:xfrm>
+            <a:off x="3954098" y="1378432"/>
+            <a:ext cx="3941597" cy="738664"/>
+          </a:xfrm>
+          <a:prstGeom prst="rect">
+            <a:avLst/>
+          </a:prstGeom>
+          <a:noFill/>
+        </p:spPr>
+        <p:txBody>
+          <a:bodyPr wrap="square" rtlCol="0">
+            <a:spAutoFit/>
+          </a:bodyPr>
+          <a:lstStyle/>
+          <a:p>
+            <a:pPr marL="0" marR="0" lvl="0" indent="0" algn="ctr" defTabSz="914400" rtl="0" eaLnBrk="1" fontAlgn="auto" latinLnBrk="0" hangingPunct="1">
+              <a:lnSpc>
+                <a:spcPct val="100000"/>
+              </a:lnSpc>
+              <a:spcBef>
+                <a:spcPts val="0"/>
+              </a:spcBef>
+              <a:spcAft>
+                <a:spcPts val="0"/>
+              </a:spcAft>
+              <a:buClrTx/>
+              <a:buSzTx/>
+              <a:buFontTx/>
+              <a:buNone/>
+              <a:tabLst/>
+              <a:defRPr/>
+            </a:pPr>
+            <a:r>
+              <a:rPr kumimoji="0" lang="en-US" sz="1400" b="1" i="0" u="none" strike="noStrike" kern="1200" cap="none" spc="0" normalizeH="0" baseline="0" noProof="0" dirty="0">
+                <a:ln>
+                  <a:noFill/>
+                </a:ln>
+                <a:solidFill>
+                  <a:srgbClr val="000000"/>
+                </a:solidFill>
+                <a:effectLst/>
+                <a:uLnTx/>
+                <a:uFillTx/>
+                <a:latin typeface="Calibri" panose="020F0502020204030204"/>
+                <a:ea typeface="+mn-ea"/>
+                <a:cs typeface="+mn-cs"/>
+              </a:rPr>
+              <a:t>Clinical Care Systems request a report on one or more patient’s Care Gap Information based on Measure(s) criteria</a:t>
+            </a:r>
+            <a:endParaRPr kumimoji="0" lang="en-US" sz="1400" b="1" i="0" u="none" strike="noStrike" kern="1200" cap="none" spc="0" normalizeH="0" baseline="0" noProof="0" dirty="0">
+              <a:ln>
+                <a:noFill/>
+              </a:ln>
+              <a:solidFill>
+                <a:prstClr val="black"/>
+              </a:solidFill>
+              <a:effectLst/>
+              <a:uLnTx/>
+              <a:uFillTx/>
+              <a:latin typeface="Calibri" panose="020F0502020204030204"/>
+              <a:ea typeface="+mn-ea"/>
+              <a:cs typeface="+mn-cs"/>
+            </a:endParaRPr>
+          </a:p>
+        </p:txBody>
+      </p:sp>
+      <p:pic>
+        <p:nvPicPr>
+          <p:cNvPr id="4" name="Picture 3">
+            <a:extLst>
+              <a:ext uri="{FF2B5EF4-FFF2-40B4-BE49-F238E27FC236}">
+                <a16:creationId xmlns:a16="http://schemas.microsoft.com/office/drawing/2014/main" id="{9B242E7F-356D-4C5B-8FAD-4D8D6B890CCF}"/>
+              </a:ext>
+            </a:extLst>
+          </p:cNvPr>
+          <p:cNvPicPr>
+            <a:picLocks noChangeAspect="1"/>
+          </p:cNvPicPr>
+          <p:nvPr/>
+        </p:nvPicPr>
+        <p:blipFill>
+          <a:blip r:embed="rId2">
+            <a:extLst>
+              <a:ext uri="{28A0092B-C50C-407E-A947-70E740481C1C}">
+                <a14:useLocalDpi xmlns:a14="http://schemas.microsoft.com/office/drawing/2010/main" val="0"/>
+              </a:ext>
+            </a:extLst>
+          </a:blip>
+          <a:stretch>
+            <a:fillRect/>
+          </a:stretch>
+        </p:blipFill>
+        <p:spPr>
+          <a:xfrm>
+            <a:off x="2499027" y="2354576"/>
+            <a:ext cx="1802901" cy="1802901"/>
+          </a:xfrm>
+          <a:prstGeom prst="rect">
+            <a:avLst/>
+          </a:prstGeom>
+        </p:spPr>
+      </p:pic>
+      <p:pic>
+        <p:nvPicPr>
+          <p:cNvPr id="9" name="Picture 8">
+            <a:extLst>
+              <a:ext uri="{FF2B5EF4-FFF2-40B4-BE49-F238E27FC236}">
+                <a16:creationId xmlns:a16="http://schemas.microsoft.com/office/drawing/2014/main" id="{14D36AFD-DE51-4AC7-9534-61142D3BA0AF}"/>
+              </a:ext>
+            </a:extLst>
+          </p:cNvPr>
+          <p:cNvPicPr>
+            <a:picLocks noChangeAspect="1"/>
+          </p:cNvPicPr>
+          <p:nvPr/>
+        </p:nvPicPr>
+        <p:blipFill rotWithShape="1">
+          <a:blip r:embed="rId3">
+            <a:extLst>
+              <a:ext uri="{28A0092B-C50C-407E-A947-70E740481C1C}">
+                <a14:useLocalDpi xmlns:a14="http://schemas.microsoft.com/office/drawing/2010/main" val="0"/>
+              </a:ext>
+            </a:extLst>
+          </a:blip>
+          <a:srcRect l="1966" r="-1"/>
+          <a:stretch/>
+        </p:blipFill>
+        <p:spPr>
+          <a:xfrm>
+            <a:off x="7365944" y="2033636"/>
+            <a:ext cx="2329908" cy="1712192"/>
+          </a:xfrm>
+          <a:prstGeom prst="rect">
+            <a:avLst/>
+          </a:prstGeom>
+        </p:spPr>
+      </p:pic>
+      <p:sp>
+        <p:nvSpPr>
+          <p:cNvPr id="11" name="Rectangle 10">
+            <a:extLst>
+              <a:ext uri="{FF2B5EF4-FFF2-40B4-BE49-F238E27FC236}">
+                <a16:creationId xmlns:a16="http://schemas.microsoft.com/office/drawing/2014/main" id="{71297D29-ECA1-4F69-A845-9B13C14FDA67}"/>
+              </a:ext>
+            </a:extLst>
+          </p:cNvPr>
+          <p:cNvSpPr/>
+          <p:nvPr/>
+        </p:nvSpPr>
+        <p:spPr>
+          <a:xfrm>
+            <a:off x="9334500" y="2735580"/>
+            <a:ext cx="449580" cy="350520"/>
+          </a:xfrm>
+          <a:prstGeom prst="rect">
+            <a:avLst/>
+          </a:prstGeom>
+          <a:solidFill>
+            <a:schemeClr val="bg1"/>
+          </a:solidFill>
+          <a:ln>
+            <a:noFill/>
+          </a:ln>
+        </p:spPr>
+        <p:style>
+          <a:lnRef idx="2">
+            <a:schemeClr val="accent1">
+              <a:shade val="50000"/>
+            </a:schemeClr>
+          </a:lnRef>
+          <a:fillRef idx="1">
+            <a:schemeClr val="accent1"/>
+          </a:fillRef>
+          <a:effectRef idx="0">
+            <a:schemeClr val="accent1"/>
+          </a:effectRef>
+          <a:fontRef idx="minor">
+            <a:schemeClr val="lt1"/>
+          </a:fontRef>
+        </p:style>
+        <p:txBody>
+          <a:bodyPr rtlCol="0" anchor="ctr"/>
+          <a:lstStyle/>
+          <a:p>
+            <a:pPr algn="ctr"/>
+            <a:endParaRPr lang="en-US" dirty="0"/>
+          </a:p>
+        </p:txBody>
+      </p:sp>
+      <p:sp>
+        <p:nvSpPr>
+          <p:cNvPr id="18" name="TextBox 17">
+            <a:extLst>
+              <a:ext uri="{FF2B5EF4-FFF2-40B4-BE49-F238E27FC236}">
+                <a16:creationId xmlns:a16="http://schemas.microsoft.com/office/drawing/2014/main" id="{DA203F80-75AD-4693-9EDF-0CD7524AA6F1}"/>
+              </a:ext>
+            </a:extLst>
+          </p:cNvPr>
+          <p:cNvSpPr txBox="1"/>
+          <p:nvPr/>
+        </p:nvSpPr>
+        <p:spPr>
+          <a:xfrm>
+            <a:off x="4792145" y="1016162"/>
+            <a:ext cx="2088716" cy="338554"/>
+          </a:xfrm>
+          <a:prstGeom prst="rect">
+            <a:avLst/>
+          </a:prstGeom>
+          <a:noFill/>
+        </p:spPr>
+        <p:txBody>
+          <a:bodyPr wrap="square" rtlCol="0">
+            <a:spAutoFit/>
+          </a:bodyPr>
+          <a:lstStyle/>
+          <a:p>
+            <a:pPr marL="0" marR="0" lvl="0" indent="0" algn="l" defTabSz="914400" rtl="0" eaLnBrk="1" fontAlgn="auto" latinLnBrk="0" hangingPunct="1">
+              <a:lnSpc>
+                <a:spcPct val="100000"/>
+              </a:lnSpc>
+              <a:spcBef>
+                <a:spcPts val="0"/>
+              </a:spcBef>
+              <a:spcAft>
+                <a:spcPts val="0"/>
+              </a:spcAft>
+              <a:buClrTx/>
+              <a:buSzTx/>
+              <a:buFontTx/>
+              <a:buNone/>
+              <a:tabLst/>
+              <a:defRPr/>
+            </a:pPr>
+            <a:r>
+              <a:rPr kumimoji="0" lang="en-US" sz="1600" b="1" i="0" u="none" strike="noStrike" kern="1200" cap="none" spc="0" normalizeH="0" baseline="0" noProof="0" dirty="0">
+                <a:ln>
+                  <a:noFill/>
+                </a:ln>
+                <a:solidFill>
+                  <a:schemeClr val="bg1"/>
+                </a:solidFill>
+                <a:effectLst/>
+                <a:uLnTx/>
+                <a:uFillTx/>
+                <a:latin typeface="Calibri" panose="020F0502020204030204"/>
+                <a:ea typeface="+mn-ea"/>
+                <a:cs typeface="+mn-cs"/>
+              </a:rPr>
+              <a:t>Gaps in Care Request</a:t>
+            </a:r>
+          </a:p>
+        </p:txBody>
+      </p:sp>
+      <p:sp>
+        <p:nvSpPr>
+          <p:cNvPr id="20" name="TextBox 19">
+            <a:extLst>
+              <a:ext uri="{FF2B5EF4-FFF2-40B4-BE49-F238E27FC236}">
+                <a16:creationId xmlns:a16="http://schemas.microsoft.com/office/drawing/2014/main" id="{3FE688A2-85AF-44CB-998D-FB3C5B25AAC2}"/>
+              </a:ext>
+            </a:extLst>
+          </p:cNvPr>
+          <p:cNvSpPr txBox="1"/>
+          <p:nvPr/>
+        </p:nvSpPr>
+        <p:spPr>
+          <a:xfrm>
+            <a:off x="4832306" y="5361245"/>
+            <a:ext cx="2185180" cy="338554"/>
+          </a:xfrm>
+          <a:prstGeom prst="rect">
+            <a:avLst/>
+          </a:prstGeom>
+          <a:noFill/>
+        </p:spPr>
+        <p:txBody>
+          <a:bodyPr wrap="square" rtlCol="0">
+            <a:spAutoFit/>
+          </a:bodyPr>
+          <a:lstStyle/>
+          <a:p>
+            <a:pPr marL="0" marR="0" lvl="0" indent="0" algn="l" defTabSz="914400" rtl="0" eaLnBrk="1" fontAlgn="auto" latinLnBrk="0" hangingPunct="1">
+              <a:lnSpc>
+                <a:spcPct val="100000"/>
+              </a:lnSpc>
+              <a:spcBef>
+                <a:spcPts val="0"/>
+              </a:spcBef>
+              <a:spcAft>
+                <a:spcPts val="0"/>
+              </a:spcAft>
+              <a:buClrTx/>
+              <a:buSzTx/>
+              <a:buFontTx/>
+              <a:buNone/>
+              <a:tabLst/>
+              <a:defRPr/>
+            </a:pPr>
+            <a:r>
+              <a:rPr kumimoji="0" lang="en-US" sz="1600" b="1" i="0" u="none" strike="noStrike" kern="1200" cap="none" spc="0" normalizeH="0" baseline="0" noProof="0" dirty="0">
+                <a:ln>
+                  <a:noFill/>
+                </a:ln>
+                <a:solidFill>
+                  <a:schemeClr val="bg1"/>
+                </a:solidFill>
+                <a:effectLst/>
+                <a:uLnTx/>
+                <a:uFillTx/>
+                <a:latin typeface="Calibri" panose="020F0502020204030204"/>
+                <a:ea typeface="+mn-ea"/>
+                <a:cs typeface="+mn-cs"/>
+              </a:rPr>
+              <a:t>Gaps in Care Response</a:t>
+            </a:r>
+          </a:p>
+        </p:txBody>
+      </p:sp>
+    </p:spTree>
+    <p:extLst>
+      <p:ext uri="{BB962C8B-B14F-4D97-AF65-F5344CB8AC3E}">
+        <p14:creationId xmlns:p14="http://schemas.microsoft.com/office/powerpoint/2010/main" val="1889288334"/>
       </p:ext>
     </p:extLst>
   </p:cSld>

</xml_diff>

<commit_message>
applied changes to FHIR-33175. updated GIC Bundle profile, its intro, added a new section to gaps-in-care-reporting.md describing bundle structure. updated source image ppt with new image.
</commit_message>
<xml_diff>
--- a/input/images/source/Gaps in Care Graphics.pptx
+++ b/input/images/source/Gaps in Care Graphics.pptx
@@ -4,6 +4,9 @@
   <p:sldMasterIdLst>
     <p:sldMasterId id="2147483648" r:id="rId1"/>
   </p:sldMasterIdLst>
+  <p:notesMasterIdLst>
+    <p:notesMasterId r:id="rId9"/>
+  </p:notesMasterIdLst>
   <p:sldIdLst>
     <p:sldId id="257" r:id="rId2"/>
     <p:sldId id="258" r:id="rId3"/>
@@ -11,6 +14,7 @@
     <p:sldId id="264" r:id="rId5"/>
     <p:sldId id="256" r:id="rId6"/>
     <p:sldId id="265" r:id="rId7"/>
+    <p:sldId id="267" r:id="rId8"/>
   </p:sldIdLst>
   <p:sldSz cx="12192000" cy="6858000"/>
   <p:notesSz cx="6858000" cy="9144000"/>
@@ -110,11 +114,477 @@
     </a:lvl9pPr>
   </p:defaultTextStyle>
   <p:extLst>
+    <p:ext uri="{521415D9-36F7-43E2-AB2F-B90AF26B5E84}">
+      <p14:sectionLst xmlns:p14="http://schemas.microsoft.com/office/powerpoint/2010/main">
+        <p14:section name="Default Section" id="{17FAEFA7-1D50-4BD5-A43F-0A42BB396FC2}">
+          <p14:sldIdLst>
+            <p14:sldId id="257"/>
+            <p14:sldId id="258"/>
+            <p14:sldId id="259"/>
+            <p14:sldId id="264"/>
+            <p14:sldId id="256"/>
+            <p14:sldId id="265"/>
+            <p14:sldId id="267"/>
+          </p14:sldIdLst>
+        </p14:section>
+      </p14:sectionLst>
+    </p:ext>
     <p:ext uri="{EFAFB233-063F-42B5-8137-9DF3F51BA10A}">
       <p15:sldGuideLst xmlns:p15="http://schemas.microsoft.com/office/powerpoint/2012/main"/>
     </p:ext>
   </p:extLst>
 </p:presentation>
+</file>
+
+<file path=ppt/notesMasters/notesMaster1.xml><?xml version="1.0" encoding="utf-8"?>
+<p:notesMaster xmlns:a="http://schemas.openxmlformats.org/drawingml/2006/main" xmlns:r="http://schemas.openxmlformats.org/officeDocument/2006/relationships" xmlns:p="http://schemas.openxmlformats.org/presentationml/2006/main">
+  <p:cSld>
+    <p:bg>
+      <p:bgRef idx="1001">
+        <a:schemeClr val="bg1"/>
+      </p:bgRef>
+    </p:bg>
+    <p:spTree>
+      <p:nvGrpSpPr>
+        <p:cNvPr id="1" name=""/>
+        <p:cNvGrpSpPr/>
+        <p:nvPr/>
+      </p:nvGrpSpPr>
+      <p:grpSpPr>
+        <a:xfrm>
+          <a:off x="0" y="0"/>
+          <a:ext cx="0" cy="0"/>
+          <a:chOff x="0" y="0"/>
+          <a:chExt cx="0" cy="0"/>
+        </a:xfrm>
+      </p:grpSpPr>
+      <p:sp>
+        <p:nvSpPr>
+          <p:cNvPr id="2" name="Header Placeholder 1"/>
+          <p:cNvSpPr>
+            <a:spLocks noGrp="1"/>
+          </p:cNvSpPr>
+          <p:nvPr>
+            <p:ph type="hdr" sz="quarter"/>
+          </p:nvPr>
+        </p:nvSpPr>
+        <p:spPr>
+          <a:xfrm>
+            <a:off x="0" y="0"/>
+            <a:ext cx="2971800" cy="458788"/>
+          </a:xfrm>
+          <a:prstGeom prst="rect">
+            <a:avLst/>
+          </a:prstGeom>
+        </p:spPr>
+        <p:txBody>
+          <a:bodyPr vert="horz" lIns="91440" tIns="45720" rIns="91440" bIns="45720" rtlCol="0"/>
+          <a:lstStyle>
+            <a:lvl1pPr algn="l">
+              <a:defRPr sz="1200"/>
+            </a:lvl1pPr>
+          </a:lstStyle>
+          <a:p>
+            <a:endParaRPr lang="en-US"/>
+          </a:p>
+        </p:txBody>
+      </p:sp>
+      <p:sp>
+        <p:nvSpPr>
+          <p:cNvPr id="3" name="Date Placeholder 2"/>
+          <p:cNvSpPr>
+            <a:spLocks noGrp="1"/>
+          </p:cNvSpPr>
+          <p:nvPr>
+            <p:ph type="dt" idx="1"/>
+          </p:nvPr>
+        </p:nvSpPr>
+        <p:spPr>
+          <a:xfrm>
+            <a:off x="3884613" y="0"/>
+            <a:ext cx="2971800" cy="458788"/>
+          </a:xfrm>
+          <a:prstGeom prst="rect">
+            <a:avLst/>
+          </a:prstGeom>
+        </p:spPr>
+        <p:txBody>
+          <a:bodyPr vert="horz" lIns="91440" tIns="45720" rIns="91440" bIns="45720" rtlCol="0"/>
+          <a:lstStyle>
+            <a:lvl1pPr algn="r">
+              <a:defRPr sz="1200"/>
+            </a:lvl1pPr>
+          </a:lstStyle>
+          <a:p>
+            <a:fld id="{17E6B6D7-20D6-4E9A-B6E5-85297A5570A7}" type="datetimeFigureOut">
+              <a:rPr lang="en-US" smtClean="0"/>
+              <a:t>11/23/2022</a:t>
+            </a:fld>
+            <a:endParaRPr lang="en-US"/>
+          </a:p>
+        </p:txBody>
+      </p:sp>
+      <p:sp>
+        <p:nvSpPr>
+          <p:cNvPr id="4" name="Slide Image Placeholder 3"/>
+          <p:cNvSpPr>
+            <a:spLocks noGrp="1" noRot="1" noChangeAspect="1"/>
+          </p:cNvSpPr>
+          <p:nvPr>
+            <p:ph type="sldImg" idx="2"/>
+          </p:nvPr>
+        </p:nvSpPr>
+        <p:spPr>
+          <a:xfrm>
+            <a:off x="685800" y="1143000"/>
+            <a:ext cx="5486400" cy="3086100"/>
+          </a:xfrm>
+          <a:prstGeom prst="rect">
+            <a:avLst/>
+          </a:prstGeom>
+          <a:noFill/>
+          <a:ln w="12700">
+            <a:solidFill>
+              <a:prstClr val="black"/>
+            </a:solidFill>
+          </a:ln>
+        </p:spPr>
+        <p:txBody>
+          <a:bodyPr vert="horz" lIns="91440" tIns="45720" rIns="91440" bIns="45720" rtlCol="0" anchor="ctr"/>
+          <a:lstStyle/>
+          <a:p>
+            <a:endParaRPr lang="en-US"/>
+          </a:p>
+        </p:txBody>
+      </p:sp>
+      <p:sp>
+        <p:nvSpPr>
+          <p:cNvPr id="5" name="Notes Placeholder 4"/>
+          <p:cNvSpPr>
+            <a:spLocks noGrp="1"/>
+          </p:cNvSpPr>
+          <p:nvPr>
+            <p:ph type="body" sz="quarter" idx="3"/>
+          </p:nvPr>
+        </p:nvSpPr>
+        <p:spPr>
+          <a:xfrm>
+            <a:off x="685800" y="4400550"/>
+            <a:ext cx="5486400" cy="3600450"/>
+          </a:xfrm>
+          <a:prstGeom prst="rect">
+            <a:avLst/>
+          </a:prstGeom>
+        </p:spPr>
+        <p:txBody>
+          <a:bodyPr vert="horz" lIns="91440" tIns="45720" rIns="91440" bIns="45720" rtlCol="0"/>
+          <a:lstStyle/>
+          <a:p>
+            <a:pPr lvl="0"/>
+            <a:r>
+              <a:rPr lang="en-US"/>
+              <a:t>Click to edit Master text styles</a:t>
+            </a:r>
+          </a:p>
+          <a:p>
+            <a:pPr lvl="1"/>
+            <a:r>
+              <a:rPr lang="en-US"/>
+              <a:t>Second level</a:t>
+            </a:r>
+          </a:p>
+          <a:p>
+            <a:pPr lvl="2"/>
+            <a:r>
+              <a:rPr lang="en-US"/>
+              <a:t>Third level</a:t>
+            </a:r>
+          </a:p>
+          <a:p>
+            <a:pPr lvl="3"/>
+            <a:r>
+              <a:rPr lang="en-US"/>
+              <a:t>Fourth level</a:t>
+            </a:r>
+          </a:p>
+          <a:p>
+            <a:pPr lvl="4"/>
+            <a:r>
+              <a:rPr lang="en-US"/>
+              <a:t>Fifth level</a:t>
+            </a:r>
+          </a:p>
+        </p:txBody>
+      </p:sp>
+      <p:sp>
+        <p:nvSpPr>
+          <p:cNvPr id="6" name="Footer Placeholder 5"/>
+          <p:cNvSpPr>
+            <a:spLocks noGrp="1"/>
+          </p:cNvSpPr>
+          <p:nvPr>
+            <p:ph type="ftr" sz="quarter" idx="4"/>
+          </p:nvPr>
+        </p:nvSpPr>
+        <p:spPr>
+          <a:xfrm>
+            <a:off x="0" y="8685213"/>
+            <a:ext cx="2971800" cy="458787"/>
+          </a:xfrm>
+          <a:prstGeom prst="rect">
+            <a:avLst/>
+          </a:prstGeom>
+        </p:spPr>
+        <p:txBody>
+          <a:bodyPr vert="horz" lIns="91440" tIns="45720" rIns="91440" bIns="45720" rtlCol="0" anchor="b"/>
+          <a:lstStyle>
+            <a:lvl1pPr algn="l">
+              <a:defRPr sz="1200"/>
+            </a:lvl1pPr>
+          </a:lstStyle>
+          <a:p>
+            <a:endParaRPr lang="en-US"/>
+          </a:p>
+        </p:txBody>
+      </p:sp>
+      <p:sp>
+        <p:nvSpPr>
+          <p:cNvPr id="7" name="Slide Number Placeholder 6"/>
+          <p:cNvSpPr>
+            <a:spLocks noGrp="1"/>
+          </p:cNvSpPr>
+          <p:nvPr>
+            <p:ph type="sldNum" sz="quarter" idx="5"/>
+          </p:nvPr>
+        </p:nvSpPr>
+        <p:spPr>
+          <a:xfrm>
+            <a:off x="3884613" y="8685213"/>
+            <a:ext cx="2971800" cy="458787"/>
+          </a:xfrm>
+          <a:prstGeom prst="rect">
+            <a:avLst/>
+          </a:prstGeom>
+        </p:spPr>
+        <p:txBody>
+          <a:bodyPr vert="horz" lIns="91440" tIns="45720" rIns="91440" bIns="45720" rtlCol="0" anchor="b"/>
+          <a:lstStyle>
+            <a:lvl1pPr algn="r">
+              <a:defRPr sz="1200"/>
+            </a:lvl1pPr>
+          </a:lstStyle>
+          <a:p>
+            <a:fld id="{F6C01152-882A-4CAB-AF5B-0D5B05615CCB}" type="slidenum">
+              <a:rPr lang="en-US" smtClean="0"/>
+              <a:t>‹#›</a:t>
+            </a:fld>
+            <a:endParaRPr lang="en-US"/>
+          </a:p>
+        </p:txBody>
+      </p:sp>
+    </p:spTree>
+    <p:extLst>
+      <p:ext uri="{BB962C8B-B14F-4D97-AF65-F5344CB8AC3E}">
+        <p14:creationId xmlns:p14="http://schemas.microsoft.com/office/powerpoint/2010/main" val="3558672493"/>
+      </p:ext>
+    </p:extLst>
+  </p:cSld>
+  <p:clrMap bg1="lt1" tx1="dk1" bg2="lt2" tx2="dk2" accent1="accent1" accent2="accent2" accent3="accent3" accent4="accent4" accent5="accent5" accent6="accent6" hlink="hlink" folHlink="folHlink"/>
+  <p:notesStyle>
+    <a:lvl1pPr marL="0" algn="l" defTabSz="914400" rtl="0" eaLnBrk="1" latinLnBrk="0" hangingPunct="1">
+      <a:defRPr sz="1200" kern="1200">
+        <a:solidFill>
+          <a:schemeClr val="tx1"/>
+        </a:solidFill>
+        <a:latin typeface="+mn-lt"/>
+        <a:ea typeface="+mn-ea"/>
+        <a:cs typeface="+mn-cs"/>
+      </a:defRPr>
+    </a:lvl1pPr>
+    <a:lvl2pPr marL="457200" algn="l" defTabSz="914400" rtl="0" eaLnBrk="1" latinLnBrk="0" hangingPunct="1">
+      <a:defRPr sz="1200" kern="1200">
+        <a:solidFill>
+          <a:schemeClr val="tx1"/>
+        </a:solidFill>
+        <a:latin typeface="+mn-lt"/>
+        <a:ea typeface="+mn-ea"/>
+        <a:cs typeface="+mn-cs"/>
+      </a:defRPr>
+    </a:lvl2pPr>
+    <a:lvl3pPr marL="914400" algn="l" defTabSz="914400" rtl="0" eaLnBrk="1" latinLnBrk="0" hangingPunct="1">
+      <a:defRPr sz="1200" kern="1200">
+        <a:solidFill>
+          <a:schemeClr val="tx1"/>
+        </a:solidFill>
+        <a:latin typeface="+mn-lt"/>
+        <a:ea typeface="+mn-ea"/>
+        <a:cs typeface="+mn-cs"/>
+      </a:defRPr>
+    </a:lvl3pPr>
+    <a:lvl4pPr marL="1371600" algn="l" defTabSz="914400" rtl="0" eaLnBrk="1" latinLnBrk="0" hangingPunct="1">
+      <a:defRPr sz="1200" kern="1200">
+        <a:solidFill>
+          <a:schemeClr val="tx1"/>
+        </a:solidFill>
+        <a:latin typeface="+mn-lt"/>
+        <a:ea typeface="+mn-ea"/>
+        <a:cs typeface="+mn-cs"/>
+      </a:defRPr>
+    </a:lvl4pPr>
+    <a:lvl5pPr marL="1828800" algn="l" defTabSz="914400" rtl="0" eaLnBrk="1" latinLnBrk="0" hangingPunct="1">
+      <a:defRPr sz="1200" kern="1200">
+        <a:solidFill>
+          <a:schemeClr val="tx1"/>
+        </a:solidFill>
+        <a:latin typeface="+mn-lt"/>
+        <a:ea typeface="+mn-ea"/>
+        <a:cs typeface="+mn-cs"/>
+      </a:defRPr>
+    </a:lvl5pPr>
+    <a:lvl6pPr marL="2286000" algn="l" defTabSz="914400" rtl="0" eaLnBrk="1" latinLnBrk="0" hangingPunct="1">
+      <a:defRPr sz="1200" kern="1200">
+        <a:solidFill>
+          <a:schemeClr val="tx1"/>
+        </a:solidFill>
+        <a:latin typeface="+mn-lt"/>
+        <a:ea typeface="+mn-ea"/>
+        <a:cs typeface="+mn-cs"/>
+      </a:defRPr>
+    </a:lvl6pPr>
+    <a:lvl7pPr marL="2743200" algn="l" defTabSz="914400" rtl="0" eaLnBrk="1" latinLnBrk="0" hangingPunct="1">
+      <a:defRPr sz="1200" kern="1200">
+        <a:solidFill>
+          <a:schemeClr val="tx1"/>
+        </a:solidFill>
+        <a:latin typeface="+mn-lt"/>
+        <a:ea typeface="+mn-ea"/>
+        <a:cs typeface="+mn-cs"/>
+      </a:defRPr>
+    </a:lvl7pPr>
+    <a:lvl8pPr marL="3200400" algn="l" defTabSz="914400" rtl="0" eaLnBrk="1" latinLnBrk="0" hangingPunct="1">
+      <a:defRPr sz="1200" kern="1200">
+        <a:solidFill>
+          <a:schemeClr val="tx1"/>
+        </a:solidFill>
+        <a:latin typeface="+mn-lt"/>
+        <a:ea typeface="+mn-ea"/>
+        <a:cs typeface="+mn-cs"/>
+      </a:defRPr>
+    </a:lvl8pPr>
+    <a:lvl9pPr marL="3657600" algn="l" defTabSz="914400" rtl="0" eaLnBrk="1" latinLnBrk="0" hangingPunct="1">
+      <a:defRPr sz="1200" kern="1200">
+        <a:solidFill>
+          <a:schemeClr val="tx1"/>
+        </a:solidFill>
+        <a:latin typeface="+mn-lt"/>
+        <a:ea typeface="+mn-ea"/>
+        <a:cs typeface="+mn-cs"/>
+      </a:defRPr>
+    </a:lvl9pPr>
+  </p:notesStyle>
+</p:notesMaster>
+</file>
+
+<file path=ppt/notesSlides/notesSlide1.xml><?xml version="1.0" encoding="utf-8"?>
+<p:notes xmlns:a="http://schemas.openxmlformats.org/drawingml/2006/main" xmlns:r="http://schemas.openxmlformats.org/officeDocument/2006/relationships" xmlns:p="http://schemas.openxmlformats.org/presentationml/2006/main">
+  <p:cSld>
+    <p:spTree>
+      <p:nvGrpSpPr>
+        <p:cNvPr id="1" name=""/>
+        <p:cNvGrpSpPr/>
+        <p:nvPr/>
+      </p:nvGrpSpPr>
+      <p:grpSpPr>
+        <a:xfrm>
+          <a:off x="0" y="0"/>
+          <a:ext cx="0" cy="0"/>
+          <a:chOff x="0" y="0"/>
+          <a:chExt cx="0" cy="0"/>
+        </a:xfrm>
+      </p:grpSpPr>
+      <p:sp>
+        <p:nvSpPr>
+          <p:cNvPr id="2" name="Slide Image Placeholder 1"/>
+          <p:cNvSpPr>
+            <a:spLocks noGrp="1" noRot="1" noChangeAspect="1"/>
+          </p:cNvSpPr>
+          <p:nvPr>
+            <p:ph type="sldImg"/>
+          </p:nvPr>
+        </p:nvSpPr>
+        <p:spPr/>
+      </p:sp>
+      <p:sp>
+        <p:nvSpPr>
+          <p:cNvPr id="3" name="Notes Placeholder 2"/>
+          <p:cNvSpPr>
+            <a:spLocks noGrp="1"/>
+          </p:cNvSpPr>
+          <p:nvPr>
+            <p:ph type="body" idx="1"/>
+          </p:nvPr>
+        </p:nvSpPr>
+        <p:spPr/>
+        <p:txBody>
+          <a:bodyPr/>
+          <a:lstStyle/>
+          <a:p>
+            <a:r>
+              <a:rPr lang="en-US" sz="1200" dirty="0"/>
+              <a:t>11/23/2022: Added this slide to address https://jira.hl7.org/browse/FHIR-33175 as part of the STU4-ballot (to show Bundle including all referenced patient resources and </a:t>
+            </a:r>
+            <a:r>
+              <a:rPr lang="en-US" sz="1200" dirty="0" err="1"/>
+              <a:t>detectedIssue</a:t>
+            </a:r>
+            <a:r>
+              <a:rPr lang="en-US" sz="1200" dirty="0"/>
+              <a:t> as entries)</a:t>
+            </a:r>
+            <a:br>
+              <a:rPr lang="en-US" sz="1200" dirty="0"/>
+            </a:br>
+            <a:br>
+              <a:rPr lang="en-US" sz="1400" dirty="0"/>
+            </a:br>
+            <a:endParaRPr lang="en-US" dirty="0"/>
+          </a:p>
+        </p:txBody>
+      </p:sp>
+      <p:sp>
+        <p:nvSpPr>
+          <p:cNvPr id="4" name="Slide Number Placeholder 3"/>
+          <p:cNvSpPr>
+            <a:spLocks noGrp="1"/>
+          </p:cNvSpPr>
+          <p:nvPr>
+            <p:ph type="sldNum" sz="quarter" idx="5"/>
+          </p:nvPr>
+        </p:nvSpPr>
+        <p:spPr/>
+        <p:txBody>
+          <a:bodyPr/>
+          <a:lstStyle/>
+          <a:p>
+            <a:fld id="{F6C01152-882A-4CAB-AF5B-0D5B05615CCB}" type="slidenum">
+              <a:rPr lang="en-US" smtClean="0"/>
+              <a:t>7</a:t>
+            </a:fld>
+            <a:endParaRPr lang="en-US"/>
+          </a:p>
+        </p:txBody>
+      </p:sp>
+    </p:spTree>
+    <p:extLst>
+      <p:ext uri="{BB962C8B-B14F-4D97-AF65-F5344CB8AC3E}">
+        <p14:creationId xmlns:p14="http://schemas.microsoft.com/office/powerpoint/2010/main" val="1483412739"/>
+      </p:ext>
+    </p:extLst>
+  </p:cSld>
+  <p:clrMapOvr>
+    <a:masterClrMapping/>
+  </p:clrMapOvr>
+</p:notes>
 </file>
 
 <file path=ppt/slideLayouts/slideLayout1.xml><?xml version="1.0" encoding="utf-8"?>
@@ -264,7 +734,7 @@
           <a:p>
             <a:fld id="{CCEBD49B-BC6D-4065-97F6-E22D565E4F2F}" type="datetimeFigureOut">
               <a:rPr lang="en-US" smtClean="0"/>
-              <a:t>4/9/2021</a:t>
+              <a:t>11/23/2022</a:t>
             </a:fld>
             <a:endParaRPr lang="en-US"/>
           </a:p>
@@ -462,7 +932,7 @@
           <a:p>
             <a:fld id="{CCEBD49B-BC6D-4065-97F6-E22D565E4F2F}" type="datetimeFigureOut">
               <a:rPr lang="en-US" smtClean="0"/>
-              <a:t>4/9/2021</a:t>
+              <a:t>11/23/2022</a:t>
             </a:fld>
             <a:endParaRPr lang="en-US"/>
           </a:p>
@@ -670,7 +1140,7 @@
           <a:p>
             <a:fld id="{CCEBD49B-BC6D-4065-97F6-E22D565E4F2F}" type="datetimeFigureOut">
               <a:rPr lang="en-US" smtClean="0"/>
-              <a:t>4/9/2021</a:t>
+              <a:t>11/23/2022</a:t>
             </a:fld>
             <a:endParaRPr lang="en-US"/>
           </a:p>
@@ -868,7 +1338,7 @@
           <a:p>
             <a:fld id="{CCEBD49B-BC6D-4065-97F6-E22D565E4F2F}" type="datetimeFigureOut">
               <a:rPr lang="en-US" smtClean="0"/>
-              <a:t>4/9/2021</a:t>
+              <a:t>11/23/2022</a:t>
             </a:fld>
             <a:endParaRPr lang="en-US"/>
           </a:p>
@@ -1143,7 +1613,7 @@
           <a:p>
             <a:fld id="{CCEBD49B-BC6D-4065-97F6-E22D565E4F2F}" type="datetimeFigureOut">
               <a:rPr lang="en-US" smtClean="0"/>
-              <a:t>4/9/2021</a:t>
+              <a:t>11/23/2022</a:t>
             </a:fld>
             <a:endParaRPr lang="en-US"/>
           </a:p>
@@ -1408,7 +1878,7 @@
           <a:p>
             <a:fld id="{CCEBD49B-BC6D-4065-97F6-E22D565E4F2F}" type="datetimeFigureOut">
               <a:rPr lang="en-US" smtClean="0"/>
-              <a:t>4/9/2021</a:t>
+              <a:t>11/23/2022</a:t>
             </a:fld>
             <a:endParaRPr lang="en-US"/>
           </a:p>
@@ -1820,7 +2290,7 @@
           <a:p>
             <a:fld id="{CCEBD49B-BC6D-4065-97F6-E22D565E4F2F}" type="datetimeFigureOut">
               <a:rPr lang="en-US" smtClean="0"/>
-              <a:t>4/9/2021</a:t>
+              <a:t>11/23/2022</a:t>
             </a:fld>
             <a:endParaRPr lang="en-US"/>
           </a:p>
@@ -1961,7 +2431,7 @@
           <a:p>
             <a:fld id="{CCEBD49B-BC6D-4065-97F6-E22D565E4F2F}" type="datetimeFigureOut">
               <a:rPr lang="en-US" smtClean="0"/>
-              <a:t>4/9/2021</a:t>
+              <a:t>11/23/2022</a:t>
             </a:fld>
             <a:endParaRPr lang="en-US"/>
           </a:p>
@@ -2074,7 +2544,7 @@
           <a:p>
             <a:fld id="{CCEBD49B-BC6D-4065-97F6-E22D565E4F2F}" type="datetimeFigureOut">
               <a:rPr lang="en-US" smtClean="0"/>
-              <a:t>4/9/2021</a:t>
+              <a:t>11/23/2022</a:t>
             </a:fld>
             <a:endParaRPr lang="en-US"/>
           </a:p>
@@ -2385,7 +2855,7 @@
           <a:p>
             <a:fld id="{CCEBD49B-BC6D-4065-97F6-E22D565E4F2F}" type="datetimeFigureOut">
               <a:rPr lang="en-US" smtClean="0"/>
-              <a:t>4/9/2021</a:t>
+              <a:t>11/23/2022</a:t>
             </a:fld>
             <a:endParaRPr lang="en-US"/>
           </a:p>
@@ -2673,7 +3143,7 @@
           <a:p>
             <a:fld id="{CCEBD49B-BC6D-4065-97F6-E22D565E4F2F}" type="datetimeFigureOut">
               <a:rPr lang="en-US" smtClean="0"/>
-              <a:t>4/9/2021</a:t>
+              <a:t>11/23/2022</a:t>
             </a:fld>
             <a:endParaRPr lang="en-US"/>
           </a:p>
@@ -2914,7 +3384,7 @@
           <a:p>
             <a:fld id="{CCEBD49B-BC6D-4065-97F6-E22D565E4F2F}" type="datetimeFigureOut">
               <a:rPr lang="en-US" smtClean="0"/>
-              <a:t>4/9/2021</a:t>
+              <a:t>11/23/2022</a:t>
             </a:fld>
             <a:endParaRPr lang="en-US"/>
           </a:p>
@@ -7215,6 +7685,2489 @@
 </p:sld>
 </file>
 
+<file path=ppt/slides/slide7.xml><?xml version="1.0" encoding="utf-8"?>
+<p:sld xmlns:a="http://schemas.openxmlformats.org/drawingml/2006/main" xmlns:r="http://schemas.openxmlformats.org/officeDocument/2006/relationships" xmlns:p="http://schemas.openxmlformats.org/presentationml/2006/main">
+  <p:cSld>
+    <p:spTree>
+      <p:nvGrpSpPr>
+        <p:cNvPr id="1" name=""/>
+        <p:cNvGrpSpPr/>
+        <p:nvPr/>
+      </p:nvGrpSpPr>
+      <p:grpSpPr>
+        <a:xfrm>
+          <a:off x="0" y="0"/>
+          <a:ext cx="0" cy="0"/>
+          <a:chOff x="0" y="0"/>
+          <a:chExt cx="0" cy="0"/>
+        </a:xfrm>
+      </p:grpSpPr>
+      <p:sp>
+        <p:nvSpPr>
+          <p:cNvPr id="2" name="Title 1">
+            <a:extLst>
+              <a:ext uri="{FF2B5EF4-FFF2-40B4-BE49-F238E27FC236}">
+                <a16:creationId xmlns:a16="http://schemas.microsoft.com/office/drawing/2014/main" id="{66FC9293-5253-4045-B6FF-0BF8D01B1EC4}"/>
+              </a:ext>
+            </a:extLst>
+          </p:cNvPr>
+          <p:cNvSpPr>
+            <a:spLocks noGrp="1"/>
+          </p:cNvSpPr>
+          <p:nvPr>
+            <p:ph type="title"/>
+          </p:nvPr>
+        </p:nvSpPr>
+        <p:spPr>
+          <a:xfrm>
+            <a:off x="838199" y="365125"/>
+            <a:ext cx="11056557" cy="1325563"/>
+          </a:xfrm>
+        </p:spPr>
+        <p:txBody>
+          <a:bodyPr/>
+          <a:lstStyle/>
+          <a:p>
+            <a:r>
+              <a:rPr lang="en-US" sz="3200" dirty="0"/>
+              <a:t>DEQM Gaps In Care Bundle </a:t>
+            </a:r>
+            <a:endParaRPr lang="en-US" dirty="0"/>
+          </a:p>
+        </p:txBody>
+      </p:sp>
+      <p:sp>
+        <p:nvSpPr>
+          <p:cNvPr id="3" name="Content Placeholder 2">
+            <a:extLst>
+              <a:ext uri="{FF2B5EF4-FFF2-40B4-BE49-F238E27FC236}">
+                <a16:creationId xmlns:a16="http://schemas.microsoft.com/office/drawing/2014/main" id="{059F4AA5-BD88-4606-ACB3-39118129AFB3}"/>
+              </a:ext>
+            </a:extLst>
+          </p:cNvPr>
+          <p:cNvSpPr>
+            <a:spLocks noGrp="1"/>
+          </p:cNvSpPr>
+          <p:nvPr>
+            <p:ph idx="1"/>
+          </p:nvPr>
+        </p:nvSpPr>
+        <p:spPr>
+          <a:xfrm>
+            <a:off x="409406" y="1441841"/>
+            <a:ext cx="11185124" cy="5142461"/>
+          </a:xfrm>
+        </p:spPr>
+        <p:txBody>
+          <a:bodyPr/>
+          <a:lstStyle/>
+          <a:p>
+            <a:pPr marL="0" indent="0">
+              <a:buNone/>
+            </a:pPr>
+            <a:r>
+              <a:rPr lang="en-US" dirty="0"/>
+              <a:t> </a:t>
+            </a:r>
+          </a:p>
+        </p:txBody>
+      </p:sp>
+      <p:sp>
+        <p:nvSpPr>
+          <p:cNvPr id="4" name="Flowchart: Process 3">
+            <a:extLst>
+              <a:ext uri="{FF2B5EF4-FFF2-40B4-BE49-F238E27FC236}">
+                <a16:creationId xmlns:a16="http://schemas.microsoft.com/office/drawing/2014/main" id="{3DEA0A30-6A6C-4FA4-B9FC-7A051391A0D6}"/>
+              </a:ext>
+            </a:extLst>
+          </p:cNvPr>
+          <p:cNvSpPr/>
+          <p:nvPr/>
+        </p:nvSpPr>
+        <p:spPr>
+          <a:xfrm>
+            <a:off x="3949212" y="1818397"/>
+            <a:ext cx="1864311" cy="613637"/>
+          </a:xfrm>
+          <a:prstGeom prst="flowChartProcess">
+            <a:avLst/>
+          </a:prstGeom>
+          <a:ln>
+            <a:solidFill>
+              <a:schemeClr val="tx1"/>
+            </a:solidFill>
+          </a:ln>
+        </p:spPr>
+        <p:style>
+          <a:lnRef idx="2">
+            <a:schemeClr val="accent1">
+              <a:shade val="50000"/>
+            </a:schemeClr>
+          </a:lnRef>
+          <a:fillRef idx="1">
+            <a:schemeClr val="accent1"/>
+          </a:fillRef>
+          <a:effectRef idx="0">
+            <a:schemeClr val="accent1"/>
+          </a:effectRef>
+          <a:fontRef idx="minor">
+            <a:schemeClr val="lt1"/>
+          </a:fontRef>
+        </p:style>
+        <p:txBody>
+          <a:bodyPr rtlCol="0" anchor="ctr"/>
+          <a:lstStyle/>
+          <a:p>
+            <a:pPr algn="ctr"/>
+            <a:r>
+              <a:rPr lang="en-US" sz="1600" dirty="0"/>
+              <a:t>GIC Composition</a:t>
+            </a:r>
+          </a:p>
+        </p:txBody>
+      </p:sp>
+      <p:sp>
+        <p:nvSpPr>
+          <p:cNvPr id="5" name="Flowchart: Process 4">
+            <a:extLst>
+              <a:ext uri="{FF2B5EF4-FFF2-40B4-BE49-F238E27FC236}">
+                <a16:creationId xmlns:a16="http://schemas.microsoft.com/office/drawing/2014/main" id="{B7A7E221-C938-4426-AA48-B09EFF0C8A7E}"/>
+              </a:ext>
+            </a:extLst>
+          </p:cNvPr>
+          <p:cNvSpPr/>
+          <p:nvPr/>
+        </p:nvSpPr>
+        <p:spPr>
+          <a:xfrm>
+            <a:off x="607740" y="1820994"/>
+            <a:ext cx="1864311" cy="611431"/>
+          </a:xfrm>
+          <a:prstGeom prst="flowChartProcess">
+            <a:avLst/>
+          </a:prstGeom>
+          <a:ln>
+            <a:solidFill>
+              <a:schemeClr val="tx1"/>
+            </a:solidFill>
+          </a:ln>
+        </p:spPr>
+        <p:style>
+          <a:lnRef idx="2">
+            <a:schemeClr val="accent1">
+              <a:shade val="50000"/>
+            </a:schemeClr>
+          </a:lnRef>
+          <a:fillRef idx="1">
+            <a:schemeClr val="accent1"/>
+          </a:fillRef>
+          <a:effectRef idx="0">
+            <a:schemeClr val="accent1"/>
+          </a:effectRef>
+          <a:fontRef idx="minor">
+            <a:schemeClr val="lt1"/>
+          </a:fontRef>
+        </p:style>
+        <p:txBody>
+          <a:bodyPr rtlCol="0" anchor="ctr"/>
+          <a:lstStyle/>
+          <a:p>
+            <a:pPr algn="ctr"/>
+            <a:r>
+              <a:rPr lang="en-US" sz="1600" dirty="0"/>
+              <a:t>GIC Bundle</a:t>
+            </a:r>
+          </a:p>
+        </p:txBody>
+      </p:sp>
+      <p:sp>
+        <p:nvSpPr>
+          <p:cNvPr id="7" name="Flowchart: Process 6">
+            <a:extLst>
+              <a:ext uri="{FF2B5EF4-FFF2-40B4-BE49-F238E27FC236}">
+                <a16:creationId xmlns:a16="http://schemas.microsoft.com/office/drawing/2014/main" id="{C91FCB4F-F2B6-436E-9248-D1FB7A9503A1}"/>
+              </a:ext>
+            </a:extLst>
+          </p:cNvPr>
+          <p:cNvSpPr/>
+          <p:nvPr/>
+        </p:nvSpPr>
+        <p:spPr>
+          <a:xfrm>
+            <a:off x="3949210" y="2681763"/>
+            <a:ext cx="1864311" cy="613637"/>
+          </a:xfrm>
+          <a:prstGeom prst="flowChartProcess">
+            <a:avLst/>
+          </a:prstGeom>
+          <a:ln>
+            <a:solidFill>
+              <a:schemeClr val="tx1"/>
+            </a:solidFill>
+          </a:ln>
+        </p:spPr>
+        <p:style>
+          <a:lnRef idx="2">
+            <a:schemeClr val="accent1">
+              <a:shade val="50000"/>
+            </a:schemeClr>
+          </a:lnRef>
+          <a:fillRef idx="1">
+            <a:schemeClr val="accent1"/>
+          </a:fillRef>
+          <a:effectRef idx="0">
+            <a:schemeClr val="accent1"/>
+          </a:effectRef>
+          <a:fontRef idx="minor">
+            <a:schemeClr val="lt1"/>
+          </a:fontRef>
+        </p:style>
+        <p:txBody>
+          <a:bodyPr rtlCol="0" anchor="ctr"/>
+          <a:lstStyle/>
+          <a:p>
+            <a:pPr algn="ctr"/>
+            <a:r>
+              <a:rPr lang="en-US" sz="1600" dirty="0"/>
+              <a:t>GIC Measure Report  </a:t>
+            </a:r>
+            <a:r>
+              <a:rPr lang="en-US" sz="1000" dirty="0"/>
+              <a:t>Colorectal Cancer Screening</a:t>
+            </a:r>
+          </a:p>
+        </p:txBody>
+      </p:sp>
+      <p:sp>
+        <p:nvSpPr>
+          <p:cNvPr id="13" name="Flowchart: Process 12">
+            <a:extLst>
+              <a:ext uri="{FF2B5EF4-FFF2-40B4-BE49-F238E27FC236}">
+                <a16:creationId xmlns:a16="http://schemas.microsoft.com/office/drawing/2014/main" id="{7C494011-9B4B-4108-B2F1-32F5A7D22803}"/>
+              </a:ext>
+            </a:extLst>
+          </p:cNvPr>
+          <p:cNvSpPr/>
+          <p:nvPr/>
+        </p:nvSpPr>
+        <p:spPr>
+          <a:xfrm>
+            <a:off x="3949209" y="3520726"/>
+            <a:ext cx="1864311" cy="555563"/>
+          </a:xfrm>
+          <a:prstGeom prst="flowChartProcess">
+            <a:avLst/>
+          </a:prstGeom>
+          <a:ln>
+            <a:solidFill>
+              <a:schemeClr val="tx1"/>
+            </a:solidFill>
+          </a:ln>
+        </p:spPr>
+        <p:style>
+          <a:lnRef idx="2">
+            <a:schemeClr val="accent1">
+              <a:shade val="50000"/>
+            </a:schemeClr>
+          </a:lnRef>
+          <a:fillRef idx="1">
+            <a:schemeClr val="accent1"/>
+          </a:fillRef>
+          <a:effectRef idx="0">
+            <a:schemeClr val="accent1"/>
+          </a:effectRef>
+          <a:fontRef idx="minor">
+            <a:schemeClr val="lt1"/>
+          </a:fontRef>
+        </p:style>
+        <p:txBody>
+          <a:bodyPr rtlCol="0" anchor="ctr"/>
+          <a:lstStyle/>
+          <a:p>
+            <a:pPr algn="ctr"/>
+            <a:r>
+              <a:rPr lang="en-US" sz="1600" dirty="0"/>
+              <a:t>QI Core Patient</a:t>
+            </a:r>
+          </a:p>
+        </p:txBody>
+      </p:sp>
+      <p:sp>
+        <p:nvSpPr>
+          <p:cNvPr id="15" name="Flowchart: Process 14">
+            <a:extLst>
+              <a:ext uri="{FF2B5EF4-FFF2-40B4-BE49-F238E27FC236}">
+                <a16:creationId xmlns:a16="http://schemas.microsoft.com/office/drawing/2014/main" id="{AAB520D8-1327-4035-B17F-8E435832F332}"/>
+              </a:ext>
+            </a:extLst>
+          </p:cNvPr>
+          <p:cNvSpPr/>
+          <p:nvPr/>
+        </p:nvSpPr>
+        <p:spPr>
+          <a:xfrm>
+            <a:off x="10169285" y="2693356"/>
+            <a:ext cx="1864310" cy="555676"/>
+          </a:xfrm>
+          <a:prstGeom prst="flowChartProcess">
+            <a:avLst/>
+          </a:prstGeom>
+          <a:solidFill>
+            <a:schemeClr val="accent5">
+              <a:lumMod val="60000"/>
+              <a:lumOff val="40000"/>
+            </a:schemeClr>
+          </a:solidFill>
+          <a:ln>
+            <a:noFill/>
+          </a:ln>
+        </p:spPr>
+        <p:style>
+          <a:lnRef idx="2">
+            <a:schemeClr val="accent1">
+              <a:shade val="50000"/>
+            </a:schemeClr>
+          </a:lnRef>
+          <a:fillRef idx="1">
+            <a:schemeClr val="accent1"/>
+          </a:fillRef>
+          <a:effectRef idx="0">
+            <a:schemeClr val="accent1"/>
+          </a:effectRef>
+          <a:fontRef idx="minor">
+            <a:schemeClr val="lt1"/>
+          </a:fontRef>
+        </p:style>
+        <p:txBody>
+          <a:bodyPr rtlCol="0" anchor="ctr"/>
+          <a:lstStyle/>
+          <a:p>
+            <a:pPr algn="ctr"/>
+            <a:r>
+              <a:rPr lang="en-US" sz="1600" dirty="0"/>
+              <a:t>QI Core Lab Observation</a:t>
+            </a:r>
+          </a:p>
+          <a:p>
+            <a:pPr algn="ctr"/>
+            <a:r>
+              <a:rPr lang="en-US" sz="1000" dirty="0"/>
+              <a:t>FOBT</a:t>
+            </a:r>
+          </a:p>
+        </p:txBody>
+      </p:sp>
+      <p:sp>
+        <p:nvSpPr>
+          <p:cNvPr id="16" name="Flowchart: Process 15">
+            <a:extLst>
+              <a:ext uri="{FF2B5EF4-FFF2-40B4-BE49-F238E27FC236}">
+                <a16:creationId xmlns:a16="http://schemas.microsoft.com/office/drawing/2014/main" id="{820EB801-38A6-47AA-A42B-B341458DA83D}"/>
+              </a:ext>
+            </a:extLst>
+          </p:cNvPr>
+          <p:cNvSpPr/>
+          <p:nvPr/>
+        </p:nvSpPr>
+        <p:spPr>
+          <a:xfrm>
+            <a:off x="3955723" y="5106004"/>
+            <a:ext cx="1864311" cy="562122"/>
+          </a:xfrm>
+          <a:prstGeom prst="flowChartProcess">
+            <a:avLst/>
+          </a:prstGeom>
+          <a:ln>
+            <a:solidFill>
+              <a:schemeClr val="tx1"/>
+            </a:solidFill>
+          </a:ln>
+        </p:spPr>
+        <p:style>
+          <a:lnRef idx="2">
+            <a:schemeClr val="accent1">
+              <a:shade val="50000"/>
+            </a:schemeClr>
+          </a:lnRef>
+          <a:fillRef idx="1">
+            <a:schemeClr val="accent1"/>
+          </a:fillRef>
+          <a:effectRef idx="0">
+            <a:schemeClr val="accent1"/>
+          </a:effectRef>
+          <a:fontRef idx="minor">
+            <a:schemeClr val="lt1"/>
+          </a:fontRef>
+        </p:style>
+        <p:txBody>
+          <a:bodyPr rtlCol="0" anchor="ctr"/>
+          <a:lstStyle/>
+          <a:p>
+            <a:pPr algn="ctr"/>
+            <a:r>
+              <a:rPr lang="en-US" sz="1600" dirty="0"/>
+              <a:t>QI Core Organization</a:t>
+            </a:r>
+          </a:p>
+        </p:txBody>
+      </p:sp>
+      <p:cxnSp>
+        <p:nvCxnSpPr>
+          <p:cNvPr id="44" name="Straight Arrow Connector 43">
+            <a:extLst>
+              <a:ext uri="{FF2B5EF4-FFF2-40B4-BE49-F238E27FC236}">
+                <a16:creationId xmlns:a16="http://schemas.microsoft.com/office/drawing/2014/main" id="{5CF496CA-7DA1-4920-B8A9-499D311987BA}"/>
+              </a:ext>
+            </a:extLst>
+          </p:cNvPr>
+          <p:cNvCxnSpPr>
+            <a:cxnSpLocks/>
+            <a:stCxn id="90" idx="3"/>
+            <a:endCxn id="15" idx="1"/>
+          </p:cNvCxnSpPr>
+          <p:nvPr/>
+        </p:nvCxnSpPr>
+        <p:spPr>
+          <a:xfrm>
+            <a:off x="8794616" y="2123167"/>
+            <a:ext cx="1374669" cy="848027"/>
+          </a:xfrm>
+          <a:prstGeom prst="straightConnector1">
+            <a:avLst/>
+          </a:prstGeom>
+          <a:ln>
+            <a:solidFill>
+              <a:srgbClr val="0070C0"/>
+            </a:solidFill>
+            <a:tailEnd type="triangle"/>
+          </a:ln>
+        </p:spPr>
+        <p:style>
+          <a:lnRef idx="1">
+            <a:schemeClr val="accent1"/>
+          </a:lnRef>
+          <a:fillRef idx="0">
+            <a:schemeClr val="accent1"/>
+          </a:fillRef>
+          <a:effectRef idx="0">
+            <a:schemeClr val="accent1"/>
+          </a:effectRef>
+          <a:fontRef idx="minor">
+            <a:schemeClr val="tx1"/>
+          </a:fontRef>
+        </p:style>
+      </p:cxnSp>
+      <p:sp>
+        <p:nvSpPr>
+          <p:cNvPr id="90" name="Flowchart: Process 89">
+            <a:extLst>
+              <a:ext uri="{FF2B5EF4-FFF2-40B4-BE49-F238E27FC236}">
+                <a16:creationId xmlns:a16="http://schemas.microsoft.com/office/drawing/2014/main" id="{7A044D70-BFF3-405C-AFEC-F728F8A25F68}"/>
+              </a:ext>
+            </a:extLst>
+          </p:cNvPr>
+          <p:cNvSpPr/>
+          <p:nvPr/>
+        </p:nvSpPr>
+        <p:spPr>
+          <a:xfrm>
+            <a:off x="6930305" y="1842106"/>
+            <a:ext cx="1864311" cy="562122"/>
+          </a:xfrm>
+          <a:prstGeom prst="flowChartProcess">
+            <a:avLst/>
+          </a:prstGeom>
+          <a:solidFill>
+            <a:schemeClr val="accent5">
+              <a:lumMod val="60000"/>
+              <a:lumOff val="40000"/>
+            </a:schemeClr>
+          </a:solidFill>
+          <a:ln>
+            <a:noFill/>
+          </a:ln>
+        </p:spPr>
+        <p:style>
+          <a:lnRef idx="2">
+            <a:schemeClr val="accent1">
+              <a:shade val="50000"/>
+            </a:schemeClr>
+          </a:lnRef>
+          <a:fillRef idx="1">
+            <a:schemeClr val="accent1"/>
+          </a:fillRef>
+          <a:effectRef idx="0">
+            <a:schemeClr val="accent1"/>
+          </a:effectRef>
+          <a:fontRef idx="minor">
+            <a:schemeClr val="lt1"/>
+          </a:fontRef>
+        </p:style>
+        <p:txBody>
+          <a:bodyPr rtlCol="0" anchor="ctr"/>
+          <a:lstStyle/>
+          <a:p>
+            <a:pPr algn="ctr"/>
+            <a:r>
+              <a:rPr lang="en-US" sz="1600" dirty="0"/>
+              <a:t>GIC Measure Report</a:t>
+            </a:r>
+          </a:p>
+          <a:p>
+            <a:pPr algn="ctr"/>
+            <a:r>
+              <a:rPr lang="en-US" sz="1000" dirty="0"/>
+              <a:t>Colorectal Cancer Screening</a:t>
+            </a:r>
+          </a:p>
+        </p:txBody>
+      </p:sp>
+      <p:cxnSp>
+        <p:nvCxnSpPr>
+          <p:cNvPr id="144" name="Straight Arrow Connector 143">
+            <a:extLst>
+              <a:ext uri="{FF2B5EF4-FFF2-40B4-BE49-F238E27FC236}">
+                <a16:creationId xmlns:a16="http://schemas.microsoft.com/office/drawing/2014/main" id="{CA185091-BF8F-45FC-9DB1-E755F7475568}"/>
+              </a:ext>
+            </a:extLst>
+          </p:cNvPr>
+          <p:cNvCxnSpPr>
+            <a:cxnSpLocks/>
+            <a:stCxn id="5" idx="3"/>
+            <a:endCxn id="7" idx="1"/>
+          </p:cNvCxnSpPr>
+          <p:nvPr/>
+        </p:nvCxnSpPr>
+        <p:spPr>
+          <a:xfrm>
+            <a:off x="2472051" y="2126710"/>
+            <a:ext cx="1477159" cy="861872"/>
+          </a:xfrm>
+          <a:prstGeom prst="straightConnector1">
+            <a:avLst/>
+          </a:prstGeom>
+          <a:ln>
+            <a:solidFill>
+              <a:schemeClr val="tx1"/>
+            </a:solidFill>
+            <a:tailEnd type="triangle"/>
+          </a:ln>
+        </p:spPr>
+        <p:style>
+          <a:lnRef idx="1">
+            <a:schemeClr val="accent1"/>
+          </a:lnRef>
+          <a:fillRef idx="0">
+            <a:schemeClr val="accent1"/>
+          </a:fillRef>
+          <a:effectRef idx="0">
+            <a:schemeClr val="accent1"/>
+          </a:effectRef>
+          <a:fontRef idx="minor">
+            <a:schemeClr val="tx1"/>
+          </a:fontRef>
+        </p:style>
+      </p:cxnSp>
+      <p:cxnSp>
+        <p:nvCxnSpPr>
+          <p:cNvPr id="150" name="Straight Arrow Connector 149">
+            <a:extLst>
+              <a:ext uri="{FF2B5EF4-FFF2-40B4-BE49-F238E27FC236}">
+                <a16:creationId xmlns:a16="http://schemas.microsoft.com/office/drawing/2014/main" id="{B0A502EB-4FA3-419A-B0EE-C00113470861}"/>
+              </a:ext>
+            </a:extLst>
+          </p:cNvPr>
+          <p:cNvCxnSpPr>
+            <a:cxnSpLocks/>
+            <a:stCxn id="5" idx="3"/>
+            <a:endCxn id="4" idx="1"/>
+          </p:cNvCxnSpPr>
+          <p:nvPr/>
+        </p:nvCxnSpPr>
+        <p:spPr>
+          <a:xfrm flipV="1">
+            <a:off x="2472051" y="2125216"/>
+            <a:ext cx="1477161" cy="1494"/>
+          </a:xfrm>
+          <a:prstGeom prst="straightConnector1">
+            <a:avLst/>
+          </a:prstGeom>
+          <a:ln>
+            <a:solidFill>
+              <a:schemeClr val="tx1"/>
+            </a:solidFill>
+            <a:tailEnd type="triangle"/>
+          </a:ln>
+        </p:spPr>
+        <p:style>
+          <a:lnRef idx="1">
+            <a:schemeClr val="accent1"/>
+          </a:lnRef>
+          <a:fillRef idx="0">
+            <a:schemeClr val="accent1"/>
+          </a:fillRef>
+          <a:effectRef idx="0">
+            <a:schemeClr val="accent1"/>
+          </a:effectRef>
+          <a:fontRef idx="minor">
+            <a:schemeClr val="tx1"/>
+          </a:fontRef>
+        </p:style>
+      </p:cxnSp>
+      <p:sp>
+        <p:nvSpPr>
+          <p:cNvPr id="165" name="TextBox 164">
+            <a:extLst>
+              <a:ext uri="{FF2B5EF4-FFF2-40B4-BE49-F238E27FC236}">
+                <a16:creationId xmlns:a16="http://schemas.microsoft.com/office/drawing/2014/main" id="{8F126E68-CFBC-4650-89F4-8608C59D3052}"/>
+              </a:ext>
+            </a:extLst>
+          </p:cNvPr>
+          <p:cNvSpPr txBox="1"/>
+          <p:nvPr/>
+        </p:nvSpPr>
+        <p:spPr>
+          <a:xfrm>
+            <a:off x="3062513" y="2010190"/>
+            <a:ext cx="459578" cy="230832"/>
+          </a:xfrm>
+          <a:prstGeom prst="rect">
+            <a:avLst/>
+          </a:prstGeom>
+          <a:solidFill>
+            <a:schemeClr val="bg1"/>
+          </a:solidFill>
+        </p:spPr>
+        <p:txBody>
+          <a:bodyPr wrap="square" rtlCol="0">
+            <a:spAutoFit/>
+          </a:bodyPr>
+          <a:lstStyle/>
+          <a:p>
+            <a:r>
+              <a:rPr lang="en-US" sz="900" b="1" dirty="0"/>
+              <a:t>entry</a:t>
+            </a:r>
+          </a:p>
+        </p:txBody>
+      </p:sp>
+      <p:cxnSp>
+        <p:nvCxnSpPr>
+          <p:cNvPr id="74" name="Straight Arrow Connector 73">
+            <a:extLst>
+              <a:ext uri="{FF2B5EF4-FFF2-40B4-BE49-F238E27FC236}">
+                <a16:creationId xmlns:a16="http://schemas.microsoft.com/office/drawing/2014/main" id="{2E6884AB-C746-476C-9C61-B73BD4DBC3EF}"/>
+              </a:ext>
+            </a:extLst>
+          </p:cNvPr>
+          <p:cNvCxnSpPr>
+            <a:cxnSpLocks/>
+            <a:stCxn id="90" idx="3"/>
+            <a:endCxn id="85" idx="1"/>
+          </p:cNvCxnSpPr>
+          <p:nvPr/>
+        </p:nvCxnSpPr>
+        <p:spPr>
+          <a:xfrm flipV="1">
+            <a:off x="8794616" y="2115991"/>
+            <a:ext cx="1374669" cy="7176"/>
+          </a:xfrm>
+          <a:prstGeom prst="straightConnector1">
+            <a:avLst/>
+          </a:prstGeom>
+          <a:ln>
+            <a:solidFill>
+              <a:srgbClr val="0070C0"/>
+            </a:solidFill>
+            <a:tailEnd type="triangle"/>
+          </a:ln>
+        </p:spPr>
+        <p:style>
+          <a:lnRef idx="1">
+            <a:schemeClr val="accent1"/>
+          </a:lnRef>
+          <a:fillRef idx="0">
+            <a:schemeClr val="accent1"/>
+          </a:fillRef>
+          <a:effectRef idx="0">
+            <a:schemeClr val="accent1"/>
+          </a:effectRef>
+          <a:fontRef idx="minor">
+            <a:schemeClr val="tx1"/>
+          </a:fontRef>
+        </p:style>
+      </p:cxnSp>
+      <p:sp>
+        <p:nvSpPr>
+          <p:cNvPr id="83" name="TextBox 82">
+            <a:extLst>
+              <a:ext uri="{FF2B5EF4-FFF2-40B4-BE49-F238E27FC236}">
+                <a16:creationId xmlns:a16="http://schemas.microsoft.com/office/drawing/2014/main" id="{EC33D804-3ACB-4A94-BAA0-8AC1C285E5BC}"/>
+              </a:ext>
+            </a:extLst>
+          </p:cNvPr>
+          <p:cNvSpPr txBox="1"/>
+          <p:nvPr/>
+        </p:nvSpPr>
+        <p:spPr>
+          <a:xfrm>
+            <a:off x="3068722" y="2427311"/>
+            <a:ext cx="459578" cy="230832"/>
+          </a:xfrm>
+          <a:prstGeom prst="rect">
+            <a:avLst/>
+          </a:prstGeom>
+          <a:solidFill>
+            <a:schemeClr val="bg1"/>
+          </a:solidFill>
+        </p:spPr>
+        <p:txBody>
+          <a:bodyPr wrap="square" rtlCol="0">
+            <a:spAutoFit/>
+          </a:bodyPr>
+          <a:lstStyle/>
+          <a:p>
+            <a:r>
+              <a:rPr lang="en-US" sz="900" b="1" dirty="0"/>
+              <a:t>entry</a:t>
+            </a:r>
+          </a:p>
+        </p:txBody>
+      </p:sp>
+      <p:sp>
+        <p:nvSpPr>
+          <p:cNvPr id="85" name="Flowchart: Process 84">
+            <a:extLst>
+              <a:ext uri="{FF2B5EF4-FFF2-40B4-BE49-F238E27FC236}">
+                <a16:creationId xmlns:a16="http://schemas.microsoft.com/office/drawing/2014/main" id="{459A40C6-A2DD-4FF8-A8AA-DA7682C8A67F}"/>
+              </a:ext>
+            </a:extLst>
+          </p:cNvPr>
+          <p:cNvSpPr/>
+          <p:nvPr/>
+        </p:nvSpPr>
+        <p:spPr>
+          <a:xfrm>
+            <a:off x="10169285" y="1826344"/>
+            <a:ext cx="1864311" cy="579294"/>
+          </a:xfrm>
+          <a:prstGeom prst="flowChartProcess">
+            <a:avLst/>
+          </a:prstGeom>
+          <a:solidFill>
+            <a:schemeClr val="accent5">
+              <a:lumMod val="60000"/>
+              <a:lumOff val="40000"/>
+            </a:schemeClr>
+          </a:solidFill>
+          <a:ln>
+            <a:noFill/>
+          </a:ln>
+        </p:spPr>
+        <p:style>
+          <a:lnRef idx="2">
+            <a:schemeClr val="accent1">
+              <a:shade val="50000"/>
+            </a:schemeClr>
+          </a:lnRef>
+          <a:fillRef idx="1">
+            <a:schemeClr val="accent1"/>
+          </a:fillRef>
+          <a:effectRef idx="0">
+            <a:schemeClr val="accent1"/>
+          </a:effectRef>
+          <a:fontRef idx="minor">
+            <a:schemeClr val="lt1"/>
+          </a:fontRef>
+        </p:style>
+        <p:txBody>
+          <a:bodyPr rtlCol="0" anchor="ctr"/>
+          <a:lstStyle/>
+          <a:p>
+            <a:pPr algn="ctr"/>
+            <a:r>
+              <a:rPr lang="en-US" sz="1600" dirty="0"/>
+              <a:t>QI Core Procedure</a:t>
+            </a:r>
+          </a:p>
+          <a:p>
+            <a:pPr algn="ctr"/>
+            <a:r>
+              <a:rPr lang="en-US" sz="1000" dirty="0"/>
+              <a:t>Colonoscopy</a:t>
+            </a:r>
+          </a:p>
+        </p:txBody>
+      </p:sp>
+      <p:sp>
+        <p:nvSpPr>
+          <p:cNvPr id="92" name="TextBox 91">
+            <a:extLst>
+              <a:ext uri="{FF2B5EF4-FFF2-40B4-BE49-F238E27FC236}">
+                <a16:creationId xmlns:a16="http://schemas.microsoft.com/office/drawing/2014/main" id="{256D41B1-7258-4F0F-BD63-042E925EE294}"/>
+              </a:ext>
+            </a:extLst>
+          </p:cNvPr>
+          <p:cNvSpPr txBox="1"/>
+          <p:nvPr/>
+        </p:nvSpPr>
+        <p:spPr>
+          <a:xfrm>
+            <a:off x="8944855" y="1995343"/>
+            <a:ext cx="1124767" cy="230832"/>
+          </a:xfrm>
+          <a:prstGeom prst="rect">
+            <a:avLst/>
+          </a:prstGeom>
+          <a:solidFill>
+            <a:schemeClr val="bg1"/>
+          </a:solidFill>
+        </p:spPr>
+        <p:txBody>
+          <a:bodyPr wrap="square" rtlCol="0">
+            <a:spAutoFit/>
+          </a:bodyPr>
+          <a:lstStyle/>
+          <a:p>
+            <a:r>
+              <a:rPr lang="en-US" sz="900" b="1" dirty="0">
+                <a:solidFill>
+                  <a:srgbClr val="0070C0"/>
+                </a:solidFill>
+              </a:rPr>
+              <a:t>evaluatedResource</a:t>
+            </a:r>
+          </a:p>
+        </p:txBody>
+      </p:sp>
+      <p:sp>
+        <p:nvSpPr>
+          <p:cNvPr id="93" name="TextBox 92">
+            <a:extLst>
+              <a:ext uri="{FF2B5EF4-FFF2-40B4-BE49-F238E27FC236}">
+                <a16:creationId xmlns:a16="http://schemas.microsoft.com/office/drawing/2014/main" id="{CF96B318-5A4B-490A-BA0D-87129D69D185}"/>
+              </a:ext>
+            </a:extLst>
+          </p:cNvPr>
+          <p:cNvSpPr txBox="1"/>
+          <p:nvPr/>
+        </p:nvSpPr>
+        <p:spPr>
+          <a:xfrm>
+            <a:off x="9124500" y="2416989"/>
+            <a:ext cx="1124767" cy="230832"/>
+          </a:xfrm>
+          <a:prstGeom prst="rect">
+            <a:avLst/>
+          </a:prstGeom>
+          <a:solidFill>
+            <a:schemeClr val="bg1"/>
+          </a:solidFill>
+        </p:spPr>
+        <p:txBody>
+          <a:bodyPr wrap="square" rtlCol="0">
+            <a:spAutoFit/>
+          </a:bodyPr>
+          <a:lstStyle/>
+          <a:p>
+            <a:r>
+              <a:rPr lang="en-US" sz="900" b="1" dirty="0">
+                <a:solidFill>
+                  <a:srgbClr val="0070C0"/>
+                </a:solidFill>
+              </a:rPr>
+              <a:t>evaluatedResource</a:t>
+            </a:r>
+          </a:p>
+        </p:txBody>
+      </p:sp>
+      <p:sp>
+        <p:nvSpPr>
+          <p:cNvPr id="109" name="Flowchart: Process 108">
+            <a:extLst>
+              <a:ext uri="{FF2B5EF4-FFF2-40B4-BE49-F238E27FC236}">
+                <a16:creationId xmlns:a16="http://schemas.microsoft.com/office/drawing/2014/main" id="{66370999-9EAF-4768-A4BF-B743314184F8}"/>
+              </a:ext>
+            </a:extLst>
+          </p:cNvPr>
+          <p:cNvSpPr/>
+          <p:nvPr/>
+        </p:nvSpPr>
+        <p:spPr>
+          <a:xfrm>
+            <a:off x="3964192" y="4356428"/>
+            <a:ext cx="1864311" cy="562122"/>
+          </a:xfrm>
+          <a:prstGeom prst="flowChartProcess">
+            <a:avLst/>
+          </a:prstGeom>
+          <a:ln>
+            <a:solidFill>
+              <a:schemeClr val="tx1"/>
+            </a:solidFill>
+          </a:ln>
+        </p:spPr>
+        <p:style>
+          <a:lnRef idx="2">
+            <a:schemeClr val="accent1">
+              <a:shade val="50000"/>
+            </a:schemeClr>
+          </a:lnRef>
+          <a:fillRef idx="1">
+            <a:schemeClr val="accent1"/>
+          </a:fillRef>
+          <a:effectRef idx="0">
+            <a:schemeClr val="accent1"/>
+          </a:effectRef>
+          <a:fontRef idx="minor">
+            <a:schemeClr val="lt1"/>
+          </a:fontRef>
+        </p:style>
+        <p:txBody>
+          <a:bodyPr rtlCol="0" anchor="ctr"/>
+          <a:lstStyle/>
+          <a:p>
+            <a:pPr algn="ctr"/>
+            <a:r>
+              <a:rPr lang="en-US" sz="1600" dirty="0"/>
+              <a:t>GIC Detected Issue</a:t>
+            </a:r>
+          </a:p>
+        </p:txBody>
+      </p:sp>
+      <p:cxnSp>
+        <p:nvCxnSpPr>
+          <p:cNvPr id="110" name="Straight Arrow Connector 109">
+            <a:extLst>
+              <a:ext uri="{FF2B5EF4-FFF2-40B4-BE49-F238E27FC236}">
+                <a16:creationId xmlns:a16="http://schemas.microsoft.com/office/drawing/2014/main" id="{D132ADA7-1AEE-4182-88B6-4898C928D30B}"/>
+              </a:ext>
+            </a:extLst>
+          </p:cNvPr>
+          <p:cNvCxnSpPr>
+            <a:cxnSpLocks/>
+            <a:stCxn id="4" idx="3"/>
+            <a:endCxn id="90" idx="1"/>
+          </p:cNvCxnSpPr>
+          <p:nvPr/>
+        </p:nvCxnSpPr>
+        <p:spPr>
+          <a:xfrm flipV="1">
+            <a:off x="5813523" y="2123167"/>
+            <a:ext cx="1116782" cy="2049"/>
+          </a:xfrm>
+          <a:prstGeom prst="straightConnector1">
+            <a:avLst/>
+          </a:prstGeom>
+          <a:ln w="9525">
+            <a:solidFill>
+              <a:srgbClr val="0070C0"/>
+            </a:solidFill>
+            <a:tailEnd type="triangle"/>
+          </a:ln>
+        </p:spPr>
+        <p:style>
+          <a:lnRef idx="1">
+            <a:schemeClr val="accent1"/>
+          </a:lnRef>
+          <a:fillRef idx="0">
+            <a:schemeClr val="accent1"/>
+          </a:fillRef>
+          <a:effectRef idx="0">
+            <a:schemeClr val="accent1"/>
+          </a:effectRef>
+          <a:fontRef idx="minor">
+            <a:schemeClr val="tx1"/>
+          </a:fontRef>
+        </p:style>
+      </p:cxnSp>
+      <p:cxnSp>
+        <p:nvCxnSpPr>
+          <p:cNvPr id="111" name="Straight Arrow Connector 110">
+            <a:extLst>
+              <a:ext uri="{FF2B5EF4-FFF2-40B4-BE49-F238E27FC236}">
+                <a16:creationId xmlns:a16="http://schemas.microsoft.com/office/drawing/2014/main" id="{680E0FFF-2155-45C0-BD84-1E30909C2176}"/>
+              </a:ext>
+            </a:extLst>
+          </p:cNvPr>
+          <p:cNvCxnSpPr>
+            <a:cxnSpLocks/>
+            <a:stCxn id="5" idx="3"/>
+            <a:endCxn id="13" idx="1"/>
+          </p:cNvCxnSpPr>
+          <p:nvPr/>
+        </p:nvCxnSpPr>
+        <p:spPr>
+          <a:xfrm>
+            <a:off x="2472051" y="2126710"/>
+            <a:ext cx="1477158" cy="1671798"/>
+          </a:xfrm>
+          <a:prstGeom prst="straightConnector1">
+            <a:avLst/>
+          </a:prstGeom>
+          <a:ln>
+            <a:solidFill>
+              <a:schemeClr val="tx1"/>
+            </a:solidFill>
+            <a:tailEnd type="triangle"/>
+          </a:ln>
+        </p:spPr>
+        <p:style>
+          <a:lnRef idx="1">
+            <a:schemeClr val="accent1"/>
+          </a:lnRef>
+          <a:fillRef idx="0">
+            <a:schemeClr val="accent1"/>
+          </a:fillRef>
+          <a:effectRef idx="0">
+            <a:schemeClr val="accent1"/>
+          </a:effectRef>
+          <a:fontRef idx="minor">
+            <a:schemeClr val="tx1"/>
+          </a:fontRef>
+        </p:style>
+      </p:cxnSp>
+      <p:cxnSp>
+        <p:nvCxnSpPr>
+          <p:cNvPr id="114" name="Straight Arrow Connector 113">
+            <a:extLst>
+              <a:ext uri="{FF2B5EF4-FFF2-40B4-BE49-F238E27FC236}">
+                <a16:creationId xmlns:a16="http://schemas.microsoft.com/office/drawing/2014/main" id="{176230D8-FAA2-4C41-9819-AEEAAC683528}"/>
+              </a:ext>
+            </a:extLst>
+          </p:cNvPr>
+          <p:cNvCxnSpPr>
+            <a:cxnSpLocks/>
+            <a:stCxn id="5" idx="3"/>
+            <a:endCxn id="109" idx="1"/>
+          </p:cNvCxnSpPr>
+          <p:nvPr/>
+        </p:nvCxnSpPr>
+        <p:spPr>
+          <a:xfrm>
+            <a:off x="2472051" y="2126710"/>
+            <a:ext cx="1492141" cy="2510779"/>
+          </a:xfrm>
+          <a:prstGeom prst="straightConnector1">
+            <a:avLst/>
+          </a:prstGeom>
+          <a:ln>
+            <a:solidFill>
+              <a:schemeClr val="tx1"/>
+            </a:solidFill>
+            <a:tailEnd type="triangle"/>
+          </a:ln>
+        </p:spPr>
+        <p:style>
+          <a:lnRef idx="1">
+            <a:schemeClr val="accent1"/>
+          </a:lnRef>
+          <a:fillRef idx="0">
+            <a:schemeClr val="accent1"/>
+          </a:fillRef>
+          <a:effectRef idx="0">
+            <a:schemeClr val="accent1"/>
+          </a:effectRef>
+          <a:fontRef idx="minor">
+            <a:schemeClr val="tx1"/>
+          </a:fontRef>
+        </p:style>
+      </p:cxnSp>
+      <p:sp>
+        <p:nvSpPr>
+          <p:cNvPr id="122" name="TextBox 121">
+            <a:extLst>
+              <a:ext uri="{FF2B5EF4-FFF2-40B4-BE49-F238E27FC236}">
+                <a16:creationId xmlns:a16="http://schemas.microsoft.com/office/drawing/2014/main" id="{6BF7FE0F-DC11-4650-A139-C73CA2F5B295}"/>
+              </a:ext>
+            </a:extLst>
+          </p:cNvPr>
+          <p:cNvSpPr txBox="1"/>
+          <p:nvPr/>
+        </p:nvSpPr>
+        <p:spPr>
+          <a:xfrm>
+            <a:off x="3054225" y="2769787"/>
+            <a:ext cx="459578" cy="230832"/>
+          </a:xfrm>
+          <a:prstGeom prst="rect">
+            <a:avLst/>
+          </a:prstGeom>
+          <a:solidFill>
+            <a:schemeClr val="bg1"/>
+          </a:solidFill>
+        </p:spPr>
+        <p:txBody>
+          <a:bodyPr wrap="square" rtlCol="0">
+            <a:spAutoFit/>
+          </a:bodyPr>
+          <a:lstStyle/>
+          <a:p>
+            <a:r>
+              <a:rPr lang="en-US" sz="900" b="1" dirty="0"/>
+              <a:t>entry</a:t>
+            </a:r>
+          </a:p>
+        </p:txBody>
+      </p:sp>
+      <p:sp>
+        <p:nvSpPr>
+          <p:cNvPr id="123" name="TextBox 122">
+            <a:extLst>
+              <a:ext uri="{FF2B5EF4-FFF2-40B4-BE49-F238E27FC236}">
+                <a16:creationId xmlns:a16="http://schemas.microsoft.com/office/drawing/2014/main" id="{5589B71B-497C-4B6A-B133-8D7EB092F1E9}"/>
+              </a:ext>
+            </a:extLst>
+          </p:cNvPr>
+          <p:cNvSpPr txBox="1"/>
+          <p:nvPr/>
+        </p:nvSpPr>
+        <p:spPr>
+          <a:xfrm>
+            <a:off x="3054225" y="3270706"/>
+            <a:ext cx="459578" cy="230832"/>
+          </a:xfrm>
+          <a:prstGeom prst="rect">
+            <a:avLst/>
+          </a:prstGeom>
+          <a:solidFill>
+            <a:schemeClr val="bg1"/>
+          </a:solidFill>
+        </p:spPr>
+        <p:txBody>
+          <a:bodyPr wrap="square" rtlCol="0">
+            <a:spAutoFit/>
+          </a:bodyPr>
+          <a:lstStyle/>
+          <a:p>
+            <a:r>
+              <a:rPr lang="en-US" sz="900" b="1" dirty="0"/>
+              <a:t>entry</a:t>
+            </a:r>
+          </a:p>
+        </p:txBody>
+      </p:sp>
+      <p:cxnSp>
+        <p:nvCxnSpPr>
+          <p:cNvPr id="124" name="Straight Arrow Connector 123">
+            <a:extLst>
+              <a:ext uri="{FF2B5EF4-FFF2-40B4-BE49-F238E27FC236}">
+                <a16:creationId xmlns:a16="http://schemas.microsoft.com/office/drawing/2014/main" id="{6023FF68-6223-4988-8E15-2A475B7F6195}"/>
+              </a:ext>
+            </a:extLst>
+          </p:cNvPr>
+          <p:cNvCxnSpPr>
+            <a:cxnSpLocks/>
+            <a:stCxn id="5" idx="2"/>
+            <a:endCxn id="217" idx="0"/>
+          </p:cNvCxnSpPr>
+          <p:nvPr/>
+        </p:nvCxnSpPr>
+        <p:spPr>
+          <a:xfrm>
+            <a:off x="1539896" y="2432425"/>
+            <a:ext cx="650210" cy="1989514"/>
+          </a:xfrm>
+          <a:prstGeom prst="straightConnector1">
+            <a:avLst/>
+          </a:prstGeom>
+          <a:ln>
+            <a:solidFill>
+              <a:schemeClr val="tx1"/>
+            </a:solidFill>
+            <a:tailEnd type="triangle"/>
+          </a:ln>
+        </p:spPr>
+        <p:style>
+          <a:lnRef idx="1">
+            <a:schemeClr val="accent1"/>
+          </a:lnRef>
+          <a:fillRef idx="0">
+            <a:schemeClr val="accent1"/>
+          </a:fillRef>
+          <a:effectRef idx="0">
+            <a:schemeClr val="accent1"/>
+          </a:effectRef>
+          <a:fontRef idx="minor">
+            <a:schemeClr val="tx1"/>
+          </a:fontRef>
+        </p:style>
+      </p:cxnSp>
+      <p:cxnSp>
+        <p:nvCxnSpPr>
+          <p:cNvPr id="127" name="Straight Arrow Connector 126">
+            <a:extLst>
+              <a:ext uri="{FF2B5EF4-FFF2-40B4-BE49-F238E27FC236}">
+                <a16:creationId xmlns:a16="http://schemas.microsoft.com/office/drawing/2014/main" id="{DF4B3521-2AD4-4975-AE71-FC0D0133E2AC}"/>
+              </a:ext>
+            </a:extLst>
+          </p:cNvPr>
+          <p:cNvCxnSpPr>
+            <a:cxnSpLocks/>
+            <a:stCxn id="5" idx="2"/>
+          </p:cNvCxnSpPr>
+          <p:nvPr/>
+        </p:nvCxnSpPr>
+        <p:spPr>
+          <a:xfrm>
+            <a:off x="1539896" y="2432425"/>
+            <a:ext cx="5975" cy="1264098"/>
+          </a:xfrm>
+          <a:prstGeom prst="straightConnector1">
+            <a:avLst/>
+          </a:prstGeom>
+          <a:ln>
+            <a:solidFill>
+              <a:schemeClr val="tx1"/>
+            </a:solidFill>
+            <a:tailEnd type="triangle"/>
+          </a:ln>
+        </p:spPr>
+        <p:style>
+          <a:lnRef idx="1">
+            <a:schemeClr val="accent1"/>
+          </a:lnRef>
+          <a:fillRef idx="0">
+            <a:schemeClr val="accent1"/>
+          </a:fillRef>
+          <a:effectRef idx="0">
+            <a:schemeClr val="accent1"/>
+          </a:effectRef>
+          <a:fontRef idx="minor">
+            <a:schemeClr val="tx1"/>
+          </a:fontRef>
+        </p:style>
+      </p:cxnSp>
+      <p:sp>
+        <p:nvSpPr>
+          <p:cNvPr id="134" name="Flowchart: Process 133">
+            <a:extLst>
+              <a:ext uri="{FF2B5EF4-FFF2-40B4-BE49-F238E27FC236}">
+                <a16:creationId xmlns:a16="http://schemas.microsoft.com/office/drawing/2014/main" id="{AB93EFC4-AD7F-4689-8E15-D13CBD3E9BE7}"/>
+              </a:ext>
+            </a:extLst>
+          </p:cNvPr>
+          <p:cNvSpPr/>
+          <p:nvPr/>
+        </p:nvSpPr>
+        <p:spPr>
+          <a:xfrm>
+            <a:off x="6945285" y="2693875"/>
+            <a:ext cx="1864311" cy="562122"/>
+          </a:xfrm>
+          <a:prstGeom prst="flowChartProcess">
+            <a:avLst/>
+          </a:prstGeom>
+          <a:solidFill>
+            <a:schemeClr val="accent5">
+              <a:lumMod val="60000"/>
+              <a:lumOff val="40000"/>
+            </a:schemeClr>
+          </a:solidFill>
+          <a:ln>
+            <a:noFill/>
+          </a:ln>
+        </p:spPr>
+        <p:style>
+          <a:lnRef idx="2">
+            <a:schemeClr val="accent1">
+              <a:shade val="50000"/>
+            </a:schemeClr>
+          </a:lnRef>
+          <a:fillRef idx="1">
+            <a:schemeClr val="accent1"/>
+          </a:fillRef>
+          <a:effectRef idx="0">
+            <a:schemeClr val="accent1"/>
+          </a:effectRef>
+          <a:fontRef idx="minor">
+            <a:schemeClr val="lt1"/>
+          </a:fontRef>
+        </p:style>
+        <p:txBody>
+          <a:bodyPr rtlCol="0" anchor="ctr"/>
+          <a:lstStyle/>
+          <a:p>
+            <a:pPr algn="ctr"/>
+            <a:r>
+              <a:rPr lang="en-US" sz="1600" dirty="0"/>
+              <a:t>GIC Detected Issue</a:t>
+            </a:r>
+          </a:p>
+        </p:txBody>
+      </p:sp>
+      <p:cxnSp>
+        <p:nvCxnSpPr>
+          <p:cNvPr id="164" name="Straight Arrow Connector 163">
+            <a:extLst>
+              <a:ext uri="{FF2B5EF4-FFF2-40B4-BE49-F238E27FC236}">
+                <a16:creationId xmlns:a16="http://schemas.microsoft.com/office/drawing/2014/main" id="{90D686F3-6539-405B-BAAF-D5A603068524}"/>
+              </a:ext>
+            </a:extLst>
+          </p:cNvPr>
+          <p:cNvCxnSpPr>
+            <a:cxnSpLocks/>
+            <a:stCxn id="4" idx="3"/>
+            <a:endCxn id="134" idx="1"/>
+          </p:cNvCxnSpPr>
+          <p:nvPr/>
+        </p:nvCxnSpPr>
+        <p:spPr>
+          <a:xfrm>
+            <a:off x="5813523" y="2125216"/>
+            <a:ext cx="1131762" cy="849720"/>
+          </a:xfrm>
+          <a:prstGeom prst="straightConnector1">
+            <a:avLst/>
+          </a:prstGeom>
+          <a:ln w="9525">
+            <a:solidFill>
+              <a:srgbClr val="0070C0"/>
+            </a:solidFill>
+            <a:tailEnd type="triangle"/>
+          </a:ln>
+        </p:spPr>
+        <p:style>
+          <a:lnRef idx="1">
+            <a:schemeClr val="accent1"/>
+          </a:lnRef>
+          <a:fillRef idx="0">
+            <a:schemeClr val="accent1"/>
+          </a:fillRef>
+          <a:effectRef idx="0">
+            <a:schemeClr val="accent1"/>
+          </a:effectRef>
+          <a:fontRef idx="minor">
+            <a:schemeClr val="tx1"/>
+          </a:fontRef>
+        </p:style>
+      </p:cxnSp>
+      <p:sp>
+        <p:nvSpPr>
+          <p:cNvPr id="166" name="TextBox 165">
+            <a:extLst>
+              <a:ext uri="{FF2B5EF4-FFF2-40B4-BE49-F238E27FC236}">
+                <a16:creationId xmlns:a16="http://schemas.microsoft.com/office/drawing/2014/main" id="{4385A6E7-8368-40E5-97F6-C06276CE1254}"/>
+              </a:ext>
+            </a:extLst>
+          </p:cNvPr>
+          <p:cNvSpPr txBox="1"/>
+          <p:nvPr/>
+        </p:nvSpPr>
+        <p:spPr>
+          <a:xfrm>
+            <a:off x="6106950" y="2469714"/>
+            <a:ext cx="900006" cy="230832"/>
+          </a:xfrm>
+          <a:prstGeom prst="rect">
+            <a:avLst/>
+          </a:prstGeom>
+          <a:solidFill>
+            <a:schemeClr val="bg1"/>
+          </a:solidFill>
+        </p:spPr>
+        <p:txBody>
+          <a:bodyPr wrap="square" rtlCol="0">
+            <a:spAutoFit/>
+          </a:bodyPr>
+          <a:lstStyle/>
+          <a:p>
+            <a:r>
+              <a:rPr lang="en-US" sz="900" b="1" dirty="0">
+                <a:solidFill>
+                  <a:srgbClr val="0070C0"/>
+                </a:solidFill>
+              </a:rPr>
+              <a:t>section.entry</a:t>
+            </a:r>
+          </a:p>
+        </p:txBody>
+      </p:sp>
+      <p:sp>
+        <p:nvSpPr>
+          <p:cNvPr id="167" name="TextBox 166">
+            <a:extLst>
+              <a:ext uri="{FF2B5EF4-FFF2-40B4-BE49-F238E27FC236}">
+                <a16:creationId xmlns:a16="http://schemas.microsoft.com/office/drawing/2014/main" id="{DC2C6B30-F47E-4161-A251-7799E31B4EE0}"/>
+              </a:ext>
+            </a:extLst>
+          </p:cNvPr>
+          <p:cNvSpPr txBox="1"/>
+          <p:nvPr/>
+        </p:nvSpPr>
+        <p:spPr>
+          <a:xfrm>
+            <a:off x="5957731" y="1995343"/>
+            <a:ext cx="814938" cy="230832"/>
+          </a:xfrm>
+          <a:prstGeom prst="rect">
+            <a:avLst/>
+          </a:prstGeom>
+          <a:solidFill>
+            <a:schemeClr val="bg1"/>
+          </a:solidFill>
+        </p:spPr>
+        <p:txBody>
+          <a:bodyPr wrap="square" rtlCol="0">
+            <a:spAutoFit/>
+          </a:bodyPr>
+          <a:lstStyle/>
+          <a:p>
+            <a:r>
+              <a:rPr lang="en-US" sz="900" b="1" dirty="0">
+                <a:solidFill>
+                  <a:srgbClr val="0070C0"/>
+                </a:solidFill>
+              </a:rPr>
+              <a:t>section.focus</a:t>
+            </a:r>
+          </a:p>
+        </p:txBody>
+      </p:sp>
+      <p:sp>
+        <p:nvSpPr>
+          <p:cNvPr id="180" name="Flowchart: Process 179">
+            <a:extLst>
+              <a:ext uri="{FF2B5EF4-FFF2-40B4-BE49-F238E27FC236}">
+                <a16:creationId xmlns:a16="http://schemas.microsoft.com/office/drawing/2014/main" id="{6D38B2BC-FB05-4D16-9C6C-C5C12FAF8574}"/>
+              </a:ext>
+            </a:extLst>
+          </p:cNvPr>
+          <p:cNvSpPr/>
+          <p:nvPr/>
+        </p:nvSpPr>
+        <p:spPr>
+          <a:xfrm>
+            <a:off x="6951965" y="3602004"/>
+            <a:ext cx="1864311" cy="562122"/>
+          </a:xfrm>
+          <a:prstGeom prst="flowChartProcess">
+            <a:avLst/>
+          </a:prstGeom>
+          <a:solidFill>
+            <a:schemeClr val="accent5">
+              <a:lumMod val="60000"/>
+              <a:lumOff val="40000"/>
+            </a:schemeClr>
+          </a:solidFill>
+          <a:ln>
+            <a:noFill/>
+          </a:ln>
+        </p:spPr>
+        <p:style>
+          <a:lnRef idx="2">
+            <a:schemeClr val="accent1">
+              <a:shade val="50000"/>
+            </a:schemeClr>
+          </a:lnRef>
+          <a:fillRef idx="1">
+            <a:schemeClr val="accent1"/>
+          </a:fillRef>
+          <a:effectRef idx="0">
+            <a:schemeClr val="accent1"/>
+          </a:effectRef>
+          <a:fontRef idx="minor">
+            <a:schemeClr val="lt1"/>
+          </a:fontRef>
+        </p:style>
+        <p:txBody>
+          <a:bodyPr rtlCol="0" anchor="ctr"/>
+          <a:lstStyle/>
+          <a:p>
+            <a:pPr algn="ctr"/>
+            <a:r>
+              <a:rPr lang="en-US" sz="1600" dirty="0"/>
+              <a:t>QI Core Patient</a:t>
+            </a:r>
+          </a:p>
+        </p:txBody>
+      </p:sp>
+      <p:cxnSp>
+        <p:nvCxnSpPr>
+          <p:cNvPr id="181" name="Straight Arrow Connector 180">
+            <a:extLst>
+              <a:ext uri="{FF2B5EF4-FFF2-40B4-BE49-F238E27FC236}">
+                <a16:creationId xmlns:a16="http://schemas.microsoft.com/office/drawing/2014/main" id="{7CC7B4FF-EF57-467E-999A-78BDDB6C9EED}"/>
+              </a:ext>
+            </a:extLst>
+          </p:cNvPr>
+          <p:cNvCxnSpPr>
+            <a:cxnSpLocks/>
+            <a:stCxn id="4" idx="3"/>
+            <a:endCxn id="180" idx="1"/>
+          </p:cNvCxnSpPr>
+          <p:nvPr/>
+        </p:nvCxnSpPr>
+        <p:spPr>
+          <a:xfrm>
+            <a:off x="5813523" y="2125216"/>
+            <a:ext cx="1138442" cy="1757849"/>
+          </a:xfrm>
+          <a:prstGeom prst="straightConnector1">
+            <a:avLst/>
+          </a:prstGeom>
+          <a:ln w="9525">
+            <a:solidFill>
+              <a:srgbClr val="0070C0"/>
+            </a:solidFill>
+            <a:tailEnd type="triangle"/>
+          </a:ln>
+        </p:spPr>
+        <p:style>
+          <a:lnRef idx="1">
+            <a:schemeClr val="accent1"/>
+          </a:lnRef>
+          <a:fillRef idx="0">
+            <a:schemeClr val="accent1"/>
+          </a:fillRef>
+          <a:effectRef idx="0">
+            <a:schemeClr val="accent1"/>
+          </a:effectRef>
+          <a:fontRef idx="minor">
+            <a:schemeClr val="tx1"/>
+          </a:fontRef>
+        </p:style>
+      </p:cxnSp>
+      <p:sp>
+        <p:nvSpPr>
+          <p:cNvPr id="182" name="TextBox 181">
+            <a:extLst>
+              <a:ext uri="{FF2B5EF4-FFF2-40B4-BE49-F238E27FC236}">
+                <a16:creationId xmlns:a16="http://schemas.microsoft.com/office/drawing/2014/main" id="{8B791539-1D4C-45FA-8E4A-D6DB6040AEF7}"/>
+              </a:ext>
+            </a:extLst>
+          </p:cNvPr>
+          <p:cNvSpPr txBox="1"/>
+          <p:nvPr/>
+        </p:nvSpPr>
+        <p:spPr>
+          <a:xfrm>
+            <a:off x="6217341" y="3124302"/>
+            <a:ext cx="633829" cy="230832"/>
+          </a:xfrm>
+          <a:prstGeom prst="rect">
+            <a:avLst/>
+          </a:prstGeom>
+          <a:solidFill>
+            <a:schemeClr val="bg1"/>
+          </a:solidFill>
+        </p:spPr>
+        <p:txBody>
+          <a:bodyPr wrap="square" rtlCol="0">
+            <a:spAutoFit/>
+          </a:bodyPr>
+          <a:lstStyle/>
+          <a:p>
+            <a:r>
+              <a:rPr lang="en-US" sz="900" b="1" dirty="0">
+                <a:solidFill>
+                  <a:srgbClr val="0070C0"/>
+                </a:solidFill>
+              </a:rPr>
+              <a:t>subject</a:t>
+            </a:r>
+          </a:p>
+        </p:txBody>
+      </p:sp>
+      <p:sp>
+        <p:nvSpPr>
+          <p:cNvPr id="183" name="Flowchart: Process 182">
+            <a:extLst>
+              <a:ext uri="{FF2B5EF4-FFF2-40B4-BE49-F238E27FC236}">
+                <a16:creationId xmlns:a16="http://schemas.microsoft.com/office/drawing/2014/main" id="{2853D2EF-8C54-4A72-864B-6FF6283D937D}"/>
+              </a:ext>
+            </a:extLst>
+          </p:cNvPr>
+          <p:cNvSpPr/>
+          <p:nvPr/>
+        </p:nvSpPr>
+        <p:spPr>
+          <a:xfrm>
+            <a:off x="10169285" y="3563030"/>
+            <a:ext cx="1864310" cy="555676"/>
+          </a:xfrm>
+          <a:prstGeom prst="flowChartProcess">
+            <a:avLst/>
+          </a:prstGeom>
+          <a:solidFill>
+            <a:schemeClr val="accent5">
+              <a:lumMod val="60000"/>
+              <a:lumOff val="40000"/>
+            </a:schemeClr>
+          </a:solidFill>
+          <a:ln>
+            <a:noFill/>
+          </a:ln>
+        </p:spPr>
+        <p:style>
+          <a:lnRef idx="2">
+            <a:schemeClr val="accent1">
+              <a:shade val="50000"/>
+            </a:schemeClr>
+          </a:lnRef>
+          <a:fillRef idx="1">
+            <a:schemeClr val="accent1"/>
+          </a:fillRef>
+          <a:effectRef idx="0">
+            <a:schemeClr val="accent1"/>
+          </a:effectRef>
+          <a:fontRef idx="minor">
+            <a:schemeClr val="lt1"/>
+          </a:fontRef>
+        </p:style>
+        <p:txBody>
+          <a:bodyPr rtlCol="0" anchor="ctr"/>
+          <a:lstStyle/>
+          <a:p>
+            <a:pPr algn="ctr"/>
+            <a:r>
+              <a:rPr lang="en-US" sz="1600" dirty="0"/>
+              <a:t>QI Core Organization</a:t>
+            </a:r>
+            <a:endParaRPr lang="en-US" sz="1000" dirty="0"/>
+          </a:p>
+        </p:txBody>
+      </p:sp>
+      <p:cxnSp>
+        <p:nvCxnSpPr>
+          <p:cNvPr id="184" name="Straight Arrow Connector 183">
+            <a:extLst>
+              <a:ext uri="{FF2B5EF4-FFF2-40B4-BE49-F238E27FC236}">
+                <a16:creationId xmlns:a16="http://schemas.microsoft.com/office/drawing/2014/main" id="{8BC298C4-779B-414A-B83A-15F432433507}"/>
+              </a:ext>
+            </a:extLst>
+          </p:cNvPr>
+          <p:cNvCxnSpPr>
+            <a:cxnSpLocks/>
+            <a:stCxn id="90" idx="3"/>
+            <a:endCxn id="183" idx="1"/>
+          </p:cNvCxnSpPr>
+          <p:nvPr/>
+        </p:nvCxnSpPr>
+        <p:spPr>
+          <a:xfrm>
+            <a:off x="8794616" y="2123167"/>
+            <a:ext cx="1374669" cy="1717701"/>
+          </a:xfrm>
+          <a:prstGeom prst="straightConnector1">
+            <a:avLst/>
+          </a:prstGeom>
+          <a:ln>
+            <a:solidFill>
+              <a:srgbClr val="0070C0"/>
+            </a:solidFill>
+            <a:tailEnd type="triangle"/>
+          </a:ln>
+        </p:spPr>
+        <p:style>
+          <a:lnRef idx="1">
+            <a:schemeClr val="accent1"/>
+          </a:lnRef>
+          <a:fillRef idx="0">
+            <a:schemeClr val="accent1"/>
+          </a:fillRef>
+          <a:effectRef idx="0">
+            <a:schemeClr val="accent1"/>
+          </a:effectRef>
+          <a:fontRef idx="minor">
+            <a:schemeClr val="tx1"/>
+          </a:fontRef>
+        </p:style>
+      </p:cxnSp>
+      <p:sp>
+        <p:nvSpPr>
+          <p:cNvPr id="185" name="TextBox 184">
+            <a:extLst>
+              <a:ext uri="{FF2B5EF4-FFF2-40B4-BE49-F238E27FC236}">
+                <a16:creationId xmlns:a16="http://schemas.microsoft.com/office/drawing/2014/main" id="{9BD02CF3-118B-41D2-BE0E-A1F885F30F86}"/>
+              </a:ext>
+            </a:extLst>
+          </p:cNvPr>
+          <p:cNvSpPr txBox="1"/>
+          <p:nvPr/>
+        </p:nvSpPr>
+        <p:spPr>
+          <a:xfrm>
+            <a:off x="9318333" y="3093181"/>
+            <a:ext cx="737102" cy="230832"/>
+          </a:xfrm>
+          <a:prstGeom prst="rect">
+            <a:avLst/>
+          </a:prstGeom>
+          <a:solidFill>
+            <a:schemeClr val="bg1"/>
+          </a:solidFill>
+        </p:spPr>
+        <p:txBody>
+          <a:bodyPr wrap="square" rtlCol="0">
+            <a:spAutoFit/>
+          </a:bodyPr>
+          <a:lstStyle/>
+          <a:p>
+            <a:r>
+              <a:rPr lang="en-US" sz="900" b="1" dirty="0">
+                <a:solidFill>
+                  <a:srgbClr val="0070C0"/>
+                </a:solidFill>
+              </a:rPr>
+              <a:t>reporter</a:t>
+            </a:r>
+          </a:p>
+        </p:txBody>
+      </p:sp>
+      <p:sp>
+        <p:nvSpPr>
+          <p:cNvPr id="186" name="TextBox 185">
+            <a:extLst>
+              <a:ext uri="{FF2B5EF4-FFF2-40B4-BE49-F238E27FC236}">
+                <a16:creationId xmlns:a16="http://schemas.microsoft.com/office/drawing/2014/main" id="{8603A9BC-6159-43CB-81EC-3FBEFABD8E5B}"/>
+              </a:ext>
+            </a:extLst>
+          </p:cNvPr>
+          <p:cNvSpPr txBox="1"/>
+          <p:nvPr/>
+        </p:nvSpPr>
+        <p:spPr>
+          <a:xfrm>
+            <a:off x="1551959" y="3266683"/>
+            <a:ext cx="459578" cy="230832"/>
+          </a:xfrm>
+          <a:prstGeom prst="rect">
+            <a:avLst/>
+          </a:prstGeom>
+          <a:solidFill>
+            <a:schemeClr val="bg1"/>
+          </a:solidFill>
+        </p:spPr>
+        <p:txBody>
+          <a:bodyPr wrap="square" rtlCol="0">
+            <a:spAutoFit/>
+          </a:bodyPr>
+          <a:lstStyle/>
+          <a:p>
+            <a:r>
+              <a:rPr lang="en-US" sz="900" b="1" dirty="0"/>
+              <a:t>entry</a:t>
+            </a:r>
+          </a:p>
+        </p:txBody>
+      </p:sp>
+      <p:sp>
+        <p:nvSpPr>
+          <p:cNvPr id="187" name="TextBox 186">
+            <a:extLst>
+              <a:ext uri="{FF2B5EF4-FFF2-40B4-BE49-F238E27FC236}">
+                <a16:creationId xmlns:a16="http://schemas.microsoft.com/office/drawing/2014/main" id="{86FF4F10-16CA-4FC2-AA3E-151F1DD0027B}"/>
+              </a:ext>
+            </a:extLst>
+          </p:cNvPr>
+          <p:cNvSpPr txBox="1"/>
+          <p:nvPr/>
+        </p:nvSpPr>
+        <p:spPr>
+          <a:xfrm>
+            <a:off x="1209312" y="2940440"/>
+            <a:ext cx="459578" cy="230832"/>
+          </a:xfrm>
+          <a:prstGeom prst="rect">
+            <a:avLst/>
+          </a:prstGeom>
+          <a:solidFill>
+            <a:schemeClr val="bg1"/>
+          </a:solidFill>
+        </p:spPr>
+        <p:txBody>
+          <a:bodyPr wrap="square" rtlCol="0">
+            <a:spAutoFit/>
+          </a:bodyPr>
+          <a:lstStyle/>
+          <a:p>
+            <a:r>
+              <a:rPr lang="en-US" sz="900" b="1" dirty="0"/>
+              <a:t>entry</a:t>
+            </a:r>
+          </a:p>
+        </p:txBody>
+      </p:sp>
+      <p:sp>
+        <p:nvSpPr>
+          <p:cNvPr id="188" name="Flowchart: Process 187">
+            <a:extLst>
+              <a:ext uri="{FF2B5EF4-FFF2-40B4-BE49-F238E27FC236}">
+                <a16:creationId xmlns:a16="http://schemas.microsoft.com/office/drawing/2014/main" id="{49C6274A-C911-43A8-97FA-957680B10B45}"/>
+              </a:ext>
+            </a:extLst>
+          </p:cNvPr>
+          <p:cNvSpPr/>
+          <p:nvPr/>
+        </p:nvSpPr>
+        <p:spPr>
+          <a:xfrm>
+            <a:off x="10190760" y="4703000"/>
+            <a:ext cx="1864310" cy="555676"/>
+          </a:xfrm>
+          <a:prstGeom prst="flowChartProcess">
+            <a:avLst/>
+          </a:prstGeom>
+          <a:solidFill>
+            <a:schemeClr val="accent5">
+              <a:lumMod val="60000"/>
+              <a:lumOff val="40000"/>
+            </a:schemeClr>
+          </a:solidFill>
+          <a:ln>
+            <a:noFill/>
+          </a:ln>
+        </p:spPr>
+        <p:style>
+          <a:lnRef idx="2">
+            <a:schemeClr val="accent1">
+              <a:shade val="50000"/>
+            </a:schemeClr>
+          </a:lnRef>
+          <a:fillRef idx="1">
+            <a:schemeClr val="accent1"/>
+          </a:fillRef>
+          <a:effectRef idx="0">
+            <a:schemeClr val="accent1"/>
+          </a:effectRef>
+          <a:fontRef idx="minor">
+            <a:schemeClr val="lt1"/>
+          </a:fontRef>
+        </p:style>
+        <p:txBody>
+          <a:bodyPr rtlCol="0" anchor="ctr"/>
+          <a:lstStyle/>
+          <a:p>
+            <a:pPr algn="ctr"/>
+            <a:r>
+              <a:rPr lang="en-US" sz="1600" dirty="0"/>
+              <a:t>Guidance Response</a:t>
+            </a:r>
+            <a:endParaRPr lang="en-US" sz="1000" dirty="0"/>
+          </a:p>
+        </p:txBody>
+      </p:sp>
+      <p:cxnSp>
+        <p:nvCxnSpPr>
+          <p:cNvPr id="189" name="Straight Arrow Connector 188">
+            <a:extLst>
+              <a:ext uri="{FF2B5EF4-FFF2-40B4-BE49-F238E27FC236}">
+                <a16:creationId xmlns:a16="http://schemas.microsoft.com/office/drawing/2014/main" id="{F136370B-4A97-4D31-AAB8-7E59EE928ED6}"/>
+              </a:ext>
+            </a:extLst>
+          </p:cNvPr>
+          <p:cNvCxnSpPr>
+            <a:cxnSpLocks/>
+            <a:endCxn id="188" idx="1"/>
+          </p:cNvCxnSpPr>
+          <p:nvPr/>
+        </p:nvCxnSpPr>
+        <p:spPr>
+          <a:xfrm>
+            <a:off x="8801293" y="2978370"/>
+            <a:ext cx="1389467" cy="2002468"/>
+          </a:xfrm>
+          <a:prstGeom prst="straightConnector1">
+            <a:avLst/>
+          </a:prstGeom>
+          <a:ln>
+            <a:solidFill>
+              <a:srgbClr val="0070C0"/>
+            </a:solidFill>
+            <a:tailEnd type="triangle"/>
+          </a:ln>
+        </p:spPr>
+        <p:style>
+          <a:lnRef idx="1">
+            <a:schemeClr val="accent1"/>
+          </a:lnRef>
+          <a:fillRef idx="0">
+            <a:schemeClr val="accent1"/>
+          </a:fillRef>
+          <a:effectRef idx="0">
+            <a:schemeClr val="accent1"/>
+          </a:effectRef>
+          <a:fontRef idx="minor">
+            <a:schemeClr val="tx1"/>
+          </a:fontRef>
+        </p:style>
+      </p:cxnSp>
+      <p:sp>
+        <p:nvSpPr>
+          <p:cNvPr id="190" name="TextBox 189">
+            <a:extLst>
+              <a:ext uri="{FF2B5EF4-FFF2-40B4-BE49-F238E27FC236}">
+                <a16:creationId xmlns:a16="http://schemas.microsoft.com/office/drawing/2014/main" id="{48D956A0-4AE2-4049-8667-1421E2E7C549}"/>
+              </a:ext>
+            </a:extLst>
+          </p:cNvPr>
+          <p:cNvSpPr txBox="1"/>
+          <p:nvPr/>
+        </p:nvSpPr>
+        <p:spPr>
+          <a:xfrm>
+            <a:off x="8985040" y="3829528"/>
+            <a:ext cx="954697" cy="230832"/>
+          </a:xfrm>
+          <a:prstGeom prst="rect">
+            <a:avLst/>
+          </a:prstGeom>
+          <a:solidFill>
+            <a:schemeClr val="bg1"/>
+          </a:solidFill>
+        </p:spPr>
+        <p:txBody>
+          <a:bodyPr wrap="square" rtlCol="0">
+            <a:spAutoFit/>
+          </a:bodyPr>
+          <a:lstStyle/>
+          <a:p>
+            <a:r>
+              <a:rPr lang="en-US" sz="900" b="1" dirty="0">
+                <a:solidFill>
+                  <a:srgbClr val="0070C0"/>
+                </a:solidFill>
+              </a:rPr>
+              <a:t>evidence.detail</a:t>
+            </a:r>
+          </a:p>
+        </p:txBody>
+      </p:sp>
+      <p:cxnSp>
+        <p:nvCxnSpPr>
+          <p:cNvPr id="193" name="Straight Arrow Connector 192">
+            <a:extLst>
+              <a:ext uri="{FF2B5EF4-FFF2-40B4-BE49-F238E27FC236}">
+                <a16:creationId xmlns:a16="http://schemas.microsoft.com/office/drawing/2014/main" id="{58BDE12F-0BF3-44BA-863C-8B30C45CCA61}"/>
+              </a:ext>
+            </a:extLst>
+          </p:cNvPr>
+          <p:cNvCxnSpPr>
+            <a:cxnSpLocks/>
+            <a:stCxn id="5" idx="3"/>
+            <a:endCxn id="16" idx="1"/>
+          </p:cNvCxnSpPr>
+          <p:nvPr/>
+        </p:nvCxnSpPr>
+        <p:spPr>
+          <a:xfrm>
+            <a:off x="2472051" y="2126710"/>
+            <a:ext cx="1483672" cy="3260355"/>
+          </a:xfrm>
+          <a:prstGeom prst="straightConnector1">
+            <a:avLst/>
+          </a:prstGeom>
+          <a:ln>
+            <a:solidFill>
+              <a:schemeClr val="tx1"/>
+            </a:solidFill>
+            <a:tailEnd type="triangle"/>
+          </a:ln>
+        </p:spPr>
+        <p:style>
+          <a:lnRef idx="1">
+            <a:schemeClr val="accent1"/>
+          </a:lnRef>
+          <a:fillRef idx="0">
+            <a:schemeClr val="accent1"/>
+          </a:fillRef>
+          <a:effectRef idx="0">
+            <a:schemeClr val="accent1"/>
+          </a:effectRef>
+          <a:fontRef idx="minor">
+            <a:schemeClr val="tx1"/>
+          </a:fontRef>
+        </p:style>
+      </p:cxnSp>
+      <p:sp>
+        <p:nvSpPr>
+          <p:cNvPr id="197" name="TextBox 196">
+            <a:extLst>
+              <a:ext uri="{FF2B5EF4-FFF2-40B4-BE49-F238E27FC236}">
+                <a16:creationId xmlns:a16="http://schemas.microsoft.com/office/drawing/2014/main" id="{8D510BC8-AC80-4EE3-BBF3-C85306968137}"/>
+              </a:ext>
+            </a:extLst>
+          </p:cNvPr>
+          <p:cNvSpPr txBox="1"/>
+          <p:nvPr/>
+        </p:nvSpPr>
+        <p:spPr>
+          <a:xfrm>
+            <a:off x="2928944" y="3652233"/>
+            <a:ext cx="459578" cy="230832"/>
+          </a:xfrm>
+          <a:prstGeom prst="rect">
+            <a:avLst/>
+          </a:prstGeom>
+          <a:solidFill>
+            <a:schemeClr val="bg1"/>
+          </a:solidFill>
+        </p:spPr>
+        <p:txBody>
+          <a:bodyPr wrap="square" rtlCol="0">
+            <a:spAutoFit/>
+          </a:bodyPr>
+          <a:lstStyle/>
+          <a:p>
+            <a:r>
+              <a:rPr lang="en-US" sz="900" b="1" dirty="0"/>
+              <a:t>entry</a:t>
+            </a:r>
+          </a:p>
+        </p:txBody>
+      </p:sp>
+      <p:sp>
+        <p:nvSpPr>
+          <p:cNvPr id="200" name="Rectangle 199">
+            <a:extLst>
+              <a:ext uri="{FF2B5EF4-FFF2-40B4-BE49-F238E27FC236}">
+                <a16:creationId xmlns:a16="http://schemas.microsoft.com/office/drawing/2014/main" id="{8CC1E8F0-D6E6-459F-AE42-7CE04BCBDCB1}"/>
+              </a:ext>
+            </a:extLst>
+          </p:cNvPr>
+          <p:cNvSpPr/>
+          <p:nvPr/>
+        </p:nvSpPr>
+        <p:spPr>
+          <a:xfrm>
+            <a:off x="6011857" y="1518700"/>
+            <a:ext cx="6091088" cy="4230094"/>
+          </a:xfrm>
+          <a:prstGeom prst="rect">
+            <a:avLst/>
+          </a:prstGeom>
+          <a:noFill/>
+          <a:ln>
+            <a:prstDash val="dash"/>
+          </a:ln>
+        </p:spPr>
+        <p:style>
+          <a:lnRef idx="2">
+            <a:schemeClr val="accent1">
+              <a:shade val="50000"/>
+            </a:schemeClr>
+          </a:lnRef>
+          <a:fillRef idx="1">
+            <a:schemeClr val="accent1"/>
+          </a:fillRef>
+          <a:effectRef idx="0">
+            <a:schemeClr val="accent1"/>
+          </a:effectRef>
+          <a:fontRef idx="minor">
+            <a:schemeClr val="lt1"/>
+          </a:fontRef>
+        </p:style>
+        <p:txBody>
+          <a:bodyPr rtlCol="0" anchor="ctr"/>
+          <a:lstStyle/>
+          <a:p>
+            <a:pPr algn="ctr"/>
+            <a:endParaRPr lang="en-US" dirty="0"/>
+          </a:p>
+        </p:txBody>
+      </p:sp>
+      <p:sp>
+        <p:nvSpPr>
+          <p:cNvPr id="201" name="TextBox 200">
+            <a:extLst>
+              <a:ext uri="{FF2B5EF4-FFF2-40B4-BE49-F238E27FC236}">
+                <a16:creationId xmlns:a16="http://schemas.microsoft.com/office/drawing/2014/main" id="{C7FA8CED-29D5-4F10-A16E-5BC46614DAC0}"/>
+              </a:ext>
+            </a:extLst>
+          </p:cNvPr>
+          <p:cNvSpPr txBox="1"/>
+          <p:nvPr/>
+        </p:nvSpPr>
+        <p:spPr>
+          <a:xfrm>
+            <a:off x="7972666" y="1479843"/>
+            <a:ext cx="1944378" cy="338554"/>
+          </a:xfrm>
+          <a:prstGeom prst="rect">
+            <a:avLst/>
+          </a:prstGeom>
+          <a:noFill/>
+        </p:spPr>
+        <p:txBody>
+          <a:bodyPr wrap="none" rtlCol="0">
+            <a:spAutoFit/>
+          </a:bodyPr>
+          <a:lstStyle/>
+          <a:p>
+            <a:r>
+              <a:rPr lang="en-US" sz="1600" dirty="0">
+                <a:solidFill>
+                  <a:srgbClr val="0070C0"/>
+                </a:solidFill>
+              </a:rPr>
+              <a:t>referenced resources</a:t>
+            </a:r>
+          </a:p>
+        </p:txBody>
+      </p:sp>
+      <p:sp>
+        <p:nvSpPr>
+          <p:cNvPr id="204" name="Flowchart: Process 203">
+            <a:extLst>
+              <a:ext uri="{FF2B5EF4-FFF2-40B4-BE49-F238E27FC236}">
+                <a16:creationId xmlns:a16="http://schemas.microsoft.com/office/drawing/2014/main" id="{76BD1566-C29F-40E8-B8CB-28713C0DF3B9}"/>
+              </a:ext>
+            </a:extLst>
+          </p:cNvPr>
+          <p:cNvSpPr/>
+          <p:nvPr/>
+        </p:nvSpPr>
+        <p:spPr>
+          <a:xfrm>
+            <a:off x="1789641" y="5106004"/>
+            <a:ext cx="1864311" cy="562122"/>
+          </a:xfrm>
+          <a:prstGeom prst="flowChartProcess">
+            <a:avLst/>
+          </a:prstGeom>
+          <a:ln>
+            <a:solidFill>
+              <a:schemeClr val="tx1"/>
+            </a:solidFill>
+          </a:ln>
+        </p:spPr>
+        <p:style>
+          <a:lnRef idx="2">
+            <a:schemeClr val="accent1">
+              <a:shade val="50000"/>
+            </a:schemeClr>
+          </a:lnRef>
+          <a:fillRef idx="1">
+            <a:schemeClr val="accent1"/>
+          </a:fillRef>
+          <a:effectRef idx="0">
+            <a:schemeClr val="accent1"/>
+          </a:effectRef>
+          <a:fontRef idx="minor">
+            <a:schemeClr val="lt1"/>
+          </a:fontRef>
+        </p:style>
+        <p:txBody>
+          <a:bodyPr rtlCol="0" anchor="ctr"/>
+          <a:lstStyle/>
+          <a:p>
+            <a:pPr algn="ctr"/>
+            <a:r>
+              <a:rPr lang="en-US" sz="1600" dirty="0"/>
+              <a:t>Guidance Response</a:t>
+            </a:r>
+            <a:endParaRPr lang="en-US" sz="1000" dirty="0"/>
+          </a:p>
+        </p:txBody>
+      </p:sp>
+      <p:cxnSp>
+        <p:nvCxnSpPr>
+          <p:cNvPr id="212" name="Straight Arrow Connector 211">
+            <a:extLst>
+              <a:ext uri="{FF2B5EF4-FFF2-40B4-BE49-F238E27FC236}">
+                <a16:creationId xmlns:a16="http://schemas.microsoft.com/office/drawing/2014/main" id="{22321B26-418D-41D8-946E-2F335E536499}"/>
+              </a:ext>
+            </a:extLst>
+          </p:cNvPr>
+          <p:cNvCxnSpPr>
+            <a:cxnSpLocks/>
+            <a:stCxn id="5" idx="2"/>
+            <a:endCxn id="204" idx="0"/>
+          </p:cNvCxnSpPr>
+          <p:nvPr/>
+        </p:nvCxnSpPr>
+        <p:spPr>
+          <a:xfrm>
+            <a:off x="1539896" y="2432425"/>
+            <a:ext cx="1181901" cy="2673579"/>
+          </a:xfrm>
+          <a:prstGeom prst="straightConnector1">
+            <a:avLst/>
+          </a:prstGeom>
+          <a:ln>
+            <a:solidFill>
+              <a:schemeClr val="tx1"/>
+            </a:solidFill>
+            <a:tailEnd type="triangle"/>
+          </a:ln>
+        </p:spPr>
+        <p:style>
+          <a:lnRef idx="1">
+            <a:schemeClr val="accent1"/>
+          </a:lnRef>
+          <a:fillRef idx="0">
+            <a:schemeClr val="accent1"/>
+          </a:fillRef>
+          <a:effectRef idx="0">
+            <a:schemeClr val="accent1"/>
+          </a:effectRef>
+          <a:fontRef idx="minor">
+            <a:schemeClr val="tx1"/>
+          </a:fontRef>
+        </p:style>
+      </p:cxnSp>
+      <p:sp>
+        <p:nvSpPr>
+          <p:cNvPr id="216" name="Flowchart: Process 215">
+            <a:extLst>
+              <a:ext uri="{FF2B5EF4-FFF2-40B4-BE49-F238E27FC236}">
+                <a16:creationId xmlns:a16="http://schemas.microsoft.com/office/drawing/2014/main" id="{341F127E-5432-456A-B2D0-3ABA5714DCEE}"/>
+              </a:ext>
+            </a:extLst>
+          </p:cNvPr>
+          <p:cNvSpPr/>
+          <p:nvPr/>
+        </p:nvSpPr>
+        <p:spPr>
+          <a:xfrm>
+            <a:off x="613715" y="3696523"/>
+            <a:ext cx="1864311" cy="562122"/>
+          </a:xfrm>
+          <a:prstGeom prst="flowChartProcess">
+            <a:avLst/>
+          </a:prstGeom>
+          <a:ln>
+            <a:solidFill>
+              <a:schemeClr val="tx1"/>
+            </a:solidFill>
+          </a:ln>
+        </p:spPr>
+        <p:style>
+          <a:lnRef idx="2">
+            <a:schemeClr val="accent1">
+              <a:shade val="50000"/>
+            </a:schemeClr>
+          </a:lnRef>
+          <a:fillRef idx="1">
+            <a:schemeClr val="accent1"/>
+          </a:fillRef>
+          <a:effectRef idx="0">
+            <a:schemeClr val="accent1"/>
+          </a:effectRef>
+          <a:fontRef idx="minor">
+            <a:schemeClr val="lt1"/>
+          </a:fontRef>
+        </p:style>
+        <p:txBody>
+          <a:bodyPr rtlCol="0" anchor="ctr"/>
+          <a:lstStyle/>
+          <a:p>
+            <a:pPr algn="ctr"/>
+            <a:r>
+              <a:rPr lang="en-US" sz="1600" dirty="0"/>
+              <a:t>QI Core Lab Observation</a:t>
+            </a:r>
+          </a:p>
+          <a:p>
+            <a:pPr algn="ctr"/>
+            <a:r>
+              <a:rPr lang="en-US" sz="1000" dirty="0"/>
+              <a:t>FOBT</a:t>
+            </a:r>
+          </a:p>
+        </p:txBody>
+      </p:sp>
+      <p:sp>
+        <p:nvSpPr>
+          <p:cNvPr id="217" name="Flowchart: Process 216">
+            <a:extLst>
+              <a:ext uri="{FF2B5EF4-FFF2-40B4-BE49-F238E27FC236}">
+                <a16:creationId xmlns:a16="http://schemas.microsoft.com/office/drawing/2014/main" id="{B1BEE8AD-D4A3-4CF5-8EC9-9D3F1C58D9B9}"/>
+              </a:ext>
+            </a:extLst>
+          </p:cNvPr>
+          <p:cNvSpPr/>
+          <p:nvPr/>
+        </p:nvSpPr>
+        <p:spPr>
+          <a:xfrm>
+            <a:off x="1257950" y="4421939"/>
+            <a:ext cx="1864311" cy="562122"/>
+          </a:xfrm>
+          <a:prstGeom prst="flowChartProcess">
+            <a:avLst/>
+          </a:prstGeom>
+          <a:ln>
+            <a:solidFill>
+              <a:schemeClr val="tx1"/>
+            </a:solidFill>
+          </a:ln>
+        </p:spPr>
+        <p:style>
+          <a:lnRef idx="2">
+            <a:schemeClr val="accent1">
+              <a:shade val="50000"/>
+            </a:schemeClr>
+          </a:lnRef>
+          <a:fillRef idx="1">
+            <a:schemeClr val="accent1"/>
+          </a:fillRef>
+          <a:effectRef idx="0">
+            <a:schemeClr val="accent1"/>
+          </a:effectRef>
+          <a:fontRef idx="minor">
+            <a:schemeClr val="lt1"/>
+          </a:fontRef>
+        </p:style>
+        <p:txBody>
+          <a:bodyPr rtlCol="0" anchor="ctr"/>
+          <a:lstStyle/>
+          <a:p>
+            <a:pPr algn="ctr"/>
+            <a:r>
+              <a:rPr lang="en-US" sz="1600" dirty="0"/>
+              <a:t>QI Core Procedure</a:t>
+            </a:r>
+          </a:p>
+          <a:p>
+            <a:pPr algn="ctr"/>
+            <a:r>
+              <a:rPr lang="en-US" sz="1000" dirty="0"/>
+              <a:t>Colonoscopy</a:t>
+            </a:r>
+          </a:p>
+        </p:txBody>
+      </p:sp>
+      <p:sp>
+        <p:nvSpPr>
+          <p:cNvPr id="219" name="TextBox 218">
+            <a:extLst>
+              <a:ext uri="{FF2B5EF4-FFF2-40B4-BE49-F238E27FC236}">
+                <a16:creationId xmlns:a16="http://schemas.microsoft.com/office/drawing/2014/main" id="{4886C1C2-F3A0-44EF-BCA7-C2527812A692}"/>
+              </a:ext>
+            </a:extLst>
+          </p:cNvPr>
+          <p:cNvSpPr txBox="1"/>
+          <p:nvPr/>
+        </p:nvSpPr>
+        <p:spPr>
+          <a:xfrm>
+            <a:off x="1943123" y="3384433"/>
+            <a:ext cx="445317" cy="230832"/>
+          </a:xfrm>
+          <a:prstGeom prst="rect">
+            <a:avLst/>
+          </a:prstGeom>
+          <a:solidFill>
+            <a:schemeClr val="bg1"/>
+          </a:solidFill>
+        </p:spPr>
+        <p:txBody>
+          <a:bodyPr wrap="square" rtlCol="0">
+            <a:spAutoFit/>
+          </a:bodyPr>
+          <a:lstStyle/>
+          <a:p>
+            <a:r>
+              <a:rPr lang="en-US" sz="900" b="1" dirty="0"/>
+              <a:t>entry</a:t>
+            </a:r>
+          </a:p>
+        </p:txBody>
+      </p:sp>
+      <p:sp>
+        <p:nvSpPr>
+          <p:cNvPr id="52" name="Rectangle 51">
+            <a:extLst>
+              <a:ext uri="{FF2B5EF4-FFF2-40B4-BE49-F238E27FC236}">
+                <a16:creationId xmlns:a16="http://schemas.microsoft.com/office/drawing/2014/main" id="{9F6ED974-7528-4276-AACC-2C39662FF1B6}"/>
+              </a:ext>
+            </a:extLst>
+          </p:cNvPr>
+          <p:cNvSpPr/>
+          <p:nvPr/>
+        </p:nvSpPr>
+        <p:spPr>
+          <a:xfrm>
+            <a:off x="367513" y="1518700"/>
+            <a:ext cx="5550229" cy="4230094"/>
+          </a:xfrm>
+          <a:prstGeom prst="rect">
+            <a:avLst/>
+          </a:prstGeom>
+          <a:noFill/>
+          <a:ln>
+            <a:prstDash val="solid"/>
+          </a:ln>
+        </p:spPr>
+        <p:style>
+          <a:lnRef idx="2">
+            <a:schemeClr val="accent1">
+              <a:shade val="50000"/>
+            </a:schemeClr>
+          </a:lnRef>
+          <a:fillRef idx="1">
+            <a:schemeClr val="accent1"/>
+          </a:fillRef>
+          <a:effectRef idx="0">
+            <a:schemeClr val="accent1"/>
+          </a:effectRef>
+          <a:fontRef idx="minor">
+            <a:schemeClr val="lt1"/>
+          </a:fontRef>
+        </p:style>
+        <p:txBody>
+          <a:bodyPr rtlCol="0" anchor="ctr"/>
+          <a:lstStyle/>
+          <a:p>
+            <a:pPr algn="ctr"/>
+            <a:endParaRPr lang="en-US" dirty="0"/>
+          </a:p>
+        </p:txBody>
+      </p:sp>
+      <p:sp>
+        <p:nvSpPr>
+          <p:cNvPr id="53" name="TextBox 52">
+            <a:extLst>
+              <a:ext uri="{FF2B5EF4-FFF2-40B4-BE49-F238E27FC236}">
+                <a16:creationId xmlns:a16="http://schemas.microsoft.com/office/drawing/2014/main" id="{9A704C83-75AB-47C8-8624-9AA7DFD52B44}"/>
+              </a:ext>
+            </a:extLst>
+          </p:cNvPr>
+          <p:cNvSpPr txBox="1"/>
+          <p:nvPr/>
+        </p:nvSpPr>
+        <p:spPr>
+          <a:xfrm>
+            <a:off x="2018156" y="1462357"/>
+            <a:ext cx="2088713" cy="338554"/>
+          </a:xfrm>
+          <a:prstGeom prst="rect">
+            <a:avLst/>
+          </a:prstGeom>
+          <a:noFill/>
+        </p:spPr>
+        <p:txBody>
+          <a:bodyPr wrap="none" rtlCol="0">
+            <a:spAutoFit/>
+          </a:bodyPr>
+          <a:lstStyle/>
+          <a:p>
+            <a:r>
+              <a:rPr lang="en-US" sz="1600" dirty="0">
+                <a:solidFill>
+                  <a:srgbClr val="002060"/>
+                </a:solidFill>
+              </a:rPr>
+              <a:t>GIC Bundle and entries</a:t>
+            </a:r>
+          </a:p>
+        </p:txBody>
+      </p:sp>
+    </p:spTree>
+    <p:extLst>
+      <p:ext uri="{BB962C8B-B14F-4D97-AF65-F5344CB8AC3E}">
+        <p14:creationId xmlns:p14="http://schemas.microsoft.com/office/powerpoint/2010/main" val="2433621575"/>
+      </p:ext>
+    </p:extLst>
+  </p:cSld>
+  <p:clrMapOvr>
+    <a:masterClrMapping/>
+  </p:clrMapOvr>
+</p:sld>
+</file>
+
 <file path=ppt/theme/theme1.xml><?xml version="1.0" encoding="utf-8"?>
 <a:theme xmlns:a="http://schemas.openxmlformats.org/drawingml/2006/main" name="Office Theme">
   <a:themeElements>
@@ -7508,4 +10461,299 @@
     </a:ext>
   </a:extLst>
 </a:theme>
+</file>
+
+<file path=ppt/theme/theme2.xml><?xml version="1.0" encoding="utf-8"?>
+<a:theme xmlns:a="http://schemas.openxmlformats.org/drawingml/2006/main" name="Office Theme">
+  <a:themeElements>
+    <a:clrScheme name="Office">
+      <a:dk1>
+        <a:sysClr val="windowText" lastClr="000000"/>
+      </a:dk1>
+      <a:lt1>
+        <a:sysClr val="window" lastClr="FFFFFF"/>
+      </a:lt1>
+      <a:dk2>
+        <a:srgbClr val="44546A"/>
+      </a:dk2>
+      <a:lt2>
+        <a:srgbClr val="E7E6E6"/>
+      </a:lt2>
+      <a:accent1>
+        <a:srgbClr val="4472C4"/>
+      </a:accent1>
+      <a:accent2>
+        <a:srgbClr val="ED7D31"/>
+      </a:accent2>
+      <a:accent3>
+        <a:srgbClr val="A5A5A5"/>
+      </a:accent3>
+      <a:accent4>
+        <a:srgbClr val="FFC000"/>
+      </a:accent4>
+      <a:accent5>
+        <a:srgbClr val="5B9BD5"/>
+      </a:accent5>
+      <a:accent6>
+        <a:srgbClr val="70AD47"/>
+      </a:accent6>
+      <a:hlink>
+        <a:srgbClr val="0563C1"/>
+      </a:hlink>
+      <a:folHlink>
+        <a:srgbClr val="954F72"/>
+      </a:folHlink>
+    </a:clrScheme>
+    <a:fontScheme name="Office">
+      <a:majorFont>
+        <a:latin typeface="Calibri Light" panose="020F0302020204030204"/>
+        <a:ea typeface=""/>
+        <a:cs typeface=""/>
+        <a:font script="Jpan" typeface="游ゴシック Light"/>
+        <a:font script="Hang" typeface="맑은 고딕"/>
+        <a:font script="Hans" typeface="等线 Light"/>
+        <a:font script="Hant" typeface="新細明體"/>
+        <a:font script="Arab" typeface="Times New Roman"/>
+        <a:font script="Hebr" typeface="Times New Roman"/>
+        <a:font script="Thai" typeface="Angsana New"/>
+        <a:font script="Ethi" typeface="Nyala"/>
+        <a:font script="Beng" typeface="Vrinda"/>
+        <a:font script="Gujr" typeface="Shruti"/>
+        <a:font script="Khmr" typeface="MoolBoran"/>
+        <a:font script="Knda" typeface="Tunga"/>
+        <a:font script="Guru" typeface="Raavi"/>
+        <a:font script="Cans" typeface="Euphemia"/>
+        <a:font script="Cher" typeface="Plantagenet Cherokee"/>
+        <a:font script="Yiii" typeface="Microsoft Yi Baiti"/>
+        <a:font script="Tibt" typeface="Microsoft Himalaya"/>
+        <a:font script="Thaa" typeface="MV Boli"/>
+        <a:font script="Deva" typeface="Mangal"/>
+        <a:font script="Telu" typeface="Gautami"/>
+        <a:font script="Taml" typeface="Latha"/>
+        <a:font script="Syrc" typeface="Estrangelo Edessa"/>
+        <a:font script="Orya" typeface="Kalinga"/>
+        <a:font script="Mlym" typeface="Kartika"/>
+        <a:font script="Laoo" typeface="DokChampa"/>
+        <a:font script="Sinh" typeface="Iskoola Pota"/>
+        <a:font script="Mong" typeface="Mongolian Baiti"/>
+        <a:font script="Viet" typeface="Times New Roman"/>
+        <a:font script="Uigh" typeface="Microsoft Uighur"/>
+        <a:font script="Geor" typeface="Sylfaen"/>
+        <a:font script="Armn" typeface="Arial"/>
+        <a:font script="Bugi" typeface="Leelawadee UI"/>
+        <a:font script="Bopo" typeface="Microsoft JhengHei"/>
+        <a:font script="Java" typeface="Javanese Text"/>
+        <a:font script="Lisu" typeface="Segoe UI"/>
+        <a:font script="Mymr" typeface="Myanmar Text"/>
+        <a:font script="Nkoo" typeface="Ebrima"/>
+        <a:font script="Olck" typeface="Nirmala UI"/>
+        <a:font script="Osma" typeface="Ebrima"/>
+        <a:font script="Phag" typeface="Phagspa"/>
+        <a:font script="Syrn" typeface="Estrangelo Edessa"/>
+        <a:font script="Syrj" typeface="Estrangelo Edessa"/>
+        <a:font script="Syre" typeface="Estrangelo Edessa"/>
+        <a:font script="Sora" typeface="Nirmala UI"/>
+        <a:font script="Tale" typeface="Microsoft Tai Le"/>
+        <a:font script="Talu" typeface="Microsoft New Tai Lue"/>
+        <a:font script="Tfng" typeface="Ebrima"/>
+      </a:majorFont>
+      <a:minorFont>
+        <a:latin typeface="Calibri" panose="020F0502020204030204"/>
+        <a:ea typeface=""/>
+        <a:cs typeface=""/>
+        <a:font script="Jpan" typeface="游ゴシック"/>
+        <a:font script="Hang" typeface="맑은 고딕"/>
+        <a:font script="Hans" typeface="等线"/>
+        <a:font script="Hant" typeface="新細明體"/>
+        <a:font script="Arab" typeface="Arial"/>
+        <a:font script="Hebr" typeface="Arial"/>
+        <a:font script="Thai" typeface="Cordia New"/>
+        <a:font script="Ethi" typeface="Nyala"/>
+        <a:font script="Beng" typeface="Vrinda"/>
+        <a:font script="Gujr" typeface="Shruti"/>
+        <a:font script="Khmr" typeface="DaunPenh"/>
+        <a:font script="Knda" typeface="Tunga"/>
+        <a:font script="Guru" typeface="Raavi"/>
+        <a:font script="Cans" typeface="Euphemia"/>
+        <a:font script="Cher" typeface="Plantagenet Cherokee"/>
+        <a:font script="Yiii" typeface="Microsoft Yi Baiti"/>
+        <a:font script="Tibt" typeface="Microsoft Himalaya"/>
+        <a:font script="Thaa" typeface="MV Boli"/>
+        <a:font script="Deva" typeface="Mangal"/>
+        <a:font script="Telu" typeface="Gautami"/>
+        <a:font script="Taml" typeface="Latha"/>
+        <a:font script="Syrc" typeface="Estrangelo Edessa"/>
+        <a:font script="Orya" typeface="Kalinga"/>
+        <a:font script="Mlym" typeface="Kartika"/>
+        <a:font script="Laoo" typeface="DokChampa"/>
+        <a:font script="Sinh" typeface="Iskoola Pota"/>
+        <a:font script="Mong" typeface="Mongolian Baiti"/>
+        <a:font script="Viet" typeface="Arial"/>
+        <a:font script="Uigh" typeface="Microsoft Uighur"/>
+        <a:font script="Geor" typeface="Sylfaen"/>
+        <a:font script="Armn" typeface="Arial"/>
+        <a:font script="Bugi" typeface="Leelawadee UI"/>
+        <a:font script="Bopo" typeface="Microsoft JhengHei"/>
+        <a:font script="Java" typeface="Javanese Text"/>
+        <a:font script="Lisu" typeface="Segoe UI"/>
+        <a:font script="Mymr" typeface="Myanmar Text"/>
+        <a:font script="Nkoo" typeface="Ebrima"/>
+        <a:font script="Olck" typeface="Nirmala UI"/>
+        <a:font script="Osma" typeface="Ebrima"/>
+        <a:font script="Phag" typeface="Phagspa"/>
+        <a:font script="Syrn" typeface="Estrangelo Edessa"/>
+        <a:font script="Syrj" typeface="Estrangelo Edessa"/>
+        <a:font script="Syre" typeface="Estrangelo Edessa"/>
+        <a:font script="Sora" typeface="Nirmala UI"/>
+        <a:font script="Tale" typeface="Microsoft Tai Le"/>
+        <a:font script="Talu" typeface="Microsoft New Tai Lue"/>
+        <a:font script="Tfng" typeface="Ebrima"/>
+      </a:minorFont>
+    </a:fontScheme>
+    <a:fmtScheme name="Office">
+      <a:fillStyleLst>
+        <a:solidFill>
+          <a:schemeClr val="phClr"/>
+        </a:solidFill>
+        <a:gradFill rotWithShape="1">
+          <a:gsLst>
+            <a:gs pos="0">
+              <a:schemeClr val="phClr">
+                <a:lumMod val="110000"/>
+                <a:satMod val="105000"/>
+                <a:tint val="67000"/>
+              </a:schemeClr>
+            </a:gs>
+            <a:gs pos="50000">
+              <a:schemeClr val="phClr">
+                <a:lumMod val="105000"/>
+                <a:satMod val="103000"/>
+                <a:tint val="73000"/>
+              </a:schemeClr>
+            </a:gs>
+            <a:gs pos="100000">
+              <a:schemeClr val="phClr">
+                <a:lumMod val="105000"/>
+                <a:satMod val="109000"/>
+                <a:tint val="81000"/>
+              </a:schemeClr>
+            </a:gs>
+          </a:gsLst>
+          <a:lin ang="5400000" scaled="0"/>
+        </a:gradFill>
+        <a:gradFill rotWithShape="1">
+          <a:gsLst>
+            <a:gs pos="0">
+              <a:schemeClr val="phClr">
+                <a:satMod val="103000"/>
+                <a:lumMod val="102000"/>
+                <a:tint val="94000"/>
+              </a:schemeClr>
+            </a:gs>
+            <a:gs pos="50000">
+              <a:schemeClr val="phClr">
+                <a:satMod val="110000"/>
+                <a:lumMod val="100000"/>
+                <a:shade val="100000"/>
+              </a:schemeClr>
+            </a:gs>
+            <a:gs pos="100000">
+              <a:schemeClr val="phClr">
+                <a:lumMod val="99000"/>
+                <a:satMod val="120000"/>
+                <a:shade val="78000"/>
+              </a:schemeClr>
+            </a:gs>
+          </a:gsLst>
+          <a:lin ang="5400000" scaled="0"/>
+        </a:gradFill>
+      </a:fillStyleLst>
+      <a:lnStyleLst>
+        <a:ln w="6350" cap="flat" cmpd="sng" algn="ctr">
+          <a:solidFill>
+            <a:schemeClr val="phClr"/>
+          </a:solidFill>
+          <a:prstDash val="solid"/>
+          <a:miter lim="800000"/>
+        </a:ln>
+        <a:ln w="12700" cap="flat" cmpd="sng" algn="ctr">
+          <a:solidFill>
+            <a:schemeClr val="phClr"/>
+          </a:solidFill>
+          <a:prstDash val="solid"/>
+          <a:miter lim="800000"/>
+        </a:ln>
+        <a:ln w="19050" cap="flat" cmpd="sng" algn="ctr">
+          <a:solidFill>
+            <a:schemeClr val="phClr"/>
+          </a:solidFill>
+          <a:prstDash val="solid"/>
+          <a:miter lim="800000"/>
+        </a:ln>
+      </a:lnStyleLst>
+      <a:effectStyleLst>
+        <a:effectStyle>
+          <a:effectLst/>
+        </a:effectStyle>
+        <a:effectStyle>
+          <a:effectLst/>
+        </a:effectStyle>
+        <a:effectStyle>
+          <a:effectLst>
+            <a:outerShdw blurRad="57150" dist="19050" dir="5400000" algn="ctr" rotWithShape="0">
+              <a:srgbClr val="000000">
+                <a:alpha val="63000"/>
+              </a:srgbClr>
+            </a:outerShdw>
+          </a:effectLst>
+        </a:effectStyle>
+      </a:effectStyleLst>
+      <a:bgFillStyleLst>
+        <a:solidFill>
+          <a:schemeClr val="phClr"/>
+        </a:solidFill>
+        <a:solidFill>
+          <a:schemeClr val="phClr">
+            <a:tint val="95000"/>
+            <a:satMod val="170000"/>
+          </a:schemeClr>
+        </a:solidFill>
+        <a:gradFill rotWithShape="1">
+          <a:gsLst>
+            <a:gs pos="0">
+              <a:schemeClr val="phClr">
+                <a:tint val="93000"/>
+                <a:satMod val="150000"/>
+                <a:shade val="98000"/>
+                <a:lumMod val="102000"/>
+              </a:schemeClr>
+            </a:gs>
+            <a:gs pos="50000">
+              <a:schemeClr val="phClr">
+                <a:tint val="98000"/>
+                <a:satMod val="130000"/>
+                <a:shade val="90000"/>
+                <a:lumMod val="103000"/>
+              </a:schemeClr>
+            </a:gs>
+            <a:gs pos="100000">
+              <a:schemeClr val="phClr">
+                <a:shade val="63000"/>
+                <a:satMod val="120000"/>
+              </a:schemeClr>
+            </a:gs>
+          </a:gsLst>
+          <a:lin ang="5400000" scaled="0"/>
+        </a:gradFill>
+      </a:bgFillStyleLst>
+    </a:fmtScheme>
+  </a:themeElements>
+  <a:objectDefaults/>
+  <a:extraClrSchemeLst/>
+  <a:extLst>
+    <a:ext uri="{05A4C25C-085E-4340-85A3-A5531E510DB2}">
+      <thm15:themeFamily xmlns:thm15="http://schemas.microsoft.com/office/thememl/2012/main" name="Office Theme" id="{62F939B6-93AF-4DB8-9C6B-D6C7DFDC589F}" vid="{4A3C46E8-61CC-4603-A589-7422A47A8E4A}"/>
+    </a:ext>
+  </a:extLst>
+</a:theme>
 </file>
</xml_diff>

<commit_message>
FHIR-46027 - Added IN parameter to $care-gaps to specify whether a Gaps in Care Composition is returned in the Bundle and updated profile, and documentation to align
</commit_message>
<xml_diff>
--- a/input/images/source/Gaps in Care Graphics.pptx
+++ b/input/images/source/Gaps in Care Graphics.pptx
@@ -14,7 +14,7 @@
     <p:sldId id="264" r:id="rId5"/>
     <p:sldId id="256" r:id="rId6"/>
     <p:sldId id="265" r:id="rId7"/>
-    <p:sldId id="267" r:id="rId8"/>
+    <p:sldId id="268" r:id="rId8"/>
   </p:sldIdLst>
   <p:sldSz cx="12192000" cy="6858000"/>
   <p:notesSz cx="6858000" cy="9144000"/>
@@ -124,7 +124,7 @@
             <p14:sldId id="264"/>
             <p14:sldId id="256"/>
             <p14:sldId id="265"/>
-            <p14:sldId id="267"/>
+            <p14:sldId id="268"/>
           </p14:sldIdLst>
         </p14:section>
       </p14:sectionLst>
@@ -218,7 +218,7 @@
           <a:p>
             <a:fld id="{17E6B6D7-20D6-4E9A-B6E5-85297A5570A7}" type="datetimeFigureOut">
               <a:rPr lang="en-US" smtClean="0"/>
-              <a:t>11/23/2022</a:t>
+              <a:t>7/29/24</a:t>
             </a:fld>
             <a:endParaRPr lang="en-US"/>
           </a:p>
@@ -734,7 +734,7 @@
           <a:p>
             <a:fld id="{CCEBD49B-BC6D-4065-97F6-E22D565E4F2F}" type="datetimeFigureOut">
               <a:rPr lang="en-US" smtClean="0"/>
-              <a:t>11/23/2022</a:t>
+              <a:t>7/29/24</a:t>
             </a:fld>
             <a:endParaRPr lang="en-US"/>
           </a:p>
@@ -932,7 +932,7 @@
           <a:p>
             <a:fld id="{CCEBD49B-BC6D-4065-97F6-E22D565E4F2F}" type="datetimeFigureOut">
               <a:rPr lang="en-US" smtClean="0"/>
-              <a:t>11/23/2022</a:t>
+              <a:t>7/29/24</a:t>
             </a:fld>
             <a:endParaRPr lang="en-US"/>
           </a:p>
@@ -1140,7 +1140,7 @@
           <a:p>
             <a:fld id="{CCEBD49B-BC6D-4065-97F6-E22D565E4F2F}" type="datetimeFigureOut">
               <a:rPr lang="en-US" smtClean="0"/>
-              <a:t>11/23/2022</a:t>
+              <a:t>7/29/24</a:t>
             </a:fld>
             <a:endParaRPr lang="en-US"/>
           </a:p>
@@ -1338,7 +1338,7 @@
           <a:p>
             <a:fld id="{CCEBD49B-BC6D-4065-97F6-E22D565E4F2F}" type="datetimeFigureOut">
               <a:rPr lang="en-US" smtClean="0"/>
-              <a:t>11/23/2022</a:t>
+              <a:t>7/29/24</a:t>
             </a:fld>
             <a:endParaRPr lang="en-US"/>
           </a:p>
@@ -1613,7 +1613,7 @@
           <a:p>
             <a:fld id="{CCEBD49B-BC6D-4065-97F6-E22D565E4F2F}" type="datetimeFigureOut">
               <a:rPr lang="en-US" smtClean="0"/>
-              <a:t>11/23/2022</a:t>
+              <a:t>7/29/24</a:t>
             </a:fld>
             <a:endParaRPr lang="en-US"/>
           </a:p>
@@ -1878,7 +1878,7 @@
           <a:p>
             <a:fld id="{CCEBD49B-BC6D-4065-97F6-E22D565E4F2F}" type="datetimeFigureOut">
               <a:rPr lang="en-US" smtClean="0"/>
-              <a:t>11/23/2022</a:t>
+              <a:t>7/29/24</a:t>
             </a:fld>
             <a:endParaRPr lang="en-US"/>
           </a:p>
@@ -2290,7 +2290,7 @@
           <a:p>
             <a:fld id="{CCEBD49B-BC6D-4065-97F6-E22D565E4F2F}" type="datetimeFigureOut">
               <a:rPr lang="en-US" smtClean="0"/>
-              <a:t>11/23/2022</a:t>
+              <a:t>7/29/24</a:t>
             </a:fld>
             <a:endParaRPr lang="en-US"/>
           </a:p>
@@ -2431,7 +2431,7 @@
           <a:p>
             <a:fld id="{CCEBD49B-BC6D-4065-97F6-E22D565E4F2F}" type="datetimeFigureOut">
               <a:rPr lang="en-US" smtClean="0"/>
-              <a:t>11/23/2022</a:t>
+              <a:t>7/29/24</a:t>
             </a:fld>
             <a:endParaRPr lang="en-US"/>
           </a:p>
@@ -2544,7 +2544,7 @@
           <a:p>
             <a:fld id="{CCEBD49B-BC6D-4065-97F6-E22D565E4F2F}" type="datetimeFigureOut">
               <a:rPr lang="en-US" smtClean="0"/>
-              <a:t>11/23/2022</a:t>
+              <a:t>7/29/24</a:t>
             </a:fld>
             <a:endParaRPr lang="en-US"/>
           </a:p>
@@ -2855,7 +2855,7 @@
           <a:p>
             <a:fld id="{CCEBD49B-BC6D-4065-97F6-E22D565E4F2F}" type="datetimeFigureOut">
               <a:rPr lang="en-US" smtClean="0"/>
-              <a:t>11/23/2022</a:t>
+              <a:t>7/29/24</a:t>
             </a:fld>
             <a:endParaRPr lang="en-US"/>
           </a:p>
@@ -3143,7 +3143,7 @@
           <a:p>
             <a:fld id="{CCEBD49B-BC6D-4065-97F6-E22D565E4F2F}" type="datetimeFigureOut">
               <a:rPr lang="en-US" smtClean="0"/>
-              <a:t>11/23/2022</a:t>
+              <a:t>7/29/24</a:t>
             </a:fld>
             <a:endParaRPr lang="en-US"/>
           </a:p>
@@ -3384,7 +3384,7 @@
           <a:p>
             <a:fld id="{CCEBD49B-BC6D-4065-97F6-E22D565E4F2F}" type="datetimeFigureOut">
               <a:rPr lang="en-US" smtClean="0"/>
-              <a:t>11/23/2022</a:t>
+              <a:t>7/29/24</a:t>
             </a:fld>
             <a:endParaRPr lang="en-US"/>
           </a:p>
@@ -7792,6 +7792,13 @@
           <a:prstGeom prst="flowChartProcess">
             <a:avLst/>
           </a:prstGeom>
+          <a:solidFill>
+            <a:schemeClr val="accent6">
+              <a:lumMod val="60000"/>
+              <a:lumOff val="40000"/>
+              <a:alpha val="53000"/>
+            </a:schemeClr>
+          </a:solidFill>
           <a:ln>
             <a:solidFill>
               <a:schemeClr val="tx1"/>
@@ -7820,10 +7827,29 @@
           <a:p>
             <a:pPr algn="ctr"/>
             <a:r>
-              <a:rPr lang="en-US" sz="1600" dirty="0"/>
+              <a:rPr lang="en-US" sz="1600" dirty="0">
+                <a:solidFill>
+                  <a:schemeClr val="bg2">
+                    <a:lumMod val="25000"/>
+                  </a:schemeClr>
+                </a:solidFill>
+              </a:rPr>
               <a:t>GIC Composition</a:t>
             </a:r>
           </a:p>
+          <a:p>
+            <a:pPr algn="ctr"/>
+            <a:r>
+              <a:rPr lang="en-US" sz="1600" dirty="0">
+                <a:solidFill>
+                  <a:schemeClr val="bg2">
+                    <a:lumMod val="25000"/>
+                  </a:schemeClr>
+                </a:solidFill>
+              </a:rPr>
+              <a:t>(optional)</a:t>
+            </a:r>
+          </a:p>
         </p:txBody>
       </p:sp>
       <p:sp>
@@ -7840,7 +7866,7 @@
         </p:nvSpPr>
         <p:spPr>
           <a:xfrm>
-            <a:off x="607740" y="1820994"/>
+            <a:off x="563136" y="1820994"/>
             <a:ext cx="1864311" cy="611431"/>
           </a:xfrm>
           <a:prstGeom prst="flowChartProcess">
@@ -8006,8 +8032,8 @@
         </p:nvSpPr>
         <p:spPr>
           <a:xfrm>
-            <a:off x="10169285" y="2693356"/>
-            <a:ext cx="1864310" cy="555676"/>
+            <a:off x="10169285" y="2782563"/>
+            <a:ext cx="1864310" cy="688895"/>
           </a:xfrm>
           <a:prstGeom prst="flowChartProcess">
             <a:avLst/>
@@ -8128,9 +8154,9 @@
           <p:nvPr/>
         </p:nvCxnSpPr>
         <p:spPr>
-          <a:xfrm>
-            <a:off x="8794616" y="2123167"/>
-            <a:ext cx="1374669" cy="848027"/>
+          <a:xfrm flipV="1">
+            <a:off x="8723427" y="3127011"/>
+            <a:ext cx="1445858" cy="348738"/>
           </a:xfrm>
           <a:prstGeom prst="straightConnector1">
             <a:avLst/>
@@ -8171,7 +8197,7 @@
         </p:nvSpPr>
         <p:spPr>
           <a:xfrm>
-            <a:off x="6930305" y="1842106"/>
+            <a:off x="6859116" y="3194688"/>
             <a:ext cx="1864311" cy="562122"/>
           </a:xfrm>
           <a:prstGeom prst="flowChartProcess">
@@ -8240,8 +8266,8 @@
         </p:nvCxnSpPr>
         <p:spPr>
           <a:xfrm>
-            <a:off x="2472051" y="2126710"/>
-            <a:ext cx="1477159" cy="861872"/>
+            <a:off x="2427447" y="2126710"/>
+            <a:ext cx="1521763" cy="861872"/>
           </a:xfrm>
           <a:prstGeom prst="straightConnector1">
             <a:avLst/>
@@ -8286,8 +8312,8 @@
         </p:nvCxnSpPr>
         <p:spPr>
           <a:xfrm flipV="1">
-            <a:off x="2472051" y="2125216"/>
-            <a:ext cx="1477161" cy="1494"/>
+            <a:off x="2427447" y="2125216"/>
+            <a:ext cx="1521765" cy="1494"/>
           </a:xfrm>
           <a:prstGeom prst="straightConnector1">
             <a:avLst/>
@@ -8296,6 +8322,7 @@
             <a:solidFill>
               <a:schemeClr val="tx1"/>
             </a:solidFill>
+            <a:prstDash val="dash"/>
             <a:tailEnd type="triangle"/>
           </a:ln>
         </p:spPr>
@@ -8369,8 +8396,8 @@
         </p:nvCxnSpPr>
         <p:spPr>
           <a:xfrm flipV="1">
-            <a:off x="8794616" y="2115991"/>
-            <a:ext cx="1374669" cy="7176"/>
+            <a:off x="8723427" y="2115991"/>
+            <a:ext cx="1445858" cy="1359758"/>
           </a:xfrm>
           <a:prstGeom prst="straightConnector1">
             <a:avLst/>
@@ -8513,7 +8540,7 @@
         </p:nvSpPr>
         <p:spPr>
           <a:xfrm>
-            <a:off x="8944855" y="1995343"/>
+            <a:off x="9057024" y="3168833"/>
             <a:ext cx="1124767" cy="230832"/>
           </a:xfrm>
           <a:prstGeom prst="rect">
@@ -8554,7 +8581,7 @@
         </p:nvSpPr>
         <p:spPr>
           <a:xfrm>
-            <a:off x="9124500" y="2416989"/>
+            <a:off x="9019671" y="2515453"/>
             <a:ext cx="1124767" cy="230832"/>
           </a:xfrm>
           <a:prstGeom prst="rect">
@@ -8652,9 +8679,9 @@
           <p:nvPr/>
         </p:nvCxnSpPr>
         <p:spPr>
-          <a:xfrm flipV="1">
-            <a:off x="5813523" y="2123167"/>
-            <a:ext cx="1116782" cy="2049"/>
+          <a:xfrm>
+            <a:off x="5813523" y="2125216"/>
+            <a:ext cx="1045593" cy="1350533"/>
           </a:xfrm>
           <a:prstGeom prst="straightConnector1">
             <a:avLst/>
@@ -8699,8 +8726,8 @@
         </p:nvCxnSpPr>
         <p:spPr>
           <a:xfrm>
-            <a:off x="2472051" y="2126710"/>
-            <a:ext cx="1477158" cy="1671798"/>
+            <a:off x="2427447" y="2126710"/>
+            <a:ext cx="1521762" cy="1671798"/>
           </a:xfrm>
           <a:prstGeom prst="straightConnector1">
             <a:avLst/>
@@ -8745,8 +8772,8 @@
         </p:nvCxnSpPr>
         <p:spPr>
           <a:xfrm>
-            <a:off x="2472051" y="2126710"/>
-            <a:ext cx="1492141" cy="2510779"/>
+            <a:off x="2427447" y="2126710"/>
+            <a:ext cx="1536745" cy="2510779"/>
           </a:xfrm>
           <a:prstGeom prst="straightConnector1">
             <a:avLst/>
@@ -8824,7 +8851,7 @@
         </p:nvSpPr>
         <p:spPr>
           <a:xfrm>
-            <a:off x="3054225" y="3270706"/>
+            <a:off x="3299449" y="3681785"/>
             <a:ext cx="459578" cy="230832"/>
           </a:xfrm>
           <a:prstGeom prst="rect">
@@ -8865,8 +8892,8 @@
         </p:nvCxnSpPr>
         <p:spPr>
           <a:xfrm>
-            <a:off x="1539896" y="2432425"/>
-            <a:ext cx="650210" cy="1989514"/>
+            <a:off x="1495292" y="2432425"/>
+            <a:ext cx="632895" cy="1989514"/>
           </a:xfrm>
           <a:prstGeom prst="straightConnector1">
             <a:avLst/>
@@ -8905,13 +8932,14 @@
           <p:cNvCxnSpPr>
             <a:cxnSpLocks/>
             <a:stCxn id="5" idx="2"/>
+            <a:endCxn id="216" idx="0"/>
           </p:cNvCxnSpPr>
           <p:nvPr/>
         </p:nvCxnSpPr>
         <p:spPr>
           <a:xfrm>
-            <a:off x="1539896" y="2432425"/>
-            <a:ext cx="5975" cy="1264098"/>
+            <a:off x="1495292" y="2432425"/>
+            <a:ext cx="5975" cy="1173909"/>
           </a:xfrm>
           <a:prstGeom prst="straightConnector1">
             <a:avLst/>
@@ -8952,7 +8980,7 @@
         </p:nvSpPr>
         <p:spPr>
           <a:xfrm>
-            <a:off x="6945285" y="2693875"/>
+            <a:off x="6859116" y="4588897"/>
             <a:ext cx="1864311" cy="562122"/>
           </a:xfrm>
           <a:prstGeom prst="flowChartProcess">
@@ -9015,7 +9043,7 @@
         <p:spPr>
           <a:xfrm>
             <a:off x="5813523" y="2125216"/>
-            <a:ext cx="1131762" cy="849720"/>
+            <a:ext cx="1045593" cy="2744742"/>
           </a:xfrm>
           <a:prstGeom prst="straightConnector1">
             <a:avLst/>
@@ -9056,7 +9084,7 @@
         </p:nvSpPr>
         <p:spPr>
           <a:xfrm>
-            <a:off x="6106950" y="2469714"/>
+            <a:off x="6139654" y="2756779"/>
             <a:ext cx="900006" cy="230832"/>
           </a:xfrm>
           <a:prstGeom prst="rect">
@@ -9097,7 +9125,7 @@
         </p:nvSpPr>
         <p:spPr>
           <a:xfrm>
-            <a:off x="5957731" y="1995343"/>
+            <a:off x="6136876" y="3986625"/>
             <a:ext cx="814938" cy="230832"/>
           </a:xfrm>
           <a:prstGeom prst="rect">
@@ -9138,7 +9166,7 @@
         </p:nvSpPr>
         <p:spPr>
           <a:xfrm>
-            <a:off x="6951965" y="3602004"/>
+            <a:off x="6859116" y="1848234"/>
             <a:ext cx="1864311" cy="562122"/>
           </a:xfrm>
           <a:prstGeom prst="flowChartProcess">
@@ -9201,7 +9229,7 @@
         <p:spPr>
           <a:xfrm>
             <a:off x="5813523" y="2125216"/>
-            <a:ext cx="1138442" cy="1757849"/>
+            <a:ext cx="1045593" cy="4079"/>
           </a:xfrm>
           <a:prstGeom prst="straightConnector1">
             <a:avLst/>
@@ -9242,7 +9270,7 @@
         </p:nvSpPr>
         <p:spPr>
           <a:xfrm>
-            <a:off x="6217341" y="3124302"/>
+            <a:off x="6090625" y="2010190"/>
             <a:ext cx="633829" cy="230832"/>
           </a:xfrm>
           <a:prstGeom prst="rect">
@@ -9283,7 +9311,7 @@
         </p:nvSpPr>
         <p:spPr>
           <a:xfrm>
-            <a:off x="10169285" y="3563030"/>
+            <a:off x="10169285" y="3797201"/>
             <a:ext cx="1864310" cy="555676"/>
           </a:xfrm>
           <a:prstGeom prst="flowChartProcess">
@@ -9346,8 +9374,8 @@
         </p:nvCxnSpPr>
         <p:spPr>
           <a:xfrm>
-            <a:off x="8794616" y="2123167"/>
-            <a:ext cx="1374669" cy="1717701"/>
+            <a:off x="8723427" y="3475749"/>
+            <a:ext cx="1445858" cy="599290"/>
           </a:xfrm>
           <a:prstGeom prst="straightConnector1">
             <a:avLst/>
@@ -9388,7 +9416,7 @@
         </p:nvSpPr>
         <p:spPr>
           <a:xfrm>
-            <a:off x="9318333" y="3093181"/>
+            <a:off x="9123125" y="3682575"/>
             <a:ext cx="737102" cy="230832"/>
           </a:xfrm>
           <a:prstGeom prst="rect">
@@ -9429,7 +9457,7 @@
         </p:nvSpPr>
         <p:spPr>
           <a:xfrm>
-            <a:off x="1551959" y="3266683"/>
+            <a:off x="1516554" y="3209857"/>
             <a:ext cx="459578" cy="230832"/>
           </a:xfrm>
           <a:prstGeom prst="rect">
@@ -9466,7 +9494,7 @@
         </p:nvSpPr>
         <p:spPr>
           <a:xfrm>
-            <a:off x="1209312" y="2940440"/>
+            <a:off x="1204549" y="2969018"/>
             <a:ext cx="459578" cy="230832"/>
           </a:xfrm>
           <a:prstGeom prst="rect">
@@ -9559,14 +9587,15 @@
           </p:cNvPr>
           <p:cNvCxnSpPr>
             <a:cxnSpLocks/>
+            <a:stCxn id="134" idx="3"/>
             <a:endCxn id="188" idx="1"/>
           </p:cNvCxnSpPr>
           <p:nvPr/>
         </p:nvCxnSpPr>
         <p:spPr>
           <a:xfrm>
-            <a:off x="8801293" y="2978370"/>
-            <a:ext cx="1389467" cy="2002468"/>
+            <a:off x="8723427" y="4869958"/>
+            <a:ext cx="1467333" cy="110880"/>
           </a:xfrm>
           <a:prstGeom prst="straightConnector1">
             <a:avLst/>
@@ -9607,8 +9636,8 @@
         </p:nvSpPr>
         <p:spPr>
           <a:xfrm>
-            <a:off x="8985040" y="3829528"/>
-            <a:ext cx="954697" cy="230832"/>
+            <a:off x="8890114" y="4763611"/>
+            <a:ext cx="1070395" cy="230832"/>
           </a:xfrm>
           <a:prstGeom prst="rect">
             <a:avLst/>
@@ -9629,7 +9658,7 @@
                   <a:srgbClr val="0070C0"/>
                 </a:solidFill>
               </a:rPr>
-              <a:t>evidence.detail</a:t>
+              <a:t>evidence[1].detail</a:t>
             </a:r>
           </a:p>
         </p:txBody>
@@ -9652,8 +9681,8 @@
         </p:nvCxnSpPr>
         <p:spPr>
           <a:xfrm>
-            <a:off x="2472051" y="2126710"/>
-            <a:ext cx="1483672" cy="3260355"/>
+            <a:off x="2427447" y="2126710"/>
+            <a:ext cx="1528276" cy="3260355"/>
           </a:xfrm>
           <a:prstGeom prst="straightConnector1">
             <a:avLst/>
@@ -9694,7 +9723,7 @@
         </p:nvSpPr>
         <p:spPr>
           <a:xfrm>
-            <a:off x="2928944" y="3652233"/>
+            <a:off x="3082342" y="4044221"/>
             <a:ext cx="459578" cy="230832"/>
           </a:xfrm>
           <a:prstGeom prst="rect">
@@ -9820,7 +9849,7 @@
         </p:nvSpPr>
         <p:spPr>
           <a:xfrm>
-            <a:off x="1789641" y="5106004"/>
+            <a:off x="1875487" y="5106004"/>
             <a:ext cx="1864311" cy="562122"/>
           </a:xfrm>
           <a:prstGeom prst="flowChartProcess">
@@ -9879,8 +9908,8 @@
         </p:nvCxnSpPr>
         <p:spPr>
           <a:xfrm>
-            <a:off x="1539896" y="2432425"/>
-            <a:ext cx="1181901" cy="2673579"/>
+            <a:off x="1495292" y="2432425"/>
+            <a:ext cx="1312351" cy="2673579"/>
           </a:xfrm>
           <a:prstGeom prst="straightConnector1">
             <a:avLst/>
@@ -9921,8 +9950,8 @@
         </p:nvSpPr>
         <p:spPr>
           <a:xfrm>
-            <a:off x="613715" y="3696523"/>
-            <a:ext cx="1864311" cy="562122"/>
+            <a:off x="569111" y="3606334"/>
+            <a:ext cx="1864311" cy="618858"/>
           </a:xfrm>
           <a:prstGeom prst="flowChartProcess">
             <a:avLst/>
@@ -9982,7 +10011,7 @@
         </p:nvSpPr>
         <p:spPr>
           <a:xfrm>
-            <a:off x="1257950" y="4421939"/>
+            <a:off x="1196031" y="4421939"/>
             <a:ext cx="1864311" cy="562122"/>
           </a:xfrm>
           <a:prstGeom prst="flowChartProcess">
@@ -10043,7 +10072,7 @@
         </p:nvSpPr>
         <p:spPr>
           <a:xfrm>
-            <a:off x="1943123" y="3384433"/>
+            <a:off x="1926289" y="3320966"/>
             <a:ext cx="445317" cy="230832"/>
           </a:xfrm>
           <a:prstGeom prst="rect">
@@ -10155,10 +10184,184 @@
           </a:p>
         </p:txBody>
       </p:sp>
+      <p:cxnSp>
+        <p:nvCxnSpPr>
+          <p:cNvPr id="11" name="Straight Arrow Connector 10">
+            <a:extLst>
+              <a:ext uri="{FF2B5EF4-FFF2-40B4-BE49-F238E27FC236}">
+                <a16:creationId xmlns:a16="http://schemas.microsoft.com/office/drawing/2014/main" id="{AC18E9BE-BEC5-74A4-6D39-6E4B7FEF1A59}"/>
+              </a:ext>
+            </a:extLst>
+          </p:cNvPr>
+          <p:cNvCxnSpPr>
+            <a:cxnSpLocks/>
+            <a:stCxn id="134" idx="0"/>
+            <a:endCxn id="90" idx="2"/>
+          </p:cNvCxnSpPr>
+          <p:nvPr/>
+        </p:nvCxnSpPr>
+        <p:spPr>
+          <a:xfrm flipV="1">
+            <a:off x="7791272" y="3756810"/>
+            <a:ext cx="0" cy="832087"/>
+          </a:xfrm>
+          <a:prstGeom prst="straightConnector1">
+            <a:avLst/>
+          </a:prstGeom>
+          <a:ln>
+            <a:solidFill>
+              <a:srgbClr val="0070C0"/>
+            </a:solidFill>
+            <a:tailEnd type="triangle"/>
+          </a:ln>
+        </p:spPr>
+        <p:style>
+          <a:lnRef idx="1">
+            <a:schemeClr val="accent1"/>
+          </a:lnRef>
+          <a:fillRef idx="0">
+            <a:schemeClr val="accent1"/>
+          </a:fillRef>
+          <a:effectRef idx="0">
+            <a:schemeClr val="accent1"/>
+          </a:effectRef>
+          <a:fontRef idx="minor">
+            <a:schemeClr val="tx1"/>
+          </a:fontRef>
+        </p:style>
+      </p:cxnSp>
+      <p:sp>
+        <p:nvSpPr>
+          <p:cNvPr id="6" name="TextBox 5">
+            <a:extLst>
+              <a:ext uri="{FF2B5EF4-FFF2-40B4-BE49-F238E27FC236}">
+                <a16:creationId xmlns:a16="http://schemas.microsoft.com/office/drawing/2014/main" id="{679B42CF-E79F-BCEF-3D5C-17930844E158}"/>
+              </a:ext>
+            </a:extLst>
+          </p:cNvPr>
+          <p:cNvSpPr txBox="1"/>
+          <p:nvPr/>
+        </p:nvSpPr>
+        <p:spPr>
+          <a:xfrm>
+            <a:off x="7234391" y="4153883"/>
+            <a:ext cx="1070395" cy="230832"/>
+          </a:xfrm>
+          <a:prstGeom prst="rect">
+            <a:avLst/>
+          </a:prstGeom>
+          <a:solidFill>
+            <a:schemeClr val="bg1"/>
+          </a:solidFill>
+        </p:spPr>
+        <p:txBody>
+          <a:bodyPr wrap="square" rtlCol="0">
+            <a:spAutoFit/>
+          </a:bodyPr>
+          <a:lstStyle/>
+          <a:p>
+            <a:r>
+              <a:rPr lang="en-US" sz="900" b="1" dirty="0">
+                <a:solidFill>
+                  <a:srgbClr val="0070C0"/>
+                </a:solidFill>
+              </a:rPr>
+              <a:t>evidence[0].detail</a:t>
+            </a:r>
+          </a:p>
+        </p:txBody>
+      </p:sp>
+      <p:cxnSp>
+        <p:nvCxnSpPr>
+          <p:cNvPr id="26" name="Straight Arrow Connector 25">
+            <a:extLst>
+              <a:ext uri="{FF2B5EF4-FFF2-40B4-BE49-F238E27FC236}">
+                <a16:creationId xmlns:a16="http://schemas.microsoft.com/office/drawing/2014/main" id="{B3C3EFB7-1DC4-13C3-6A53-FB0898F58256}"/>
+              </a:ext>
+            </a:extLst>
+          </p:cNvPr>
+          <p:cNvCxnSpPr>
+            <a:cxnSpLocks/>
+            <a:stCxn id="90" idx="0"/>
+            <a:endCxn id="180" idx="2"/>
+          </p:cNvCxnSpPr>
+          <p:nvPr/>
+        </p:nvCxnSpPr>
+        <p:spPr>
+          <a:xfrm flipV="1">
+            <a:off x="7791272" y="2410356"/>
+            <a:ext cx="0" cy="784332"/>
+          </a:xfrm>
+          <a:prstGeom prst="straightConnector1">
+            <a:avLst/>
+          </a:prstGeom>
+          <a:ln w="9525">
+            <a:solidFill>
+              <a:srgbClr val="0070C0"/>
+            </a:solidFill>
+            <a:tailEnd type="triangle"/>
+          </a:ln>
+        </p:spPr>
+        <p:style>
+          <a:lnRef idx="1">
+            <a:schemeClr val="accent1"/>
+          </a:lnRef>
+          <a:fillRef idx="0">
+            <a:schemeClr val="accent1"/>
+          </a:fillRef>
+          <a:effectRef idx="0">
+            <a:schemeClr val="accent1"/>
+          </a:effectRef>
+          <a:fontRef idx="minor">
+            <a:schemeClr val="tx1"/>
+          </a:fontRef>
+        </p:style>
+      </p:cxnSp>
+      <p:sp>
+        <p:nvSpPr>
+          <p:cNvPr id="30" name="TextBox 29">
+            <a:extLst>
+              <a:ext uri="{FF2B5EF4-FFF2-40B4-BE49-F238E27FC236}">
+                <a16:creationId xmlns:a16="http://schemas.microsoft.com/office/drawing/2014/main" id="{421EA5E1-A303-21CE-FB5F-4B36ED3B403A}"/>
+              </a:ext>
+            </a:extLst>
+          </p:cNvPr>
+          <p:cNvSpPr txBox="1"/>
+          <p:nvPr/>
+        </p:nvSpPr>
+        <p:spPr>
+          <a:xfrm>
+            <a:off x="7533467" y="2731777"/>
+            <a:ext cx="633829" cy="230832"/>
+          </a:xfrm>
+          <a:prstGeom prst="rect">
+            <a:avLst/>
+          </a:prstGeom>
+          <a:solidFill>
+            <a:schemeClr val="bg1"/>
+          </a:solidFill>
+        </p:spPr>
+        <p:txBody>
+          <a:bodyPr wrap="square" rtlCol="0">
+            <a:spAutoFit/>
+          </a:bodyPr>
+          <a:lstStyle/>
+          <a:p>
+            <a:r>
+              <a:rPr lang="en-US" sz="900" b="1" dirty="0">
+                <a:solidFill>
+                  <a:srgbClr val="0070C0"/>
+                </a:solidFill>
+              </a:rPr>
+              <a:t>subject</a:t>
+            </a:r>
+          </a:p>
+        </p:txBody>
+      </p:sp>
     </p:spTree>
     <p:extLst>
       <p:ext uri="{BB962C8B-B14F-4D97-AF65-F5344CB8AC3E}">
-        <p14:creationId xmlns:p14="http://schemas.microsoft.com/office/powerpoint/2010/main" val="2433621575"/>
+        <p14:creationId xmlns:p14="http://schemas.microsoft.com/office/powerpoint/2010/main" val="3596774463"/>
       </p:ext>
     </p:extLst>
   </p:cSld>

</xml_diff>